<commit_message>
Avance 17 Versión Final
</commit_message>
<xml_diff>
--- a/Presentación.pptx
+++ b/Presentación.pptx
@@ -10,8 +10,7 @@
     <p:sldId id="350" r:id="rId4"/>
     <p:sldId id="351" r:id="rId5"/>
     <p:sldId id="352" r:id="rId6"/>
-    <p:sldId id="349" r:id="rId7"/>
-    <p:sldId id="353" r:id="rId8"/>
+    <p:sldId id="353" r:id="rId7"/>
   </p:sldIdLst>
   <p:sldSz cx="12192000" cy="6858000"/>
   <p:notesSz cx="6858000" cy="9144000"/>
@@ -119,11 +118,11 @@
 </file>
 
 <file path=ppt/diagrams/colors1.xml><?xml version="1.0" encoding="utf-8"?>
-<dgm:colorsDef xmlns:dgm="http://schemas.openxmlformats.org/drawingml/2006/diagram" xmlns:a="http://schemas.openxmlformats.org/drawingml/2006/main" uniqueId="urn:microsoft.com/office/officeart/2018/5/colors/Iconchunking_neutralicon_colorful1">
+<dgm:colorsDef xmlns:dgm="http://schemas.openxmlformats.org/drawingml/2006/diagram" xmlns:a="http://schemas.openxmlformats.org/drawingml/2006/main" uniqueId="urn:microsoft.com/office/officeart/2005/8/colors/accent1_2">
   <dgm:title val=""/>
   <dgm:desc val=""/>
   <dgm:catLst>
-    <dgm:cat type="colorful" pri="10100"/>
+    <dgm:cat type="accent1" pri="11200"/>
   </dgm:catLst>
   <dgm:styleLbl name="node0">
     <dgm:fillClrLst meth="repeat">
@@ -137,49 +136,21 @@
     <dgm:txFillClrLst/>
     <dgm:txEffectClrLst/>
   </dgm:styleLbl>
-  <dgm:styleLbl name="node1">
+  <dgm:styleLbl name="alignNode1">
     <dgm:fillClrLst meth="repeat">
-      <a:schemeClr val="bg1"/>
+      <a:schemeClr val="accent1"/>
     </dgm:fillClrLst>
     <dgm:linClrLst meth="repeat">
-      <a:schemeClr val="lt1">
-        <a:alpha val="0"/>
-      </a:schemeClr>
-    </dgm:linClrLst>
-    <dgm:effectClrLst/>
-    <dgm:txLinClrLst/>
-    <dgm:txFillClrLst meth="repeat">
-      <a:schemeClr val="dk1"/>
-    </dgm:txFillClrLst>
-    <dgm:txEffectClrLst/>
-  </dgm:styleLbl>
-  <dgm:styleLbl name="alignNode1">
-    <dgm:fillClrLst meth="repeat">
-      <a:schemeClr val="accent2"/>
-      <a:schemeClr val="accent3"/>
-      <a:schemeClr val="accent4"/>
-      <a:schemeClr val="accent5"/>
-      <a:schemeClr val="accent6"/>
-    </dgm:fillClrLst>
-    <dgm:linClrLst meth="repeat">
-      <a:schemeClr val="accent2"/>
-      <a:schemeClr val="accent3"/>
-      <a:schemeClr val="accent4"/>
-      <a:schemeClr val="accent5"/>
-      <a:schemeClr val="accent6"/>
+      <a:schemeClr val="accent1"/>
     </dgm:linClrLst>
     <dgm:effectClrLst/>
     <dgm:txLinClrLst/>
     <dgm:txFillClrLst/>
     <dgm:txEffectClrLst/>
   </dgm:styleLbl>
-  <dgm:styleLbl name="lnNode1">
+  <dgm:styleLbl name="node1">
     <dgm:fillClrLst meth="repeat">
-      <a:schemeClr val="accent2"/>
-      <a:schemeClr val="accent3"/>
-      <a:schemeClr val="accent4"/>
-      <a:schemeClr val="accent5"/>
-      <a:schemeClr val="accent6"/>
+      <a:schemeClr val="accent1"/>
     </dgm:fillClrLst>
     <dgm:linClrLst meth="repeat">
       <a:schemeClr val="lt1"/>
@@ -189,21 +160,21 @@
     <dgm:txFillClrLst/>
     <dgm:txEffectClrLst/>
   </dgm:styleLbl>
+  <dgm:styleLbl name="lnNode1">
+    <dgm:fillClrLst meth="repeat">
+      <a:schemeClr val="accent1"/>
+    </dgm:fillClrLst>
+    <dgm:linClrLst meth="repeat">
+      <a:schemeClr val="lt1"/>
+    </dgm:linClrLst>
+    <dgm:effectClrLst/>
+    <dgm:txLinClrLst/>
+    <dgm:txFillClrLst/>
+    <dgm:txEffectClrLst/>
+  </dgm:styleLbl>
   <dgm:styleLbl name="vennNode1">
     <dgm:fillClrLst meth="repeat">
-      <a:schemeClr val="accent2">
-        <a:alpha val="50000"/>
-      </a:schemeClr>
-      <a:schemeClr val="accent3">
-        <a:alpha val="50000"/>
-      </a:schemeClr>
-      <a:schemeClr val="accent4">
-        <a:alpha val="50000"/>
-      </a:schemeClr>
-      <a:schemeClr val="accent5">
-        <a:alpha val="50000"/>
-      </a:schemeClr>
-      <a:schemeClr val="accent6">
+      <a:schemeClr val="accent1">
         <a:alpha val="50000"/>
       </a:schemeClr>
     </dgm:fillClrLst>
@@ -216,8 +187,8 @@
     <dgm:txEffectClrLst/>
   </dgm:styleLbl>
   <dgm:styleLbl name="node2">
-    <dgm:fillClrLst>
-      <a:schemeClr val="accent2"/>
+    <dgm:fillClrLst meth="repeat">
+      <a:schemeClr val="accent1"/>
     </dgm:fillClrLst>
     <dgm:linClrLst meth="repeat">
       <a:schemeClr val="lt1"/>
@@ -228,8 +199,8 @@
     <dgm:txEffectClrLst/>
   </dgm:styleLbl>
   <dgm:styleLbl name="node3">
-    <dgm:fillClrLst>
-      <a:schemeClr val="accent3"/>
+    <dgm:fillClrLst meth="repeat">
+      <a:schemeClr val="accent1"/>
     </dgm:fillClrLst>
     <dgm:linClrLst meth="repeat">
       <a:schemeClr val="lt1"/>
@@ -240,8 +211,8 @@
     <dgm:txEffectClrLst/>
   </dgm:styleLbl>
   <dgm:styleLbl name="node4">
-    <dgm:fillClrLst>
-      <a:schemeClr val="accent4"/>
+    <dgm:fillClrLst meth="repeat">
+      <a:schemeClr val="accent1"/>
     </dgm:fillClrLst>
     <dgm:linClrLst meth="repeat">
       <a:schemeClr val="lt1"/>
@@ -253,19 +224,7 @@
   </dgm:styleLbl>
   <dgm:styleLbl name="fgImgPlace1">
     <dgm:fillClrLst meth="repeat">
-      <a:schemeClr val="accent2">
-        <a:tint val="50000"/>
-      </a:schemeClr>
-      <a:schemeClr val="accent3">
-        <a:tint val="50000"/>
-      </a:schemeClr>
-      <a:schemeClr val="accent4">
-        <a:tint val="50000"/>
-      </a:schemeClr>
-      <a:schemeClr val="accent5">
-        <a:tint val="50000"/>
-      </a:schemeClr>
-      <a:schemeClr val="accent6">
+      <a:schemeClr val="accent1">
         <a:tint val="50000"/>
       </a:schemeClr>
     </dgm:fillClrLst>
@@ -280,12 +239,9 @@
     <dgm:txEffectClrLst/>
   </dgm:styleLbl>
   <dgm:styleLbl name="alignImgPlace1">
-    <dgm:fillClrLst>
+    <dgm:fillClrLst meth="repeat">
       <a:schemeClr val="accent1">
         <a:tint val="50000"/>
-      </a:schemeClr>
-      <a:schemeClr val="accent2">
-        <a:tint val="20000"/>
       </a:schemeClr>
     </dgm:fillClrLst>
     <dgm:linClrLst meth="repeat">
@@ -299,12 +255,9 @@
     <dgm:txEffectClrLst/>
   </dgm:styleLbl>
   <dgm:styleLbl name="bgImgPlace1">
-    <dgm:fillClrLst>
+    <dgm:fillClrLst meth="repeat">
       <a:schemeClr val="accent1">
         <a:tint val="50000"/>
-      </a:schemeClr>
-      <a:schemeClr val="accent2">
-        <a:tint val="20000"/>
       </a:schemeClr>
     </dgm:fillClrLst>
     <dgm:linClrLst meth="repeat">
@@ -319,14 +272,14 @@
   </dgm:styleLbl>
   <dgm:styleLbl name="sibTrans2D1">
     <dgm:fillClrLst meth="repeat">
-      <a:schemeClr val="accent2"/>
-      <a:schemeClr val="accent3"/>
-      <a:schemeClr val="accent4"/>
-      <a:schemeClr val="accent5"/>
-      <a:schemeClr val="accent6"/>
+      <a:schemeClr val="accent1">
+        <a:tint val="60000"/>
+      </a:schemeClr>
     </dgm:fillClrLst>
-    <dgm:linClrLst meth="cycle">
-      <a:schemeClr val="lt1"/>
+    <dgm:linClrLst meth="repeat">
+      <a:schemeClr val="accent1">
+        <a:tint val="60000"/>
+      </a:schemeClr>
     </dgm:linClrLst>
     <dgm:effectClrLst/>
     <dgm:txLinClrLst/>
@@ -335,54 +288,42 @@
   </dgm:styleLbl>
   <dgm:styleLbl name="fgSibTrans2D1">
     <dgm:fillClrLst meth="repeat">
-      <a:schemeClr val="accent2"/>
-      <a:schemeClr val="accent3"/>
-      <a:schemeClr val="accent4"/>
-      <a:schemeClr val="accent5"/>
-      <a:schemeClr val="accent6"/>
+      <a:schemeClr val="accent1">
+        <a:tint val="60000"/>
+      </a:schemeClr>
     </dgm:fillClrLst>
-    <dgm:linClrLst meth="cycle">
-      <a:schemeClr val="lt1"/>
+    <dgm:linClrLst meth="repeat">
+      <a:schemeClr val="accent1">
+        <a:tint val="60000"/>
+      </a:schemeClr>
     </dgm:linClrLst>
     <dgm:effectClrLst/>
     <dgm:txLinClrLst/>
-    <dgm:txFillClrLst meth="repeat">
-      <a:schemeClr val="lt1"/>
-    </dgm:txFillClrLst>
+    <dgm:txFillClrLst/>
     <dgm:txEffectClrLst/>
   </dgm:styleLbl>
   <dgm:styleLbl name="bgSibTrans2D1">
     <dgm:fillClrLst meth="repeat">
-      <a:schemeClr val="accent2"/>
-      <a:schemeClr val="accent3"/>
-      <a:schemeClr val="accent4"/>
-      <a:schemeClr val="accent5"/>
-      <a:schemeClr val="accent6"/>
+      <a:schemeClr val="accent1">
+        <a:tint val="60000"/>
+      </a:schemeClr>
     </dgm:fillClrLst>
-    <dgm:linClrLst meth="cycle">
-      <a:schemeClr val="lt1"/>
+    <dgm:linClrLst meth="repeat">
+      <a:schemeClr val="accent1">
+        <a:tint val="60000"/>
+      </a:schemeClr>
     </dgm:linClrLst>
     <dgm:effectClrLst/>
     <dgm:txLinClrLst/>
-    <dgm:txFillClrLst meth="repeat">
-      <a:schemeClr val="lt1"/>
-    </dgm:txFillClrLst>
+    <dgm:txFillClrLst/>
     <dgm:txEffectClrLst/>
   </dgm:styleLbl>
   <dgm:styleLbl name="sibTrans1D1">
     <dgm:fillClrLst meth="repeat">
-      <a:schemeClr val="accent2"/>
-      <a:schemeClr val="accent3"/>
-      <a:schemeClr val="accent4"/>
-      <a:schemeClr val="accent5"/>
-      <a:schemeClr val="accent6"/>
+      <a:schemeClr val="accent1"/>
     </dgm:fillClrLst>
     <dgm:linClrLst meth="repeat">
-      <a:schemeClr val="accent2"/>
-      <a:schemeClr val="accent3"/>
-      <a:schemeClr val="accent4"/>
-      <a:schemeClr val="accent5"/>
-      <a:schemeClr val="accent6"/>
+      <a:schemeClr val="accent1"/>
     </dgm:linClrLst>
     <dgm:effectClrLst/>
     <dgm:txLinClrLst/>
@@ -393,10 +334,10 @@
   </dgm:styleLbl>
   <dgm:styleLbl name="callout">
     <dgm:fillClrLst meth="repeat">
-      <a:schemeClr val="accent2"/>
+      <a:schemeClr val="accent1"/>
     </dgm:fillClrLst>
     <dgm:linClrLst meth="repeat">
-      <a:schemeClr val="accent2">
+      <a:schemeClr val="accent1">
         <a:tint val="50000"/>
       </a:schemeClr>
     </dgm:linClrLst>
@@ -421,7 +362,7 @@
   </dgm:styleLbl>
   <dgm:styleLbl name="asst1">
     <dgm:fillClrLst meth="repeat">
-      <a:schemeClr val="accent2"/>
+      <a:schemeClr val="accent1"/>
     </dgm:fillClrLst>
     <dgm:linClrLst meth="repeat">
       <a:schemeClr val="lt1"/>
@@ -432,8 +373,8 @@
     <dgm:txEffectClrLst/>
   </dgm:styleLbl>
   <dgm:styleLbl name="asst2">
-    <dgm:fillClrLst>
-      <a:schemeClr val="accent3"/>
+    <dgm:fillClrLst meth="repeat">
+      <a:schemeClr val="accent1"/>
     </dgm:fillClrLst>
     <dgm:linClrLst meth="repeat">
       <a:schemeClr val="lt1"/>
@@ -444,8 +385,8 @@
     <dgm:txEffectClrLst/>
   </dgm:styleLbl>
   <dgm:styleLbl name="asst3">
-    <dgm:fillClrLst>
-      <a:schemeClr val="accent4"/>
+    <dgm:fillClrLst meth="repeat">
+      <a:schemeClr val="accent1"/>
     </dgm:fillClrLst>
     <dgm:linClrLst meth="repeat">
       <a:schemeClr val="lt1"/>
@@ -456,8 +397,8 @@
     <dgm:txEffectClrLst/>
   </dgm:styleLbl>
   <dgm:styleLbl name="asst4">
-    <dgm:fillClrLst>
-      <a:schemeClr val="accent5"/>
+    <dgm:fillClrLst meth="repeat">
+      <a:schemeClr val="accent1"/>
     </dgm:fillClrLst>
     <dgm:linClrLst meth="repeat">
       <a:schemeClr val="lt1"/>
@@ -469,10 +410,14 @@
   </dgm:styleLbl>
   <dgm:styleLbl name="parChTrans2D1">
     <dgm:fillClrLst meth="repeat">
-      <a:schemeClr val="accent2"/>
+      <a:schemeClr val="accent1">
+        <a:tint val="60000"/>
+      </a:schemeClr>
     </dgm:fillClrLst>
     <dgm:linClrLst meth="repeat">
-      <a:schemeClr val="lt1"/>
+      <a:schemeClr val="accent1">
+        <a:tint val="60000"/>
+      </a:schemeClr>
     </dgm:linClrLst>
     <dgm:effectClrLst/>
     <dgm:txLinClrLst/>
@@ -483,34 +428,10 @@
   </dgm:styleLbl>
   <dgm:styleLbl name="parChTrans2D2">
     <dgm:fillClrLst meth="repeat">
-      <a:schemeClr val="accent3"/>
+      <a:schemeClr val="accent1"/>
     </dgm:fillClrLst>
     <dgm:linClrLst meth="repeat">
-      <a:schemeClr val="lt1"/>
-    </dgm:linClrLst>
-    <dgm:effectClrLst/>
-    <dgm:txLinClrLst/>
-    <dgm:txFillClrLst/>
-    <dgm:txEffectClrLst/>
-  </dgm:styleLbl>
-  <dgm:styleLbl name="parChTrans2D3">
-    <dgm:fillClrLst meth="repeat">
-      <a:schemeClr val="accent4"/>
-    </dgm:fillClrLst>
-    <dgm:linClrLst meth="repeat">
-      <a:schemeClr val="lt1"/>
-    </dgm:linClrLst>
-    <dgm:effectClrLst/>
-    <dgm:txLinClrLst/>
-    <dgm:txFillClrLst/>
-    <dgm:txEffectClrLst/>
-  </dgm:styleLbl>
-  <dgm:styleLbl name="parChTrans2D4">
-    <dgm:fillClrLst meth="repeat">
-      <a:schemeClr val="accent5"/>
-    </dgm:fillClrLst>
-    <dgm:linClrLst meth="repeat">
-      <a:schemeClr val="lt1"/>
+      <a:schemeClr val="accent1"/>
     </dgm:linClrLst>
     <dgm:effectClrLst/>
     <dgm:txLinClrLst/>
@@ -519,9 +440,9 @@
     </dgm:txFillClrLst>
     <dgm:txEffectClrLst/>
   </dgm:styleLbl>
-  <dgm:styleLbl name="parChTrans1D1">
+  <dgm:styleLbl name="parChTrans2D3">
     <dgm:fillClrLst meth="repeat">
-      <a:schemeClr val="accent2"/>
+      <a:schemeClr val="accent1"/>
     </dgm:fillClrLst>
     <dgm:linClrLst meth="repeat">
       <a:schemeClr val="accent1"/>
@@ -529,18 +450,32 @@
     <dgm:effectClrLst/>
     <dgm:txLinClrLst/>
     <dgm:txFillClrLst meth="repeat">
-      <a:schemeClr val="tx1"/>
+      <a:schemeClr val="lt1"/>
     </dgm:txFillClrLst>
     <dgm:txEffectClrLst/>
   </dgm:styleLbl>
-  <dgm:styleLbl name="parChTrans1D2">
+  <dgm:styleLbl name="parChTrans2D4">
     <dgm:fillClrLst meth="repeat">
-      <a:schemeClr val="accent3">
-        <a:tint val="90000"/>
-      </a:schemeClr>
+      <a:schemeClr val="accent1"/>
     </dgm:fillClrLst>
     <dgm:linClrLst meth="repeat">
-      <a:schemeClr val="accent2"/>
+      <a:schemeClr val="accent1"/>
+    </dgm:linClrLst>
+    <dgm:effectClrLst/>
+    <dgm:txLinClrLst/>
+    <dgm:txFillClrLst meth="repeat">
+      <a:schemeClr val="lt1"/>
+    </dgm:txFillClrLst>
+    <dgm:txEffectClrLst/>
+  </dgm:styleLbl>
+  <dgm:styleLbl name="parChTrans1D1">
+    <dgm:fillClrLst meth="repeat">
+      <a:schemeClr val="accent1"/>
+    </dgm:fillClrLst>
+    <dgm:linClrLst meth="repeat">
+      <a:schemeClr val="accent1">
+        <a:shade val="60000"/>
+      </a:schemeClr>
     </dgm:linClrLst>
     <dgm:effectClrLst/>
     <dgm:txLinClrLst/>
@@ -549,14 +484,14 @@
     </dgm:txFillClrLst>
     <dgm:txEffectClrLst/>
   </dgm:styleLbl>
-  <dgm:styleLbl name="parChTrans1D3">
+  <dgm:styleLbl name="parChTrans1D2">
     <dgm:fillClrLst meth="repeat">
-      <a:schemeClr val="accent4">
-        <a:tint val="70000"/>
-      </a:schemeClr>
+      <a:schemeClr val="accent1"/>
     </dgm:fillClrLst>
     <dgm:linClrLst meth="repeat">
-      <a:schemeClr val="accent3"/>
+      <a:schemeClr val="accent1">
+        <a:shade val="60000"/>
+      </a:schemeClr>
     </dgm:linClrLst>
     <dgm:effectClrLst/>
     <dgm:txLinClrLst/>
@@ -565,14 +500,14 @@
     </dgm:txFillClrLst>
     <dgm:txEffectClrLst/>
   </dgm:styleLbl>
-  <dgm:styleLbl name="parChTrans1D4">
+  <dgm:styleLbl name="parChTrans1D3">
     <dgm:fillClrLst meth="repeat">
-      <a:schemeClr val="accent5">
-        <a:tint val="50000"/>
-      </a:schemeClr>
+      <a:schemeClr val="accent1"/>
     </dgm:fillClrLst>
     <dgm:linClrLst meth="repeat">
-      <a:schemeClr val="accent4"/>
+      <a:schemeClr val="accent1">
+        <a:shade val="80000"/>
+      </a:schemeClr>
     </dgm:linClrLst>
     <dgm:effectClrLst/>
     <dgm:txLinClrLst/>
@@ -581,6 +516,22 @@
     </dgm:txFillClrLst>
     <dgm:txEffectClrLst/>
   </dgm:styleLbl>
+  <dgm:styleLbl name="parChTrans1D4">
+    <dgm:fillClrLst meth="repeat">
+      <a:schemeClr val="accent1"/>
+    </dgm:fillClrLst>
+    <dgm:linClrLst meth="repeat">
+      <a:schemeClr val="accent1">
+        <a:shade val="80000"/>
+      </a:schemeClr>
+    </dgm:linClrLst>
+    <dgm:effectClrLst/>
+    <dgm:txLinClrLst/>
+    <dgm:txFillClrLst meth="repeat">
+      <a:schemeClr val="tx1"/>
+    </dgm:txFillClrLst>
+    <dgm:txEffectClrLst/>
+  </dgm:styleLbl>
   <dgm:styleLbl name="fgAcc1">
     <dgm:fillClrLst meth="repeat">
       <a:schemeClr val="lt1">
@@ -588,11 +539,7 @@
       </a:schemeClr>
     </dgm:fillClrLst>
     <dgm:linClrLst meth="repeat">
-      <a:schemeClr val="accent2"/>
-      <a:schemeClr val="accent3"/>
-      <a:schemeClr val="accent4"/>
-      <a:schemeClr val="accent5"/>
-      <a:schemeClr val="accent6"/>
+      <a:schemeClr val="accent1"/>
     </dgm:linClrLst>
     <dgm:effectClrLst/>
     <dgm:txLinClrLst/>
@@ -608,11 +555,7 @@
       </a:schemeClr>
     </dgm:fillClrLst>
     <dgm:linClrLst meth="repeat">
-      <a:schemeClr val="accent2"/>
-      <a:schemeClr val="accent3"/>
-      <a:schemeClr val="accent4"/>
-      <a:schemeClr val="accent5"/>
-      <a:schemeClr val="accent6"/>
+      <a:schemeClr val="accent1"/>
     </dgm:linClrLst>
     <dgm:effectClrLst/>
     <dgm:txLinClrLst/>
@@ -628,11 +571,7 @@
       </a:schemeClr>
     </dgm:fillClrLst>
     <dgm:linClrLst meth="repeat">
-      <a:schemeClr val="accent2"/>
-      <a:schemeClr val="accent3"/>
-      <a:schemeClr val="accent4"/>
-      <a:schemeClr val="accent5"/>
-      <a:schemeClr val="accent6"/>
+      <a:schemeClr val="accent1"/>
     </dgm:linClrLst>
     <dgm:effectClrLst/>
     <dgm:txLinClrLst/>
@@ -664,11 +603,7 @@
       </a:schemeClr>
     </dgm:fillClrLst>
     <dgm:linClrLst meth="repeat">
-      <a:schemeClr val="accent2"/>
-      <a:schemeClr val="accent3"/>
-      <a:schemeClr val="accent4"/>
-      <a:schemeClr val="accent5"/>
-      <a:schemeClr val="accent6"/>
+      <a:schemeClr val="accent1"/>
     </dgm:linClrLst>
     <dgm:effectClrLst/>
     <dgm:txLinClrLst/>
@@ -682,11 +617,7 @@
       <a:schemeClr val="lt1"/>
     </dgm:fillClrLst>
     <dgm:linClrLst meth="repeat">
-      <a:schemeClr val="accent2"/>
-      <a:schemeClr val="accent3"/>
-      <a:schemeClr val="accent4"/>
-      <a:schemeClr val="accent5"/>
-      <a:schemeClr val="accent6"/>
+      <a:schemeClr val="accent1"/>
     </dgm:linClrLst>
     <dgm:effectClrLst/>
     <dgm:txLinClrLst/>
@@ -700,11 +631,7 @@
       <a:schemeClr val="lt1"/>
     </dgm:fillClrLst>
     <dgm:linClrLst meth="repeat">
-      <a:schemeClr val="accent2"/>
-      <a:schemeClr val="accent3"/>
-      <a:schemeClr val="accent4"/>
-      <a:schemeClr val="accent5"/>
-      <a:schemeClr val="accent6"/>
+      <a:schemeClr val="accent1"/>
     </dgm:linClrLst>
     <dgm:effectClrLst/>
     <dgm:txLinClrLst/>
@@ -718,11 +645,7 @@
       <a:schemeClr val="lt1"/>
     </dgm:fillClrLst>
     <dgm:linClrLst meth="repeat">
-      <a:schemeClr val="accent2"/>
-      <a:schemeClr val="accent3"/>
-      <a:schemeClr val="accent4"/>
-      <a:schemeClr val="accent5"/>
-      <a:schemeClr val="accent6"/>
+      <a:schemeClr val="accent1"/>
     </dgm:linClrLst>
     <dgm:effectClrLst/>
     <dgm:txLinClrLst/>
@@ -733,47 +656,15 @@
   </dgm:styleLbl>
   <dgm:styleLbl name="fgAccFollowNode1">
     <dgm:fillClrLst meth="repeat">
-      <a:schemeClr val="accent2">
+      <a:schemeClr val="accent1">
+        <a:alpha val="90000"/>
         <a:tint val="40000"/>
-        <a:alpha val="90000"/>
-      </a:schemeClr>
-      <a:schemeClr val="accent3">
-        <a:tint val="40000"/>
-        <a:alpha val="90000"/>
-      </a:schemeClr>
-      <a:schemeClr val="accent4">
-        <a:tint val="40000"/>
-        <a:alpha val="90000"/>
-      </a:schemeClr>
-      <a:schemeClr val="accent5">
-        <a:tint val="40000"/>
-        <a:alpha val="90000"/>
-      </a:schemeClr>
-      <a:schemeClr val="accent6">
-        <a:tint val="40000"/>
-        <a:alpha val="90000"/>
       </a:schemeClr>
     </dgm:fillClrLst>
     <dgm:linClrLst meth="repeat">
-      <a:schemeClr val="accent2">
+      <a:schemeClr val="accent1">
+        <a:alpha val="90000"/>
         <a:tint val="40000"/>
-        <a:alpha val="90000"/>
-      </a:schemeClr>
-      <a:schemeClr val="accent3">
-        <a:tint val="40000"/>
-        <a:alpha val="90000"/>
-      </a:schemeClr>
-      <a:schemeClr val="accent4">
-        <a:tint val="40000"/>
-        <a:alpha val="90000"/>
-      </a:schemeClr>
-      <a:schemeClr val="accent5">
-        <a:tint val="40000"/>
-        <a:alpha val="90000"/>
-      </a:schemeClr>
-      <a:schemeClr val="accent6">
-        <a:tint val="40000"/>
-        <a:alpha val="90000"/>
       </a:schemeClr>
     </dgm:linClrLst>
     <dgm:effectClrLst/>
@@ -785,47 +676,15 @@
   </dgm:styleLbl>
   <dgm:styleLbl name="alignAccFollowNode1">
     <dgm:fillClrLst meth="repeat">
-      <a:schemeClr val="accent2">
+      <a:schemeClr val="accent1">
+        <a:alpha val="90000"/>
         <a:tint val="40000"/>
-        <a:alpha val="90000"/>
-      </a:schemeClr>
-      <a:schemeClr val="accent3">
-        <a:tint val="40000"/>
-        <a:alpha val="90000"/>
-      </a:schemeClr>
-      <a:schemeClr val="accent4">
-        <a:tint val="40000"/>
-        <a:alpha val="90000"/>
-      </a:schemeClr>
-      <a:schemeClr val="accent5">
-        <a:tint val="40000"/>
-        <a:alpha val="90000"/>
-      </a:schemeClr>
-      <a:schemeClr val="accent6">
-        <a:tint val="40000"/>
-        <a:alpha val="90000"/>
       </a:schemeClr>
     </dgm:fillClrLst>
     <dgm:linClrLst meth="repeat">
-      <a:schemeClr val="accent2">
+      <a:schemeClr val="accent1">
+        <a:alpha val="90000"/>
         <a:tint val="40000"/>
-        <a:alpha val="90000"/>
-      </a:schemeClr>
-      <a:schemeClr val="accent3">
-        <a:tint val="40000"/>
-        <a:alpha val="90000"/>
-      </a:schemeClr>
-      <a:schemeClr val="accent4">
-        <a:tint val="40000"/>
-        <a:alpha val="90000"/>
-      </a:schemeClr>
-      <a:schemeClr val="accent5">
-        <a:tint val="40000"/>
-        <a:alpha val="90000"/>
-      </a:schemeClr>
-      <a:schemeClr val="accent6">
-        <a:tint val="40000"/>
-        <a:alpha val="90000"/>
       </a:schemeClr>
     </dgm:linClrLst>
     <dgm:effectClrLst/>
@@ -837,47 +696,15 @@
   </dgm:styleLbl>
   <dgm:styleLbl name="bgAccFollowNode1">
     <dgm:fillClrLst meth="repeat">
-      <a:schemeClr val="accent2">
+      <a:schemeClr val="accent1">
+        <a:alpha val="90000"/>
         <a:tint val="40000"/>
-        <a:alpha val="90000"/>
-      </a:schemeClr>
-      <a:schemeClr val="accent3">
-        <a:tint val="40000"/>
-        <a:alpha val="90000"/>
-      </a:schemeClr>
-      <a:schemeClr val="accent4">
-        <a:tint val="40000"/>
-        <a:alpha val="90000"/>
-      </a:schemeClr>
-      <a:schemeClr val="accent5">
-        <a:tint val="40000"/>
-        <a:alpha val="90000"/>
-      </a:schemeClr>
-      <a:schemeClr val="accent6">
-        <a:tint val="40000"/>
-        <a:alpha val="90000"/>
       </a:schemeClr>
     </dgm:fillClrLst>
     <dgm:linClrLst meth="repeat">
-      <a:schemeClr val="accent2">
+      <a:schemeClr val="accent1">
+        <a:alpha val="90000"/>
         <a:tint val="40000"/>
-        <a:alpha val="90000"/>
-      </a:schemeClr>
-      <a:schemeClr val="accent3">
-        <a:tint val="40000"/>
-        <a:alpha val="90000"/>
-      </a:schemeClr>
-      <a:schemeClr val="accent4">
-        <a:tint val="40000"/>
-        <a:alpha val="90000"/>
-      </a:schemeClr>
-      <a:schemeClr val="accent5">
-        <a:tint val="40000"/>
-        <a:alpha val="90000"/>
-      </a:schemeClr>
-      <a:schemeClr val="accent6">
-        <a:tint val="40000"/>
-        <a:alpha val="90000"/>
       </a:schemeClr>
     </dgm:linClrLst>
     <dgm:effectClrLst/>
@@ -893,7 +720,7 @@
         <a:alpha val="90000"/>
       </a:schemeClr>
     </dgm:fillClrLst>
-    <dgm:linClrLst>
+    <dgm:linClrLst meth="repeat">
       <a:schemeClr val="accent1"/>
     </dgm:linClrLst>
     <dgm:effectClrLst/>
@@ -909,8 +736,8 @@
         <a:alpha val="90000"/>
       </a:schemeClr>
     </dgm:fillClrLst>
-    <dgm:linClrLst>
-      <a:schemeClr val="accent2"/>
+    <dgm:linClrLst meth="repeat">
+      <a:schemeClr val="accent1"/>
     </dgm:linClrLst>
     <dgm:effectClrLst/>
     <dgm:txLinClrLst/>
@@ -925,8 +752,8 @@
         <a:alpha val="90000"/>
       </a:schemeClr>
     </dgm:fillClrLst>
-    <dgm:linClrLst>
-      <a:schemeClr val="accent3"/>
+    <dgm:linClrLst meth="repeat">
+      <a:schemeClr val="accent1"/>
     </dgm:linClrLst>
     <dgm:effectClrLst/>
     <dgm:txLinClrLst/>
@@ -941,8 +768,8 @@
         <a:alpha val="90000"/>
       </a:schemeClr>
     </dgm:fillClrLst>
-    <dgm:linClrLst>
-      <a:schemeClr val="accent4"/>
+    <dgm:linClrLst meth="repeat">
+      <a:schemeClr val="accent1"/>
     </dgm:linClrLst>
     <dgm:effectClrLst/>
     <dgm:txLinClrLst/>
@@ -953,30 +780,28 @@
   </dgm:styleLbl>
   <dgm:styleLbl name="bgShp">
     <dgm:fillClrLst meth="repeat">
-      <a:schemeClr val="accent2"/>
-      <a:schemeClr val="accent3"/>
-      <a:schemeClr val="accent4"/>
-      <a:schemeClr val="accent5"/>
-      <a:schemeClr val="accent6"/>
+      <a:schemeClr val="accent1">
+        <a:tint val="40000"/>
+      </a:schemeClr>
     </dgm:fillClrLst>
     <dgm:linClrLst meth="repeat">
-      <a:schemeClr val="lt1">
-        <a:alpha val="0"/>
-      </a:schemeClr>
+      <a:schemeClr val="accent1"/>
     </dgm:linClrLst>
     <dgm:effectClrLst/>
     <dgm:txLinClrLst/>
-    <dgm:txFillClrLst/>
+    <dgm:txFillClrLst meth="repeat">
+      <a:schemeClr val="dk1"/>
+    </dgm:txFillClrLst>
     <dgm:txEffectClrLst/>
   </dgm:styleLbl>
   <dgm:styleLbl name="dkBgShp">
     <dgm:fillClrLst meth="repeat">
-      <a:schemeClr val="accent2">
-        <a:shade val="90000"/>
+      <a:schemeClr val="accent1">
+        <a:shade val="80000"/>
       </a:schemeClr>
     </dgm:fillClrLst>
     <dgm:linClrLst meth="repeat">
-      <a:schemeClr val="dk1"/>
+      <a:schemeClr val="accent1"/>
     </dgm:linClrLst>
     <dgm:effectClrLst/>
     <dgm:txLinClrLst/>
@@ -993,7 +818,7 @@
       </a:schemeClr>
     </dgm:fillClrLst>
     <dgm:linClrLst meth="repeat">
-      <a:schemeClr val="accent2"/>
+      <a:schemeClr val="accent1"/>
     </dgm:linClrLst>
     <dgm:effectClrLst/>
     <dgm:txLinClrLst/>
@@ -1004,8 +829,8 @@
   </dgm:styleLbl>
   <dgm:styleLbl name="fgShp">
     <dgm:fillClrLst meth="repeat">
-      <a:schemeClr val="accent2">
-        <a:tint val="40000"/>
+      <a:schemeClr val="accent1">
+        <a:tint val="60000"/>
       </a:schemeClr>
     </dgm:fillClrLst>
     <dgm:linClrLst meth="repeat">
@@ -1786,1352 +1611,7 @@
 </dgm:colorsDef>
 </file>
 
-<file path=ppt/diagrams/colors3.xml><?xml version="1.0" encoding="utf-8"?>
-<dgm:colorsDef xmlns:dgm="http://schemas.openxmlformats.org/drawingml/2006/diagram" xmlns:a="http://schemas.openxmlformats.org/drawingml/2006/main" uniqueId="urn:microsoft.com/office/officeart/2005/8/colors/accent1_2">
-  <dgm:title val=""/>
-  <dgm:desc val=""/>
-  <dgm:catLst>
-    <dgm:cat type="accent1" pri="11200"/>
-  </dgm:catLst>
-  <dgm:styleLbl name="node0">
-    <dgm:fillClrLst meth="repeat">
-      <a:schemeClr val="accent1"/>
-    </dgm:fillClrLst>
-    <dgm:linClrLst meth="repeat">
-      <a:schemeClr val="lt1"/>
-    </dgm:linClrLst>
-    <dgm:effectClrLst/>
-    <dgm:txLinClrLst/>
-    <dgm:txFillClrLst/>
-    <dgm:txEffectClrLst/>
-  </dgm:styleLbl>
-  <dgm:styleLbl name="alignNode1">
-    <dgm:fillClrLst meth="repeat">
-      <a:schemeClr val="accent1"/>
-    </dgm:fillClrLst>
-    <dgm:linClrLst meth="repeat">
-      <a:schemeClr val="accent1"/>
-    </dgm:linClrLst>
-    <dgm:effectClrLst/>
-    <dgm:txLinClrLst/>
-    <dgm:txFillClrLst/>
-    <dgm:txEffectClrLst/>
-  </dgm:styleLbl>
-  <dgm:styleLbl name="node1">
-    <dgm:fillClrLst meth="repeat">
-      <a:schemeClr val="accent1"/>
-    </dgm:fillClrLst>
-    <dgm:linClrLst meth="repeat">
-      <a:schemeClr val="lt1"/>
-    </dgm:linClrLst>
-    <dgm:effectClrLst/>
-    <dgm:txLinClrLst/>
-    <dgm:txFillClrLst/>
-    <dgm:txEffectClrLst/>
-  </dgm:styleLbl>
-  <dgm:styleLbl name="lnNode1">
-    <dgm:fillClrLst meth="repeat">
-      <a:schemeClr val="accent1"/>
-    </dgm:fillClrLst>
-    <dgm:linClrLst meth="repeat">
-      <a:schemeClr val="lt1"/>
-    </dgm:linClrLst>
-    <dgm:effectClrLst/>
-    <dgm:txLinClrLst/>
-    <dgm:txFillClrLst/>
-    <dgm:txEffectClrLst/>
-  </dgm:styleLbl>
-  <dgm:styleLbl name="vennNode1">
-    <dgm:fillClrLst meth="repeat">
-      <a:schemeClr val="accent1">
-        <a:alpha val="50000"/>
-      </a:schemeClr>
-    </dgm:fillClrLst>
-    <dgm:linClrLst meth="repeat">
-      <a:schemeClr val="lt1"/>
-    </dgm:linClrLst>
-    <dgm:effectClrLst/>
-    <dgm:txLinClrLst/>
-    <dgm:txFillClrLst/>
-    <dgm:txEffectClrLst/>
-  </dgm:styleLbl>
-  <dgm:styleLbl name="node2">
-    <dgm:fillClrLst meth="repeat">
-      <a:schemeClr val="accent1"/>
-    </dgm:fillClrLst>
-    <dgm:linClrLst meth="repeat">
-      <a:schemeClr val="lt1"/>
-    </dgm:linClrLst>
-    <dgm:effectClrLst/>
-    <dgm:txLinClrLst/>
-    <dgm:txFillClrLst/>
-    <dgm:txEffectClrLst/>
-  </dgm:styleLbl>
-  <dgm:styleLbl name="node3">
-    <dgm:fillClrLst meth="repeat">
-      <a:schemeClr val="accent1"/>
-    </dgm:fillClrLst>
-    <dgm:linClrLst meth="repeat">
-      <a:schemeClr val="lt1"/>
-    </dgm:linClrLst>
-    <dgm:effectClrLst/>
-    <dgm:txLinClrLst/>
-    <dgm:txFillClrLst/>
-    <dgm:txEffectClrLst/>
-  </dgm:styleLbl>
-  <dgm:styleLbl name="node4">
-    <dgm:fillClrLst meth="repeat">
-      <a:schemeClr val="accent1"/>
-    </dgm:fillClrLst>
-    <dgm:linClrLst meth="repeat">
-      <a:schemeClr val="lt1"/>
-    </dgm:linClrLst>
-    <dgm:effectClrLst/>
-    <dgm:txLinClrLst/>
-    <dgm:txFillClrLst/>
-    <dgm:txEffectClrLst/>
-  </dgm:styleLbl>
-  <dgm:styleLbl name="fgImgPlace1">
-    <dgm:fillClrLst meth="repeat">
-      <a:schemeClr val="accent1">
-        <a:tint val="50000"/>
-      </a:schemeClr>
-    </dgm:fillClrLst>
-    <dgm:linClrLst meth="repeat">
-      <a:schemeClr val="lt1"/>
-    </dgm:linClrLst>
-    <dgm:effectClrLst/>
-    <dgm:txLinClrLst/>
-    <dgm:txFillClrLst meth="repeat">
-      <a:schemeClr val="lt1"/>
-    </dgm:txFillClrLst>
-    <dgm:txEffectClrLst/>
-  </dgm:styleLbl>
-  <dgm:styleLbl name="alignImgPlace1">
-    <dgm:fillClrLst meth="repeat">
-      <a:schemeClr val="accent1">
-        <a:tint val="50000"/>
-      </a:schemeClr>
-    </dgm:fillClrLst>
-    <dgm:linClrLst meth="repeat">
-      <a:schemeClr val="lt1"/>
-    </dgm:linClrLst>
-    <dgm:effectClrLst/>
-    <dgm:txLinClrLst/>
-    <dgm:txFillClrLst meth="repeat">
-      <a:schemeClr val="lt1"/>
-    </dgm:txFillClrLst>
-    <dgm:txEffectClrLst/>
-  </dgm:styleLbl>
-  <dgm:styleLbl name="bgImgPlace1">
-    <dgm:fillClrLst meth="repeat">
-      <a:schemeClr val="accent1">
-        <a:tint val="50000"/>
-      </a:schemeClr>
-    </dgm:fillClrLst>
-    <dgm:linClrLst meth="repeat">
-      <a:schemeClr val="lt1"/>
-    </dgm:linClrLst>
-    <dgm:effectClrLst/>
-    <dgm:txLinClrLst/>
-    <dgm:txFillClrLst meth="repeat">
-      <a:schemeClr val="lt1"/>
-    </dgm:txFillClrLst>
-    <dgm:txEffectClrLst/>
-  </dgm:styleLbl>
-  <dgm:styleLbl name="sibTrans2D1">
-    <dgm:fillClrLst meth="repeat">
-      <a:schemeClr val="accent1">
-        <a:tint val="60000"/>
-      </a:schemeClr>
-    </dgm:fillClrLst>
-    <dgm:linClrLst meth="repeat">
-      <a:schemeClr val="accent1">
-        <a:tint val="60000"/>
-      </a:schemeClr>
-    </dgm:linClrLst>
-    <dgm:effectClrLst/>
-    <dgm:txLinClrLst/>
-    <dgm:txFillClrLst/>
-    <dgm:txEffectClrLst/>
-  </dgm:styleLbl>
-  <dgm:styleLbl name="fgSibTrans2D1">
-    <dgm:fillClrLst meth="repeat">
-      <a:schemeClr val="accent1">
-        <a:tint val="60000"/>
-      </a:schemeClr>
-    </dgm:fillClrLst>
-    <dgm:linClrLst meth="repeat">
-      <a:schemeClr val="accent1">
-        <a:tint val="60000"/>
-      </a:schemeClr>
-    </dgm:linClrLst>
-    <dgm:effectClrLst/>
-    <dgm:txLinClrLst/>
-    <dgm:txFillClrLst/>
-    <dgm:txEffectClrLst/>
-  </dgm:styleLbl>
-  <dgm:styleLbl name="bgSibTrans2D1">
-    <dgm:fillClrLst meth="repeat">
-      <a:schemeClr val="accent1">
-        <a:tint val="60000"/>
-      </a:schemeClr>
-    </dgm:fillClrLst>
-    <dgm:linClrLst meth="repeat">
-      <a:schemeClr val="accent1">
-        <a:tint val="60000"/>
-      </a:schemeClr>
-    </dgm:linClrLst>
-    <dgm:effectClrLst/>
-    <dgm:txLinClrLst/>
-    <dgm:txFillClrLst/>
-    <dgm:txEffectClrLst/>
-  </dgm:styleLbl>
-  <dgm:styleLbl name="sibTrans1D1">
-    <dgm:fillClrLst meth="repeat">
-      <a:schemeClr val="accent1"/>
-    </dgm:fillClrLst>
-    <dgm:linClrLst meth="repeat">
-      <a:schemeClr val="accent1"/>
-    </dgm:linClrLst>
-    <dgm:effectClrLst/>
-    <dgm:txLinClrLst/>
-    <dgm:txFillClrLst meth="repeat">
-      <a:schemeClr val="tx1"/>
-    </dgm:txFillClrLst>
-    <dgm:txEffectClrLst/>
-  </dgm:styleLbl>
-  <dgm:styleLbl name="callout">
-    <dgm:fillClrLst meth="repeat">
-      <a:schemeClr val="accent1"/>
-    </dgm:fillClrLst>
-    <dgm:linClrLst meth="repeat">
-      <a:schemeClr val="accent1">
-        <a:tint val="50000"/>
-      </a:schemeClr>
-    </dgm:linClrLst>
-    <dgm:effectClrLst/>
-    <dgm:txLinClrLst/>
-    <dgm:txFillClrLst meth="repeat">
-      <a:schemeClr val="tx1"/>
-    </dgm:txFillClrLst>
-    <dgm:txEffectClrLst/>
-  </dgm:styleLbl>
-  <dgm:styleLbl name="asst0">
-    <dgm:fillClrLst meth="repeat">
-      <a:schemeClr val="accent1"/>
-    </dgm:fillClrLst>
-    <dgm:linClrLst meth="repeat">
-      <a:schemeClr val="lt1"/>
-    </dgm:linClrLst>
-    <dgm:effectClrLst/>
-    <dgm:txLinClrLst/>
-    <dgm:txFillClrLst/>
-    <dgm:txEffectClrLst/>
-  </dgm:styleLbl>
-  <dgm:styleLbl name="asst1">
-    <dgm:fillClrLst meth="repeat">
-      <a:schemeClr val="accent1"/>
-    </dgm:fillClrLst>
-    <dgm:linClrLst meth="repeat">
-      <a:schemeClr val="lt1"/>
-    </dgm:linClrLst>
-    <dgm:effectClrLst/>
-    <dgm:txLinClrLst/>
-    <dgm:txFillClrLst/>
-    <dgm:txEffectClrLst/>
-  </dgm:styleLbl>
-  <dgm:styleLbl name="asst2">
-    <dgm:fillClrLst meth="repeat">
-      <a:schemeClr val="accent1"/>
-    </dgm:fillClrLst>
-    <dgm:linClrLst meth="repeat">
-      <a:schemeClr val="lt1"/>
-    </dgm:linClrLst>
-    <dgm:effectClrLst/>
-    <dgm:txLinClrLst/>
-    <dgm:txFillClrLst/>
-    <dgm:txEffectClrLst/>
-  </dgm:styleLbl>
-  <dgm:styleLbl name="asst3">
-    <dgm:fillClrLst meth="repeat">
-      <a:schemeClr val="accent1"/>
-    </dgm:fillClrLst>
-    <dgm:linClrLst meth="repeat">
-      <a:schemeClr val="lt1"/>
-    </dgm:linClrLst>
-    <dgm:effectClrLst/>
-    <dgm:txLinClrLst/>
-    <dgm:txFillClrLst/>
-    <dgm:txEffectClrLst/>
-  </dgm:styleLbl>
-  <dgm:styleLbl name="asst4">
-    <dgm:fillClrLst meth="repeat">
-      <a:schemeClr val="accent1"/>
-    </dgm:fillClrLst>
-    <dgm:linClrLst meth="repeat">
-      <a:schemeClr val="lt1"/>
-    </dgm:linClrLst>
-    <dgm:effectClrLst/>
-    <dgm:txLinClrLst/>
-    <dgm:txFillClrLst/>
-    <dgm:txEffectClrLst/>
-  </dgm:styleLbl>
-  <dgm:styleLbl name="parChTrans2D1">
-    <dgm:fillClrLst meth="repeat">
-      <a:schemeClr val="accent1">
-        <a:tint val="60000"/>
-      </a:schemeClr>
-    </dgm:fillClrLst>
-    <dgm:linClrLst meth="repeat">
-      <a:schemeClr val="accent1">
-        <a:tint val="60000"/>
-      </a:schemeClr>
-    </dgm:linClrLst>
-    <dgm:effectClrLst/>
-    <dgm:txLinClrLst/>
-    <dgm:txFillClrLst meth="repeat">
-      <a:schemeClr val="lt1"/>
-    </dgm:txFillClrLst>
-    <dgm:txEffectClrLst/>
-  </dgm:styleLbl>
-  <dgm:styleLbl name="parChTrans2D2">
-    <dgm:fillClrLst meth="repeat">
-      <a:schemeClr val="accent1"/>
-    </dgm:fillClrLst>
-    <dgm:linClrLst meth="repeat">
-      <a:schemeClr val="accent1"/>
-    </dgm:linClrLst>
-    <dgm:effectClrLst/>
-    <dgm:txLinClrLst/>
-    <dgm:txFillClrLst meth="repeat">
-      <a:schemeClr val="lt1"/>
-    </dgm:txFillClrLst>
-    <dgm:txEffectClrLst/>
-  </dgm:styleLbl>
-  <dgm:styleLbl name="parChTrans2D3">
-    <dgm:fillClrLst meth="repeat">
-      <a:schemeClr val="accent1"/>
-    </dgm:fillClrLst>
-    <dgm:linClrLst meth="repeat">
-      <a:schemeClr val="accent1"/>
-    </dgm:linClrLst>
-    <dgm:effectClrLst/>
-    <dgm:txLinClrLst/>
-    <dgm:txFillClrLst meth="repeat">
-      <a:schemeClr val="lt1"/>
-    </dgm:txFillClrLst>
-    <dgm:txEffectClrLst/>
-  </dgm:styleLbl>
-  <dgm:styleLbl name="parChTrans2D4">
-    <dgm:fillClrLst meth="repeat">
-      <a:schemeClr val="accent1"/>
-    </dgm:fillClrLst>
-    <dgm:linClrLst meth="repeat">
-      <a:schemeClr val="accent1"/>
-    </dgm:linClrLst>
-    <dgm:effectClrLst/>
-    <dgm:txLinClrLst/>
-    <dgm:txFillClrLst meth="repeat">
-      <a:schemeClr val="lt1"/>
-    </dgm:txFillClrLst>
-    <dgm:txEffectClrLst/>
-  </dgm:styleLbl>
-  <dgm:styleLbl name="parChTrans1D1">
-    <dgm:fillClrLst meth="repeat">
-      <a:schemeClr val="accent1"/>
-    </dgm:fillClrLst>
-    <dgm:linClrLst meth="repeat">
-      <a:schemeClr val="accent1">
-        <a:shade val="60000"/>
-      </a:schemeClr>
-    </dgm:linClrLst>
-    <dgm:effectClrLst/>
-    <dgm:txLinClrLst/>
-    <dgm:txFillClrLst meth="repeat">
-      <a:schemeClr val="tx1"/>
-    </dgm:txFillClrLst>
-    <dgm:txEffectClrLst/>
-  </dgm:styleLbl>
-  <dgm:styleLbl name="parChTrans1D2">
-    <dgm:fillClrLst meth="repeat">
-      <a:schemeClr val="accent1"/>
-    </dgm:fillClrLst>
-    <dgm:linClrLst meth="repeat">
-      <a:schemeClr val="accent1">
-        <a:shade val="60000"/>
-      </a:schemeClr>
-    </dgm:linClrLst>
-    <dgm:effectClrLst/>
-    <dgm:txLinClrLst/>
-    <dgm:txFillClrLst meth="repeat">
-      <a:schemeClr val="tx1"/>
-    </dgm:txFillClrLst>
-    <dgm:txEffectClrLst/>
-  </dgm:styleLbl>
-  <dgm:styleLbl name="parChTrans1D3">
-    <dgm:fillClrLst meth="repeat">
-      <a:schemeClr val="accent1"/>
-    </dgm:fillClrLst>
-    <dgm:linClrLst meth="repeat">
-      <a:schemeClr val="accent1">
-        <a:shade val="80000"/>
-      </a:schemeClr>
-    </dgm:linClrLst>
-    <dgm:effectClrLst/>
-    <dgm:txLinClrLst/>
-    <dgm:txFillClrLst meth="repeat">
-      <a:schemeClr val="tx1"/>
-    </dgm:txFillClrLst>
-    <dgm:txEffectClrLst/>
-  </dgm:styleLbl>
-  <dgm:styleLbl name="parChTrans1D4">
-    <dgm:fillClrLst meth="repeat">
-      <a:schemeClr val="accent1"/>
-    </dgm:fillClrLst>
-    <dgm:linClrLst meth="repeat">
-      <a:schemeClr val="accent1">
-        <a:shade val="80000"/>
-      </a:schemeClr>
-    </dgm:linClrLst>
-    <dgm:effectClrLst/>
-    <dgm:txLinClrLst/>
-    <dgm:txFillClrLst meth="repeat">
-      <a:schemeClr val="tx1"/>
-    </dgm:txFillClrLst>
-    <dgm:txEffectClrLst/>
-  </dgm:styleLbl>
-  <dgm:styleLbl name="fgAcc1">
-    <dgm:fillClrLst meth="repeat">
-      <a:schemeClr val="lt1">
-        <a:alpha val="90000"/>
-      </a:schemeClr>
-    </dgm:fillClrLst>
-    <dgm:linClrLst meth="repeat">
-      <a:schemeClr val="accent1"/>
-    </dgm:linClrLst>
-    <dgm:effectClrLst/>
-    <dgm:txLinClrLst/>
-    <dgm:txFillClrLst meth="repeat">
-      <a:schemeClr val="dk1"/>
-    </dgm:txFillClrLst>
-    <dgm:txEffectClrLst/>
-  </dgm:styleLbl>
-  <dgm:styleLbl name="conFgAcc1">
-    <dgm:fillClrLst meth="repeat">
-      <a:schemeClr val="lt1">
-        <a:alpha val="90000"/>
-      </a:schemeClr>
-    </dgm:fillClrLst>
-    <dgm:linClrLst meth="repeat">
-      <a:schemeClr val="accent1"/>
-    </dgm:linClrLst>
-    <dgm:effectClrLst/>
-    <dgm:txLinClrLst/>
-    <dgm:txFillClrLst meth="repeat">
-      <a:schemeClr val="dk1"/>
-    </dgm:txFillClrLst>
-    <dgm:txEffectClrLst/>
-  </dgm:styleLbl>
-  <dgm:styleLbl name="alignAcc1">
-    <dgm:fillClrLst meth="repeat">
-      <a:schemeClr val="lt1">
-        <a:alpha val="90000"/>
-      </a:schemeClr>
-    </dgm:fillClrLst>
-    <dgm:linClrLst meth="repeat">
-      <a:schemeClr val="accent1"/>
-    </dgm:linClrLst>
-    <dgm:effectClrLst/>
-    <dgm:txLinClrLst/>
-    <dgm:txFillClrLst meth="repeat">
-      <a:schemeClr val="dk1"/>
-    </dgm:txFillClrLst>
-    <dgm:txEffectClrLst/>
-  </dgm:styleLbl>
-  <dgm:styleLbl name="trAlignAcc1">
-    <dgm:fillClrLst meth="repeat">
-      <a:schemeClr val="lt1">
-        <a:alpha val="40000"/>
-      </a:schemeClr>
-    </dgm:fillClrLst>
-    <dgm:linClrLst meth="repeat">
-      <a:schemeClr val="accent1"/>
-    </dgm:linClrLst>
-    <dgm:effectClrLst/>
-    <dgm:txLinClrLst/>
-    <dgm:txFillClrLst meth="repeat">
-      <a:schemeClr val="dk1"/>
-    </dgm:txFillClrLst>
-    <dgm:txEffectClrLst/>
-  </dgm:styleLbl>
-  <dgm:styleLbl name="bgAcc1">
-    <dgm:fillClrLst meth="repeat">
-      <a:schemeClr val="lt1">
-        <a:alpha val="90000"/>
-      </a:schemeClr>
-    </dgm:fillClrLst>
-    <dgm:linClrLst meth="repeat">
-      <a:schemeClr val="accent1"/>
-    </dgm:linClrLst>
-    <dgm:effectClrLst/>
-    <dgm:txLinClrLst/>
-    <dgm:txFillClrLst meth="repeat">
-      <a:schemeClr val="dk1"/>
-    </dgm:txFillClrLst>
-    <dgm:txEffectClrLst/>
-  </dgm:styleLbl>
-  <dgm:styleLbl name="solidFgAcc1">
-    <dgm:fillClrLst meth="repeat">
-      <a:schemeClr val="lt1"/>
-    </dgm:fillClrLst>
-    <dgm:linClrLst meth="repeat">
-      <a:schemeClr val="accent1"/>
-    </dgm:linClrLst>
-    <dgm:effectClrLst/>
-    <dgm:txLinClrLst/>
-    <dgm:txFillClrLst meth="repeat">
-      <a:schemeClr val="dk1"/>
-    </dgm:txFillClrLst>
-    <dgm:txEffectClrLst/>
-  </dgm:styleLbl>
-  <dgm:styleLbl name="solidAlignAcc1">
-    <dgm:fillClrLst meth="repeat">
-      <a:schemeClr val="lt1"/>
-    </dgm:fillClrLst>
-    <dgm:linClrLst meth="repeat">
-      <a:schemeClr val="accent1"/>
-    </dgm:linClrLst>
-    <dgm:effectClrLst/>
-    <dgm:txLinClrLst/>
-    <dgm:txFillClrLst meth="repeat">
-      <a:schemeClr val="dk1"/>
-    </dgm:txFillClrLst>
-    <dgm:txEffectClrLst/>
-  </dgm:styleLbl>
-  <dgm:styleLbl name="solidBgAcc1">
-    <dgm:fillClrLst meth="repeat">
-      <a:schemeClr val="lt1"/>
-    </dgm:fillClrLst>
-    <dgm:linClrLst meth="repeat">
-      <a:schemeClr val="accent1"/>
-    </dgm:linClrLst>
-    <dgm:effectClrLst/>
-    <dgm:txLinClrLst/>
-    <dgm:txFillClrLst meth="repeat">
-      <a:schemeClr val="dk1"/>
-    </dgm:txFillClrLst>
-    <dgm:txEffectClrLst/>
-  </dgm:styleLbl>
-  <dgm:styleLbl name="fgAccFollowNode1">
-    <dgm:fillClrLst meth="repeat">
-      <a:schemeClr val="accent1">
-        <a:alpha val="90000"/>
-        <a:tint val="40000"/>
-      </a:schemeClr>
-    </dgm:fillClrLst>
-    <dgm:linClrLst meth="repeat">
-      <a:schemeClr val="accent1">
-        <a:alpha val="90000"/>
-        <a:tint val="40000"/>
-      </a:schemeClr>
-    </dgm:linClrLst>
-    <dgm:effectClrLst/>
-    <dgm:txLinClrLst/>
-    <dgm:txFillClrLst meth="repeat">
-      <a:schemeClr val="dk1"/>
-    </dgm:txFillClrLst>
-    <dgm:txEffectClrLst/>
-  </dgm:styleLbl>
-  <dgm:styleLbl name="alignAccFollowNode1">
-    <dgm:fillClrLst meth="repeat">
-      <a:schemeClr val="accent1">
-        <a:alpha val="90000"/>
-        <a:tint val="40000"/>
-      </a:schemeClr>
-    </dgm:fillClrLst>
-    <dgm:linClrLst meth="repeat">
-      <a:schemeClr val="accent1">
-        <a:alpha val="90000"/>
-        <a:tint val="40000"/>
-      </a:schemeClr>
-    </dgm:linClrLst>
-    <dgm:effectClrLst/>
-    <dgm:txLinClrLst/>
-    <dgm:txFillClrLst meth="repeat">
-      <a:schemeClr val="dk1"/>
-    </dgm:txFillClrLst>
-    <dgm:txEffectClrLst/>
-  </dgm:styleLbl>
-  <dgm:styleLbl name="bgAccFollowNode1">
-    <dgm:fillClrLst meth="repeat">
-      <a:schemeClr val="accent1">
-        <a:alpha val="90000"/>
-        <a:tint val="40000"/>
-      </a:schemeClr>
-    </dgm:fillClrLst>
-    <dgm:linClrLst meth="repeat">
-      <a:schemeClr val="accent1">
-        <a:alpha val="90000"/>
-        <a:tint val="40000"/>
-      </a:schemeClr>
-    </dgm:linClrLst>
-    <dgm:effectClrLst/>
-    <dgm:txLinClrLst/>
-    <dgm:txFillClrLst meth="repeat">
-      <a:schemeClr val="dk1"/>
-    </dgm:txFillClrLst>
-    <dgm:txEffectClrLst/>
-  </dgm:styleLbl>
-  <dgm:styleLbl name="fgAcc0">
-    <dgm:fillClrLst meth="repeat">
-      <a:schemeClr val="lt1">
-        <a:alpha val="90000"/>
-      </a:schemeClr>
-    </dgm:fillClrLst>
-    <dgm:linClrLst meth="repeat">
-      <a:schemeClr val="accent1"/>
-    </dgm:linClrLst>
-    <dgm:effectClrLst/>
-    <dgm:txLinClrLst/>
-    <dgm:txFillClrLst meth="repeat">
-      <a:schemeClr val="dk1"/>
-    </dgm:txFillClrLst>
-    <dgm:txEffectClrLst/>
-  </dgm:styleLbl>
-  <dgm:styleLbl name="fgAcc2">
-    <dgm:fillClrLst meth="repeat">
-      <a:schemeClr val="lt1">
-        <a:alpha val="90000"/>
-      </a:schemeClr>
-    </dgm:fillClrLst>
-    <dgm:linClrLst meth="repeat">
-      <a:schemeClr val="accent1"/>
-    </dgm:linClrLst>
-    <dgm:effectClrLst/>
-    <dgm:txLinClrLst/>
-    <dgm:txFillClrLst meth="repeat">
-      <a:schemeClr val="dk1"/>
-    </dgm:txFillClrLst>
-    <dgm:txEffectClrLst/>
-  </dgm:styleLbl>
-  <dgm:styleLbl name="fgAcc3">
-    <dgm:fillClrLst meth="repeat">
-      <a:schemeClr val="lt1">
-        <a:alpha val="90000"/>
-      </a:schemeClr>
-    </dgm:fillClrLst>
-    <dgm:linClrLst meth="repeat">
-      <a:schemeClr val="accent1"/>
-    </dgm:linClrLst>
-    <dgm:effectClrLst/>
-    <dgm:txLinClrLst/>
-    <dgm:txFillClrLst meth="repeat">
-      <a:schemeClr val="dk1"/>
-    </dgm:txFillClrLst>
-    <dgm:txEffectClrLst/>
-  </dgm:styleLbl>
-  <dgm:styleLbl name="fgAcc4">
-    <dgm:fillClrLst meth="repeat">
-      <a:schemeClr val="lt1">
-        <a:alpha val="90000"/>
-      </a:schemeClr>
-    </dgm:fillClrLst>
-    <dgm:linClrLst meth="repeat">
-      <a:schemeClr val="accent1"/>
-    </dgm:linClrLst>
-    <dgm:effectClrLst/>
-    <dgm:txLinClrLst/>
-    <dgm:txFillClrLst meth="repeat">
-      <a:schemeClr val="dk1"/>
-    </dgm:txFillClrLst>
-    <dgm:txEffectClrLst/>
-  </dgm:styleLbl>
-  <dgm:styleLbl name="bgShp">
-    <dgm:fillClrLst meth="repeat">
-      <a:schemeClr val="accent1">
-        <a:tint val="40000"/>
-      </a:schemeClr>
-    </dgm:fillClrLst>
-    <dgm:linClrLst meth="repeat">
-      <a:schemeClr val="accent1"/>
-    </dgm:linClrLst>
-    <dgm:effectClrLst/>
-    <dgm:txLinClrLst/>
-    <dgm:txFillClrLst meth="repeat">
-      <a:schemeClr val="dk1"/>
-    </dgm:txFillClrLst>
-    <dgm:txEffectClrLst/>
-  </dgm:styleLbl>
-  <dgm:styleLbl name="dkBgShp">
-    <dgm:fillClrLst meth="repeat">
-      <a:schemeClr val="accent1">
-        <a:shade val="80000"/>
-      </a:schemeClr>
-    </dgm:fillClrLst>
-    <dgm:linClrLst meth="repeat">
-      <a:schemeClr val="accent1"/>
-    </dgm:linClrLst>
-    <dgm:effectClrLst/>
-    <dgm:txLinClrLst/>
-    <dgm:txFillClrLst meth="repeat">
-      <a:schemeClr val="lt1"/>
-    </dgm:txFillClrLst>
-    <dgm:txEffectClrLst/>
-  </dgm:styleLbl>
-  <dgm:styleLbl name="trBgShp">
-    <dgm:fillClrLst meth="repeat">
-      <a:schemeClr val="accent1">
-        <a:tint val="50000"/>
-        <a:alpha val="40000"/>
-      </a:schemeClr>
-    </dgm:fillClrLst>
-    <dgm:linClrLst meth="repeat">
-      <a:schemeClr val="accent1"/>
-    </dgm:linClrLst>
-    <dgm:effectClrLst/>
-    <dgm:txLinClrLst/>
-    <dgm:txFillClrLst meth="repeat">
-      <a:schemeClr val="lt1"/>
-    </dgm:txFillClrLst>
-    <dgm:txEffectClrLst/>
-  </dgm:styleLbl>
-  <dgm:styleLbl name="fgShp">
-    <dgm:fillClrLst meth="repeat">
-      <a:schemeClr val="accent1">
-        <a:tint val="60000"/>
-      </a:schemeClr>
-    </dgm:fillClrLst>
-    <dgm:linClrLst meth="repeat">
-      <a:schemeClr val="lt1"/>
-    </dgm:linClrLst>
-    <dgm:effectClrLst/>
-    <dgm:txLinClrLst/>
-    <dgm:txFillClrLst meth="repeat">
-      <a:schemeClr val="dk1"/>
-    </dgm:txFillClrLst>
-    <dgm:txEffectClrLst/>
-  </dgm:styleLbl>
-  <dgm:styleLbl name="revTx">
-    <dgm:fillClrLst meth="repeat">
-      <a:schemeClr val="lt1">
-        <a:alpha val="0"/>
-      </a:schemeClr>
-    </dgm:fillClrLst>
-    <dgm:linClrLst meth="repeat">
-      <a:schemeClr val="dk1">
-        <a:alpha val="0"/>
-      </a:schemeClr>
-    </dgm:linClrLst>
-    <dgm:effectClrLst/>
-    <dgm:txLinClrLst/>
-    <dgm:txFillClrLst meth="repeat">
-      <a:schemeClr val="tx1"/>
-    </dgm:txFillClrLst>
-    <dgm:txEffectClrLst/>
-  </dgm:styleLbl>
-</dgm:colorsDef>
-</file>
-
 <file path=ppt/diagrams/data1.xml><?xml version="1.0" encoding="utf-8"?>
-<dgm:dataModel xmlns:dgm="http://schemas.openxmlformats.org/drawingml/2006/diagram" xmlns:a="http://schemas.openxmlformats.org/drawingml/2006/main">
-  <dgm:ptLst>
-    <dgm:pt modelId="{D7951F77-4E36-4893-91C6-3151A6D51694}" type="doc">
-      <dgm:prSet loTypeId="urn:microsoft.com/office/officeart/2018/5/layout/IconCircleLabelList" loCatId="icon" qsTypeId="urn:microsoft.com/office/officeart/2005/8/quickstyle/simple1" qsCatId="simple" csTypeId="urn:microsoft.com/office/officeart/2018/5/colors/Iconchunking_neutralicon_colorful1" csCatId="colorful" phldr="1"/>
-      <dgm:spPr/>
-      <dgm:t>
-        <a:bodyPr/>
-        <a:lstStyle/>
-        <a:p>
-          <a:endParaRPr lang="en-US"/>
-        </a:p>
-      </dgm:t>
-    </dgm:pt>
-    <dgm:pt modelId="{65B3944D-D926-4D0F-A305-F5740000747A}">
-      <dgm:prSet custT="1"/>
-      <dgm:spPr>
-        <a:xfrm>
-          <a:off x="1144111" y="1954"/>
-          <a:ext cx="5868258" cy="990573"/>
-        </a:xfrm>
-      </dgm:spPr>
-      <dgm:t>
-        <a:bodyPr/>
-        <a:lstStyle/>
-        <a:p>
-          <a:pPr>
-            <a:lnSpc>
-              <a:spcPct val="100000"/>
-            </a:lnSpc>
-            <a:defRPr cap="all"/>
-          </a:pPr>
-          <a:r>
-            <a:rPr lang="en-US" sz="1600" b="1" dirty="0">
-              <a:latin typeface="+mj-lt"/>
-              <a:ea typeface="+mn-ea"/>
-              <a:cs typeface="+mn-cs"/>
-            </a:rPr>
-            <a:t>LinkedIn</a:t>
-          </a:r>
-          <a:br>
-            <a:rPr lang="en-US" sz="1600" dirty="0">
-              <a:latin typeface="+mj-lt"/>
-              <a:ea typeface="+mn-ea"/>
-              <a:cs typeface="+mn-cs"/>
-            </a:rPr>
-          </a:br>
-          <a:r>
-            <a:rPr lang="en-US" sz="1600" cap="none" dirty="0">
-              <a:latin typeface="+mj-lt"/>
-              <a:ea typeface="+mn-ea"/>
-              <a:cs typeface="+mn-cs"/>
-            </a:rPr>
-            <a:t>ANGELICAASTROM</a:t>
-          </a:r>
-          <a:endParaRPr lang="en-US" sz="1600" dirty="0">
-            <a:latin typeface="+mj-lt"/>
-            <a:ea typeface="+mn-ea"/>
-            <a:cs typeface="+mn-cs"/>
-          </a:endParaRPr>
-        </a:p>
-      </dgm:t>
-    </dgm:pt>
-    <dgm:pt modelId="{2EA7AC4A-E82B-43F0-A6EA-F599428578FC}" type="parTrans" cxnId="{92D3A76D-ADBB-49F3-861D-D2B74F81812E}">
-      <dgm:prSet/>
-      <dgm:spPr/>
-      <dgm:t>
-        <a:bodyPr/>
-        <a:lstStyle/>
-        <a:p>
-          <a:endParaRPr lang="en-US" sz="1400">
-            <a:latin typeface="+mj-lt"/>
-          </a:endParaRPr>
-        </a:p>
-      </dgm:t>
-    </dgm:pt>
-    <dgm:pt modelId="{8862CE7B-AE72-45E8-B982-5279C14F7985}" type="sibTrans" cxnId="{92D3A76D-ADBB-49F3-861D-D2B74F81812E}">
-      <dgm:prSet/>
-      <dgm:spPr/>
-      <dgm:t>
-        <a:bodyPr/>
-        <a:lstStyle/>
-        <a:p>
-          <a:endParaRPr lang="en-US" sz="1400">
-            <a:latin typeface="+mj-lt"/>
-          </a:endParaRPr>
-        </a:p>
-      </dgm:t>
-    </dgm:pt>
-    <dgm:pt modelId="{223932EA-8A4D-4270-95C3-913761557237}">
-      <dgm:prSet custT="1"/>
-      <dgm:spPr>
-        <a:xfrm>
-          <a:off x="1144111" y="1240170"/>
-          <a:ext cx="5868258" cy="990573"/>
-        </a:xfrm>
-      </dgm:spPr>
-      <dgm:t>
-        <a:bodyPr/>
-        <a:lstStyle/>
-        <a:p>
-          <a:pPr>
-            <a:lnSpc>
-              <a:spcPct val="100000"/>
-            </a:lnSpc>
-            <a:defRPr cap="all"/>
-          </a:pPr>
-          <a:r>
-            <a:rPr lang="en-US" sz="1600" b="1" dirty="0">
-              <a:latin typeface="+mj-lt"/>
-              <a:ea typeface="+mn-ea"/>
-              <a:cs typeface="+mn-cs"/>
-            </a:rPr>
-            <a:t>Twitter</a:t>
-          </a:r>
-          <a:br>
-            <a:rPr lang="en-US" sz="1600" dirty="0">
-              <a:latin typeface="+mj-lt"/>
-              <a:ea typeface="+mn-ea"/>
-              <a:cs typeface="+mn-cs"/>
-            </a:rPr>
-          </a:br>
-          <a:r>
-            <a:rPr lang="en-US" sz="1600" dirty="0">
-              <a:latin typeface="+mj-lt"/>
-              <a:ea typeface="+mn-ea"/>
-              <a:cs typeface="+mn-cs"/>
-            </a:rPr>
-            <a:t>@</a:t>
-          </a:r>
-          <a:r>
-            <a:rPr lang="en-US" sz="1600" cap="none" dirty="0">
-              <a:latin typeface="+mj-lt"/>
-              <a:ea typeface="+mn-ea"/>
-              <a:cs typeface="+mn-cs"/>
-            </a:rPr>
-            <a:t>AASTROM</a:t>
-          </a:r>
-          <a:endParaRPr lang="en-US" sz="1600" dirty="0">
-            <a:latin typeface="+mj-lt"/>
-            <a:ea typeface="+mn-ea"/>
-            <a:cs typeface="+mn-cs"/>
-          </a:endParaRPr>
-        </a:p>
-      </dgm:t>
-    </dgm:pt>
-    <dgm:pt modelId="{E01D4CB3-97D0-4857-AF09-DED2BE24BAAC}" type="parTrans" cxnId="{E37D9CF8-DFE4-4379-9C72-27346573699A}">
-      <dgm:prSet/>
-      <dgm:spPr/>
-      <dgm:t>
-        <a:bodyPr/>
-        <a:lstStyle/>
-        <a:p>
-          <a:endParaRPr lang="en-US" sz="1400">
-            <a:latin typeface="+mj-lt"/>
-          </a:endParaRPr>
-        </a:p>
-      </dgm:t>
-    </dgm:pt>
-    <dgm:pt modelId="{C201C5C8-D4F2-4559-AF23-68BB4B3E7FB1}" type="sibTrans" cxnId="{E37D9CF8-DFE4-4379-9C72-27346573699A}">
-      <dgm:prSet/>
-      <dgm:spPr/>
-      <dgm:t>
-        <a:bodyPr/>
-        <a:lstStyle/>
-        <a:p>
-          <a:endParaRPr lang="en-US" sz="1400">
-            <a:latin typeface="+mj-lt"/>
-          </a:endParaRPr>
-        </a:p>
-      </dgm:t>
-    </dgm:pt>
-    <dgm:pt modelId="{BC68B812-A325-41D8-A08E-C2392666DF66}">
-      <dgm:prSet custT="1"/>
-      <dgm:spPr>
-        <a:xfrm>
-          <a:off x="1144111" y="2478387"/>
-          <a:ext cx="5868258" cy="990573"/>
-        </a:xfrm>
-      </dgm:spPr>
-      <dgm:t>
-        <a:bodyPr/>
-        <a:lstStyle/>
-        <a:p>
-          <a:pPr>
-            <a:lnSpc>
-              <a:spcPct val="100000"/>
-            </a:lnSpc>
-            <a:defRPr cap="all"/>
-          </a:pPr>
-          <a:r>
-            <a:rPr lang="en-US" sz="1600" b="1" dirty="0">
-              <a:latin typeface="+mj-lt"/>
-              <a:ea typeface="+mn-ea"/>
-              <a:cs typeface="+mn-cs"/>
-            </a:rPr>
-            <a:t>Email</a:t>
-          </a:r>
-          <a:br>
-            <a:rPr lang="en-US" sz="1600" dirty="0">
-              <a:latin typeface="+mj-lt"/>
-              <a:ea typeface="+mn-ea"/>
-              <a:cs typeface="+mn-cs"/>
-            </a:rPr>
-          </a:br>
-          <a:r>
-            <a:rPr lang="en-US" sz="1600" dirty="0">
-              <a:latin typeface="+mj-lt"/>
-              <a:ea typeface="+mn-ea"/>
-              <a:cs typeface="+mn-cs"/>
-            </a:rPr>
-            <a:t>ANGELCIA@contoso.com</a:t>
-          </a:r>
-        </a:p>
-      </dgm:t>
-    </dgm:pt>
-    <dgm:pt modelId="{23A01A1D-B409-49E7-91BA-2321B9A237C2}" type="parTrans" cxnId="{AAD26E9B-C129-46B7-BFCC-98D5999B6B9A}">
-      <dgm:prSet/>
-      <dgm:spPr/>
-      <dgm:t>
-        <a:bodyPr/>
-        <a:lstStyle/>
-        <a:p>
-          <a:endParaRPr lang="en-US" sz="1400">
-            <a:latin typeface="+mj-lt"/>
-          </a:endParaRPr>
-        </a:p>
-      </dgm:t>
-    </dgm:pt>
-    <dgm:pt modelId="{E950D3C2-0472-429B-98B0-86C856FA65A1}" type="sibTrans" cxnId="{AAD26E9B-C129-46B7-BFCC-98D5999B6B9A}">
-      <dgm:prSet/>
-      <dgm:spPr/>
-      <dgm:t>
-        <a:bodyPr/>
-        <a:lstStyle/>
-        <a:p>
-          <a:endParaRPr lang="en-US" sz="1400">
-            <a:latin typeface="+mj-lt"/>
-          </a:endParaRPr>
-        </a:p>
-      </dgm:t>
-    </dgm:pt>
-    <dgm:pt modelId="{7D1766B6-66CF-40CE-9693-BD20AFFFA3C9}">
-      <dgm:prSet custT="1"/>
-      <dgm:spPr>
-        <a:xfrm>
-          <a:off x="1144111" y="3716603"/>
-          <a:ext cx="5868258" cy="990573"/>
-        </a:xfrm>
-      </dgm:spPr>
-      <dgm:t>
-        <a:bodyPr/>
-        <a:lstStyle/>
-        <a:p>
-          <a:pPr>
-            <a:lnSpc>
-              <a:spcPct val="100000"/>
-            </a:lnSpc>
-            <a:defRPr cap="all"/>
-          </a:pPr>
-          <a:r>
-            <a:rPr lang="en-US" sz="1600" b="1" dirty="0">
-              <a:latin typeface="+mj-lt"/>
-              <a:ea typeface="+mn-ea"/>
-              <a:cs typeface="+mn-cs"/>
-            </a:rPr>
-            <a:t>Phone</a:t>
-          </a:r>
-          <a:br>
-            <a:rPr lang="en-US" sz="1600" dirty="0">
-              <a:latin typeface="+mj-lt"/>
-              <a:ea typeface="+mn-ea"/>
-              <a:cs typeface="+mn-cs"/>
-            </a:rPr>
-          </a:br>
-          <a:r>
-            <a:rPr lang="en-US" sz="1600" dirty="0">
-              <a:latin typeface="+mj-lt"/>
-              <a:ea typeface="+mn-ea"/>
-              <a:cs typeface="+mn-cs"/>
-            </a:rPr>
-            <a:t>231-555-0188</a:t>
-          </a:r>
-        </a:p>
-      </dgm:t>
-    </dgm:pt>
-    <dgm:pt modelId="{76694DF4-F7BE-4AF1-9E12-BAEDD42D9ED3}" type="parTrans" cxnId="{EA0F618E-4C96-42F0-9E3C-66B0158BCCBE}">
-      <dgm:prSet/>
-      <dgm:spPr/>
-      <dgm:t>
-        <a:bodyPr/>
-        <a:lstStyle/>
-        <a:p>
-          <a:endParaRPr lang="en-US" sz="1400">
-            <a:latin typeface="+mj-lt"/>
-          </a:endParaRPr>
-        </a:p>
-      </dgm:t>
-    </dgm:pt>
-    <dgm:pt modelId="{0C6A2CC7-5741-4D63-A8FF-E7E06F0D1222}" type="sibTrans" cxnId="{EA0F618E-4C96-42F0-9E3C-66B0158BCCBE}">
-      <dgm:prSet/>
-      <dgm:spPr/>
-      <dgm:t>
-        <a:bodyPr/>
-        <a:lstStyle/>
-        <a:p>
-          <a:endParaRPr lang="en-US" sz="1400">
-            <a:latin typeface="+mj-lt"/>
-          </a:endParaRPr>
-        </a:p>
-      </dgm:t>
-    </dgm:pt>
-    <dgm:pt modelId="{F899A4D3-2C9C-4287-A235-DE3E047E7C22}" type="pres">
-      <dgm:prSet presAssocID="{D7951F77-4E36-4893-91C6-3151A6D51694}" presName="root" presStyleCnt="0">
-        <dgm:presLayoutVars>
-          <dgm:dir/>
-          <dgm:resizeHandles val="exact"/>
-        </dgm:presLayoutVars>
-      </dgm:prSet>
-      <dgm:spPr/>
-    </dgm:pt>
-    <dgm:pt modelId="{0094CD39-7002-4B5E-877D-02B6B0E6C685}" type="pres">
-      <dgm:prSet presAssocID="{65B3944D-D926-4D0F-A305-F5740000747A}" presName="compNode" presStyleCnt="0"/>
-      <dgm:spPr/>
-    </dgm:pt>
-    <dgm:pt modelId="{C9BCC0A7-4EA9-444D-A661-6CD0349FA8B7}" type="pres">
-      <dgm:prSet presAssocID="{65B3944D-D926-4D0F-A305-F5740000747A}" presName="iconBgRect" presStyleLbl="bgShp" presStyleIdx="0" presStyleCnt="4"/>
-      <dgm:spPr>
-        <a:noFill/>
-      </dgm:spPr>
-    </dgm:pt>
-    <dgm:pt modelId="{9F9A0A13-80DE-4152-AD0B-F1B57BDDE11D}" type="pres">
-      <dgm:prSet presAssocID="{65B3944D-D926-4D0F-A305-F5740000747A}" presName="iconRect" presStyleLbl="node1" presStyleIdx="0" presStyleCnt="4"/>
-      <dgm:spPr>
-        <a:blipFill>
-          <a:blip xmlns:r="http://schemas.openxmlformats.org/officeDocument/2006/relationships" r:embed="rId1">
-            <a:extLst>
-              <a:ext uri="{28A0092B-C50C-407E-A947-70E740481C1C}">
-                <a14:useLocalDpi xmlns:a14="http://schemas.microsoft.com/office/drawing/2010/main"/>
-              </a:ext>
-              <a:ext uri="{96DAC541-7B7A-43D3-8B79-37D633B846F1}">
-                <asvg:svgBlip xmlns:asvg="http://schemas.microsoft.com/office/drawing/2016/SVG/main" r:embed="rId2"/>
-              </a:ext>
-            </a:extLst>
-          </a:blip>
-          <a:stretch>
-            <a:fillRect/>
-          </a:stretch>
-        </a:blipFill>
-        <a:ln>
-          <a:noFill/>
-        </a:ln>
-      </dgm:spPr>
-      <dgm:extLst>
-        <a:ext uri="{E40237B7-FDA0-4F09-8148-C483321AD2D9}">
-          <dgm14:cNvPr xmlns:dgm14="http://schemas.microsoft.com/office/drawing/2010/diagram" id="0" name="" descr="Connected"/>
-        </a:ext>
-      </dgm:extLst>
-    </dgm:pt>
-    <dgm:pt modelId="{A480AFC6-EE27-4614-AC1B-B7796E444EDF}" type="pres">
-      <dgm:prSet presAssocID="{65B3944D-D926-4D0F-A305-F5740000747A}" presName="spaceRect" presStyleCnt="0"/>
-      <dgm:spPr/>
-    </dgm:pt>
-    <dgm:pt modelId="{9053032A-E668-4011-8EE5-5E356FF2FB6B}" type="pres">
-      <dgm:prSet presAssocID="{65B3944D-D926-4D0F-A305-F5740000747A}" presName="textRect" presStyleLbl="revTx" presStyleIdx="0" presStyleCnt="4" custScaleX="120071">
-        <dgm:presLayoutVars>
-          <dgm:chMax val="1"/>
-          <dgm:chPref val="1"/>
-        </dgm:presLayoutVars>
-      </dgm:prSet>
-      <dgm:spPr>
-        <a:prstGeom prst="rect">
-          <a:avLst/>
-        </a:prstGeom>
-      </dgm:spPr>
-    </dgm:pt>
-    <dgm:pt modelId="{BC6E504E-B169-4B61-85D7-51520F2B9743}" type="pres">
-      <dgm:prSet presAssocID="{8862CE7B-AE72-45E8-B982-5279C14F7985}" presName="sibTrans" presStyleCnt="0"/>
-      <dgm:spPr/>
-    </dgm:pt>
-    <dgm:pt modelId="{14D15476-F474-46D7-B177-F8E40796FE35}" type="pres">
-      <dgm:prSet presAssocID="{223932EA-8A4D-4270-95C3-913761557237}" presName="compNode" presStyleCnt="0"/>
-      <dgm:spPr/>
-    </dgm:pt>
-    <dgm:pt modelId="{1FC3D828-343B-42C4-A35E-FB3CAA3FB1B3}" type="pres">
-      <dgm:prSet presAssocID="{223932EA-8A4D-4270-95C3-913761557237}" presName="iconBgRect" presStyleLbl="bgShp" presStyleIdx="1" presStyleCnt="4"/>
-      <dgm:spPr>
-        <a:noFill/>
-      </dgm:spPr>
-    </dgm:pt>
-    <dgm:pt modelId="{902713CB-D896-458F-B8DA-F1C1FC1C9B5E}" type="pres">
-      <dgm:prSet presAssocID="{223932EA-8A4D-4270-95C3-913761557237}" presName="iconRect" presStyleLbl="node1" presStyleIdx="1" presStyleCnt="4"/>
-      <dgm:spPr>
-        <a:blipFill>
-          <a:blip xmlns:r="http://schemas.openxmlformats.org/officeDocument/2006/relationships" r:embed="rId3">
-            <a:extLst>
-              <a:ext uri="{28A0092B-C50C-407E-A947-70E740481C1C}">
-                <a14:useLocalDpi xmlns:a14="http://schemas.microsoft.com/office/drawing/2010/main"/>
-              </a:ext>
-              <a:ext uri="{96DAC541-7B7A-43D3-8B79-37D633B846F1}">
-                <asvg:svgBlip xmlns:asvg="http://schemas.microsoft.com/office/drawing/2016/SVG/main" r:embed="rId4"/>
-              </a:ext>
-            </a:extLst>
-          </a:blip>
-          <a:stretch>
-            <a:fillRect/>
-          </a:stretch>
-        </a:blipFill>
-        <a:ln>
-          <a:noFill/>
-        </a:ln>
-      </dgm:spPr>
-      <dgm:extLst>
-        <a:ext uri="{E40237B7-FDA0-4F09-8148-C483321AD2D9}">
-          <dgm14:cNvPr xmlns:dgm14="http://schemas.microsoft.com/office/drawing/2010/diagram" id="0" name="" descr="Questions"/>
-        </a:ext>
-      </dgm:extLst>
-    </dgm:pt>
-    <dgm:pt modelId="{0C624B3C-0EA4-4983-B87C-0B5532036A83}" type="pres">
-      <dgm:prSet presAssocID="{223932EA-8A4D-4270-95C3-913761557237}" presName="spaceRect" presStyleCnt="0"/>
-      <dgm:spPr/>
-    </dgm:pt>
-    <dgm:pt modelId="{1A37C356-0854-4A55-859A-10DB397A3024}" type="pres">
-      <dgm:prSet presAssocID="{223932EA-8A4D-4270-95C3-913761557237}" presName="textRect" presStyleLbl="revTx" presStyleIdx="1" presStyleCnt="4">
-        <dgm:presLayoutVars>
-          <dgm:chMax val="1"/>
-          <dgm:chPref val="1"/>
-        </dgm:presLayoutVars>
-      </dgm:prSet>
-      <dgm:spPr>
-        <a:prstGeom prst="rect">
-          <a:avLst/>
-        </a:prstGeom>
-      </dgm:spPr>
-    </dgm:pt>
-    <dgm:pt modelId="{13F17AF8-950C-456F-AC54-760BBE52F290}" type="pres">
-      <dgm:prSet presAssocID="{C201C5C8-D4F2-4559-AF23-68BB4B3E7FB1}" presName="sibTrans" presStyleCnt="0"/>
-      <dgm:spPr/>
-    </dgm:pt>
-    <dgm:pt modelId="{EA4BD492-063C-4B67-B2F7-C08CB328337E}" type="pres">
-      <dgm:prSet presAssocID="{BC68B812-A325-41D8-A08E-C2392666DF66}" presName="compNode" presStyleCnt="0"/>
-      <dgm:spPr/>
-    </dgm:pt>
-    <dgm:pt modelId="{AA942612-CA7A-414A-8A41-5AF47E8BF18D}" type="pres">
-      <dgm:prSet presAssocID="{BC68B812-A325-41D8-A08E-C2392666DF66}" presName="iconBgRect" presStyleLbl="bgShp" presStyleIdx="2" presStyleCnt="4"/>
-      <dgm:spPr>
-        <a:noFill/>
-      </dgm:spPr>
-    </dgm:pt>
-    <dgm:pt modelId="{501CE67F-3782-42E8-B14B-7322FA3A6AF9}" type="pres">
-      <dgm:prSet presAssocID="{BC68B812-A325-41D8-A08E-C2392666DF66}" presName="iconRect" presStyleLbl="node1" presStyleIdx="2" presStyleCnt="4"/>
-      <dgm:spPr>
-        <a:blipFill>
-          <a:blip xmlns:r="http://schemas.openxmlformats.org/officeDocument/2006/relationships" r:embed="rId5">
-            <a:extLst>
-              <a:ext uri="{28A0092B-C50C-407E-A947-70E740481C1C}">
-                <a14:useLocalDpi xmlns:a14="http://schemas.microsoft.com/office/drawing/2010/main"/>
-              </a:ext>
-              <a:ext uri="{96DAC541-7B7A-43D3-8B79-37D633B846F1}">
-                <asvg:svgBlip xmlns:asvg="http://schemas.microsoft.com/office/drawing/2016/SVG/main" r:embed="rId6"/>
-              </a:ext>
-            </a:extLst>
-          </a:blip>
-          <a:stretch>
-            <a:fillRect/>
-          </a:stretch>
-        </a:blipFill>
-        <a:ln>
-          <a:noFill/>
-        </a:ln>
-      </dgm:spPr>
-      <dgm:extLst>
-        <a:ext uri="{E40237B7-FDA0-4F09-8148-C483321AD2D9}">
-          <dgm14:cNvPr xmlns:dgm14="http://schemas.microsoft.com/office/drawing/2010/diagram" id="0" name="" descr="Email"/>
-        </a:ext>
-      </dgm:extLst>
-    </dgm:pt>
-    <dgm:pt modelId="{4DD1F19D-F3F5-4EAE-8108-BE4892B97AFD}" type="pres">
-      <dgm:prSet presAssocID="{BC68B812-A325-41D8-A08E-C2392666DF66}" presName="spaceRect" presStyleCnt="0"/>
-      <dgm:spPr/>
-    </dgm:pt>
-    <dgm:pt modelId="{9E96DB26-9770-4D6D-9455-A20B7E0EBF8C}" type="pres">
-      <dgm:prSet presAssocID="{BC68B812-A325-41D8-A08E-C2392666DF66}" presName="textRect" presStyleLbl="revTx" presStyleIdx="2" presStyleCnt="4" custScaleX="160329">
-        <dgm:presLayoutVars>
-          <dgm:chMax val="1"/>
-          <dgm:chPref val="1"/>
-        </dgm:presLayoutVars>
-      </dgm:prSet>
-      <dgm:spPr>
-        <a:prstGeom prst="rect">
-          <a:avLst/>
-        </a:prstGeom>
-      </dgm:spPr>
-    </dgm:pt>
-    <dgm:pt modelId="{26C2295D-42E0-41C5-8B47-C82164646E5C}" type="pres">
-      <dgm:prSet presAssocID="{E950D3C2-0472-429B-98B0-86C856FA65A1}" presName="sibTrans" presStyleCnt="0"/>
-      <dgm:spPr/>
-    </dgm:pt>
-    <dgm:pt modelId="{B35AC086-3D53-473A-9AC9-09E397585F82}" type="pres">
-      <dgm:prSet presAssocID="{7D1766B6-66CF-40CE-9693-BD20AFFFA3C9}" presName="compNode" presStyleCnt="0"/>
-      <dgm:spPr/>
-    </dgm:pt>
-    <dgm:pt modelId="{AB9CFA30-80BB-4CBE-9CD8-BDB5E9753036}" type="pres">
-      <dgm:prSet presAssocID="{7D1766B6-66CF-40CE-9693-BD20AFFFA3C9}" presName="iconBgRect" presStyleLbl="bgShp" presStyleIdx="3" presStyleCnt="4"/>
-      <dgm:spPr>
-        <a:noFill/>
-      </dgm:spPr>
-    </dgm:pt>
-    <dgm:pt modelId="{3B505E4C-CA1F-4180-AD3B-9413D55B103E}" type="pres">
-      <dgm:prSet presAssocID="{7D1766B6-66CF-40CE-9693-BD20AFFFA3C9}" presName="iconRect" presStyleLbl="node1" presStyleIdx="3" presStyleCnt="4"/>
-      <dgm:spPr>
-        <a:blipFill>
-          <a:blip xmlns:r="http://schemas.openxmlformats.org/officeDocument/2006/relationships" r:embed="rId7">
-            <a:extLst>
-              <a:ext uri="{28A0092B-C50C-407E-A947-70E740481C1C}">
-                <a14:useLocalDpi xmlns:a14="http://schemas.microsoft.com/office/drawing/2010/main"/>
-              </a:ext>
-              <a:ext uri="{96DAC541-7B7A-43D3-8B79-37D633B846F1}">
-                <asvg:svgBlip xmlns:asvg="http://schemas.microsoft.com/office/drawing/2016/SVG/main" r:embed="rId8"/>
-              </a:ext>
-            </a:extLst>
-          </a:blip>
-          <a:stretch>
-            <a:fillRect/>
-          </a:stretch>
-        </a:blipFill>
-        <a:ln>
-          <a:noFill/>
-        </a:ln>
-      </dgm:spPr>
-      <dgm:extLst>
-        <a:ext uri="{E40237B7-FDA0-4F09-8148-C483321AD2D9}">
-          <dgm14:cNvPr xmlns:dgm14="http://schemas.microsoft.com/office/drawing/2010/diagram" id="0" name="" descr="Smart Phone"/>
-        </a:ext>
-      </dgm:extLst>
-    </dgm:pt>
-    <dgm:pt modelId="{2A52F42F-EEA0-44B3-B748-B3BEB14B1E36}" type="pres">
-      <dgm:prSet presAssocID="{7D1766B6-66CF-40CE-9693-BD20AFFFA3C9}" presName="spaceRect" presStyleCnt="0"/>
-      <dgm:spPr/>
-    </dgm:pt>
-    <dgm:pt modelId="{7DA92A6E-F038-46D1-A456-33051C764A8B}" type="pres">
-      <dgm:prSet presAssocID="{7D1766B6-66CF-40CE-9693-BD20AFFFA3C9}" presName="textRect" presStyleLbl="revTx" presStyleIdx="3" presStyleCnt="4">
-        <dgm:presLayoutVars>
-          <dgm:chMax val="1"/>
-          <dgm:chPref val="1"/>
-        </dgm:presLayoutVars>
-      </dgm:prSet>
-      <dgm:spPr>
-        <a:prstGeom prst="rect">
-          <a:avLst/>
-        </a:prstGeom>
-      </dgm:spPr>
-    </dgm:pt>
-  </dgm:ptLst>
-  <dgm:cxnLst>
-    <dgm:cxn modelId="{BDC8DB12-5AB2-AD47-84CD-925932D590A0}" type="presOf" srcId="{BC68B812-A325-41D8-A08E-C2392666DF66}" destId="{9E96DB26-9770-4D6D-9455-A20B7E0EBF8C}" srcOrd="0" destOrd="0" presId="urn:microsoft.com/office/officeart/2018/5/layout/IconCircleLabelList"/>
-    <dgm:cxn modelId="{5069DB61-6041-FD49-8EA7-4EE326F6CE45}" type="presOf" srcId="{65B3944D-D926-4D0F-A305-F5740000747A}" destId="{9053032A-E668-4011-8EE5-5E356FF2FB6B}" srcOrd="0" destOrd="0" presId="urn:microsoft.com/office/officeart/2018/5/layout/IconCircleLabelList"/>
-    <dgm:cxn modelId="{027F8C62-5A2E-6F49-9A0F-AA107A238F8A}" type="presOf" srcId="{D7951F77-4E36-4893-91C6-3151A6D51694}" destId="{F899A4D3-2C9C-4287-A235-DE3E047E7C22}" srcOrd="0" destOrd="0" presId="urn:microsoft.com/office/officeart/2018/5/layout/IconCircleLabelList"/>
-    <dgm:cxn modelId="{11AC1149-7888-014D-BECD-51B658FC0001}" type="presOf" srcId="{7D1766B6-66CF-40CE-9693-BD20AFFFA3C9}" destId="{7DA92A6E-F038-46D1-A456-33051C764A8B}" srcOrd="0" destOrd="0" presId="urn:microsoft.com/office/officeart/2018/5/layout/IconCircleLabelList"/>
-    <dgm:cxn modelId="{23396E6D-45CC-874B-BBBF-87BB54F113EA}" type="presOf" srcId="{223932EA-8A4D-4270-95C3-913761557237}" destId="{1A37C356-0854-4A55-859A-10DB397A3024}" srcOrd="0" destOrd="0" presId="urn:microsoft.com/office/officeart/2018/5/layout/IconCircleLabelList"/>
-    <dgm:cxn modelId="{92D3A76D-ADBB-49F3-861D-D2B74F81812E}" srcId="{D7951F77-4E36-4893-91C6-3151A6D51694}" destId="{65B3944D-D926-4D0F-A305-F5740000747A}" srcOrd="0" destOrd="0" parTransId="{2EA7AC4A-E82B-43F0-A6EA-F599428578FC}" sibTransId="{8862CE7B-AE72-45E8-B982-5279C14F7985}"/>
-    <dgm:cxn modelId="{EA0F618E-4C96-42F0-9E3C-66B0158BCCBE}" srcId="{D7951F77-4E36-4893-91C6-3151A6D51694}" destId="{7D1766B6-66CF-40CE-9693-BD20AFFFA3C9}" srcOrd="3" destOrd="0" parTransId="{76694DF4-F7BE-4AF1-9E12-BAEDD42D9ED3}" sibTransId="{0C6A2CC7-5741-4D63-A8FF-E7E06F0D1222}"/>
-    <dgm:cxn modelId="{AAD26E9B-C129-46B7-BFCC-98D5999B6B9A}" srcId="{D7951F77-4E36-4893-91C6-3151A6D51694}" destId="{BC68B812-A325-41D8-A08E-C2392666DF66}" srcOrd="2" destOrd="0" parTransId="{23A01A1D-B409-49E7-91BA-2321B9A237C2}" sibTransId="{E950D3C2-0472-429B-98B0-86C856FA65A1}"/>
-    <dgm:cxn modelId="{E37D9CF8-DFE4-4379-9C72-27346573699A}" srcId="{D7951F77-4E36-4893-91C6-3151A6D51694}" destId="{223932EA-8A4D-4270-95C3-913761557237}" srcOrd="1" destOrd="0" parTransId="{E01D4CB3-97D0-4857-AF09-DED2BE24BAAC}" sibTransId="{C201C5C8-D4F2-4559-AF23-68BB4B3E7FB1}"/>
-    <dgm:cxn modelId="{CE2DF165-EF6B-4F49-B743-915BD92A84E8}" type="presParOf" srcId="{F899A4D3-2C9C-4287-A235-DE3E047E7C22}" destId="{0094CD39-7002-4B5E-877D-02B6B0E6C685}" srcOrd="0" destOrd="0" presId="urn:microsoft.com/office/officeart/2018/5/layout/IconCircleLabelList"/>
-    <dgm:cxn modelId="{D63DFB80-8204-8640-A5BC-0C593F3C9E17}" type="presParOf" srcId="{0094CD39-7002-4B5E-877D-02B6B0E6C685}" destId="{C9BCC0A7-4EA9-444D-A661-6CD0349FA8B7}" srcOrd="0" destOrd="0" presId="urn:microsoft.com/office/officeart/2018/5/layout/IconCircleLabelList"/>
-    <dgm:cxn modelId="{28F4603F-92A0-EC42-A00D-352034CB19C4}" type="presParOf" srcId="{0094CD39-7002-4B5E-877D-02B6B0E6C685}" destId="{9F9A0A13-80DE-4152-AD0B-F1B57BDDE11D}" srcOrd="1" destOrd="0" presId="urn:microsoft.com/office/officeart/2018/5/layout/IconCircleLabelList"/>
-    <dgm:cxn modelId="{0E9C7FA3-9BCD-674B-B402-FFDC2F2B53A9}" type="presParOf" srcId="{0094CD39-7002-4B5E-877D-02B6B0E6C685}" destId="{A480AFC6-EE27-4614-AC1B-B7796E444EDF}" srcOrd="2" destOrd="0" presId="urn:microsoft.com/office/officeart/2018/5/layout/IconCircleLabelList"/>
-    <dgm:cxn modelId="{61154DFD-5AAC-6143-A8B2-3E4FF629AFFD}" type="presParOf" srcId="{0094CD39-7002-4B5E-877D-02B6B0E6C685}" destId="{9053032A-E668-4011-8EE5-5E356FF2FB6B}" srcOrd="3" destOrd="0" presId="urn:microsoft.com/office/officeart/2018/5/layout/IconCircleLabelList"/>
-    <dgm:cxn modelId="{EBBD2DB7-987F-0E4D-A853-0372CEEF6EC8}" type="presParOf" srcId="{F899A4D3-2C9C-4287-A235-DE3E047E7C22}" destId="{BC6E504E-B169-4B61-85D7-51520F2B9743}" srcOrd="1" destOrd="0" presId="urn:microsoft.com/office/officeart/2018/5/layout/IconCircleLabelList"/>
-    <dgm:cxn modelId="{926E0CE0-9690-BC44-9D38-FB25406D6A43}" type="presParOf" srcId="{F899A4D3-2C9C-4287-A235-DE3E047E7C22}" destId="{14D15476-F474-46D7-B177-F8E40796FE35}" srcOrd="2" destOrd="0" presId="urn:microsoft.com/office/officeart/2018/5/layout/IconCircleLabelList"/>
-    <dgm:cxn modelId="{89C15D4D-E00E-1649-86CE-A8595175A245}" type="presParOf" srcId="{14D15476-F474-46D7-B177-F8E40796FE35}" destId="{1FC3D828-343B-42C4-A35E-FB3CAA3FB1B3}" srcOrd="0" destOrd="0" presId="urn:microsoft.com/office/officeart/2018/5/layout/IconCircleLabelList"/>
-    <dgm:cxn modelId="{2F172121-2A9C-8149-9738-8733E9AF2DEE}" type="presParOf" srcId="{14D15476-F474-46D7-B177-F8E40796FE35}" destId="{902713CB-D896-458F-B8DA-F1C1FC1C9B5E}" srcOrd="1" destOrd="0" presId="urn:microsoft.com/office/officeart/2018/5/layout/IconCircleLabelList"/>
-    <dgm:cxn modelId="{B8753A05-1AA5-2242-A86E-4C885D576E40}" type="presParOf" srcId="{14D15476-F474-46D7-B177-F8E40796FE35}" destId="{0C624B3C-0EA4-4983-B87C-0B5532036A83}" srcOrd="2" destOrd="0" presId="urn:microsoft.com/office/officeart/2018/5/layout/IconCircleLabelList"/>
-    <dgm:cxn modelId="{DA63C3DD-37CA-AA48-80D9-897D0EC4F8D1}" type="presParOf" srcId="{14D15476-F474-46D7-B177-F8E40796FE35}" destId="{1A37C356-0854-4A55-859A-10DB397A3024}" srcOrd="3" destOrd="0" presId="urn:microsoft.com/office/officeart/2018/5/layout/IconCircleLabelList"/>
-    <dgm:cxn modelId="{0DDF2DDA-612B-084C-A66E-A6FA6C68F536}" type="presParOf" srcId="{F899A4D3-2C9C-4287-A235-DE3E047E7C22}" destId="{13F17AF8-950C-456F-AC54-760BBE52F290}" srcOrd="3" destOrd="0" presId="urn:microsoft.com/office/officeart/2018/5/layout/IconCircleLabelList"/>
-    <dgm:cxn modelId="{DF06FE87-7390-924D-BE10-631C1BD28152}" type="presParOf" srcId="{F899A4D3-2C9C-4287-A235-DE3E047E7C22}" destId="{EA4BD492-063C-4B67-B2F7-C08CB328337E}" srcOrd="4" destOrd="0" presId="urn:microsoft.com/office/officeart/2018/5/layout/IconCircleLabelList"/>
-    <dgm:cxn modelId="{AB1F3E90-4689-0F4D-80B8-0694A84B1E80}" type="presParOf" srcId="{EA4BD492-063C-4B67-B2F7-C08CB328337E}" destId="{AA942612-CA7A-414A-8A41-5AF47E8BF18D}" srcOrd="0" destOrd="0" presId="urn:microsoft.com/office/officeart/2018/5/layout/IconCircleLabelList"/>
-    <dgm:cxn modelId="{51230EBC-5F2E-8C4A-87F4-6C71F2AFE095}" type="presParOf" srcId="{EA4BD492-063C-4B67-B2F7-C08CB328337E}" destId="{501CE67F-3782-42E8-B14B-7322FA3A6AF9}" srcOrd="1" destOrd="0" presId="urn:microsoft.com/office/officeart/2018/5/layout/IconCircleLabelList"/>
-    <dgm:cxn modelId="{34AA554A-0C79-B840-AD57-C6BC6E00BF8B}" type="presParOf" srcId="{EA4BD492-063C-4B67-B2F7-C08CB328337E}" destId="{4DD1F19D-F3F5-4EAE-8108-BE4892B97AFD}" srcOrd="2" destOrd="0" presId="urn:microsoft.com/office/officeart/2018/5/layout/IconCircleLabelList"/>
-    <dgm:cxn modelId="{BF33A1E9-A3ED-9647-B0B0-D5D9C87E6E3D}" type="presParOf" srcId="{EA4BD492-063C-4B67-B2F7-C08CB328337E}" destId="{9E96DB26-9770-4D6D-9455-A20B7E0EBF8C}" srcOrd="3" destOrd="0" presId="urn:microsoft.com/office/officeart/2018/5/layout/IconCircleLabelList"/>
-    <dgm:cxn modelId="{859D5017-7230-FB4E-94AD-047D1335E5BD}" type="presParOf" srcId="{F899A4D3-2C9C-4287-A235-DE3E047E7C22}" destId="{26C2295D-42E0-41C5-8B47-C82164646E5C}" srcOrd="5" destOrd="0" presId="urn:microsoft.com/office/officeart/2018/5/layout/IconCircleLabelList"/>
-    <dgm:cxn modelId="{AF12D39B-DD68-5A4B-87E0-714C70F4D7C4}" type="presParOf" srcId="{F899A4D3-2C9C-4287-A235-DE3E047E7C22}" destId="{B35AC086-3D53-473A-9AC9-09E397585F82}" srcOrd="6" destOrd="0" presId="urn:microsoft.com/office/officeart/2018/5/layout/IconCircleLabelList"/>
-    <dgm:cxn modelId="{E5EE2F91-9E9C-1B45-AA06-EEC3B7942487}" type="presParOf" srcId="{B35AC086-3D53-473A-9AC9-09E397585F82}" destId="{AB9CFA30-80BB-4CBE-9CD8-BDB5E9753036}" srcOrd="0" destOrd="0" presId="urn:microsoft.com/office/officeart/2018/5/layout/IconCircleLabelList"/>
-    <dgm:cxn modelId="{2409393D-61F0-2148-90EA-2B7F6A0F538D}" type="presParOf" srcId="{B35AC086-3D53-473A-9AC9-09E397585F82}" destId="{3B505E4C-CA1F-4180-AD3B-9413D55B103E}" srcOrd="1" destOrd="0" presId="urn:microsoft.com/office/officeart/2018/5/layout/IconCircleLabelList"/>
-    <dgm:cxn modelId="{91A098FF-0967-A249-9E35-C3C079104C7F}" type="presParOf" srcId="{B35AC086-3D53-473A-9AC9-09E397585F82}" destId="{2A52F42F-EEA0-44B3-B748-B3BEB14B1E36}" srcOrd="2" destOrd="0" presId="urn:microsoft.com/office/officeart/2018/5/layout/IconCircleLabelList"/>
-    <dgm:cxn modelId="{9C84FE3F-12E3-2D4D-B7D2-C18633251A01}" type="presParOf" srcId="{B35AC086-3D53-473A-9AC9-09E397585F82}" destId="{7DA92A6E-F038-46D1-A456-33051C764A8B}" srcOrd="3" destOrd="0" presId="urn:microsoft.com/office/officeart/2018/5/layout/IconCircleLabelList"/>
-  </dgm:cxnLst>
-  <dgm:bg/>
-  <dgm:whole/>
-  <dgm:extLst>
-    <a:ext uri="http://schemas.microsoft.com/office/drawing/2008/diagram">
-      <dsp:dataModelExt xmlns:dsp="http://schemas.microsoft.com/office/drawing/2008/diagram" relId="rId6" minVer="http://schemas.openxmlformats.org/drawingml/2006/diagram"/>
-    </a:ext>
-  </dgm:extLst>
-</dgm:dataModel>
-</file>
-
-<file path=ppt/diagrams/data2.xml><?xml version="1.0" encoding="utf-8"?>
 <dgm:dataModel xmlns:dgm="http://schemas.openxmlformats.org/drawingml/2006/diagram" xmlns:a="http://schemas.openxmlformats.org/drawingml/2006/main">
   <dgm:ptLst>
     <dgm:pt modelId="{0F81ED96-BC87-42C7-BF84-F6BDDFDCCACD}" type="doc">
@@ -3367,7 +1847,7 @@
 </dgm:dataModel>
 </file>
 
-<file path=ppt/diagrams/data3.xml><?xml version="1.0" encoding="utf-8"?>
+<file path=ppt/diagrams/data2.xml><?xml version="1.0" encoding="utf-8"?>
 <dgm:dataModel xmlns:dgm="http://schemas.openxmlformats.org/drawingml/2006/diagram" xmlns:a="http://schemas.openxmlformats.org/drawingml/2006/main">
   <dgm:ptLst>
     <dgm:pt modelId="{0F81ED96-BC87-42C7-BF84-F6BDDFDCCACD}" type="doc">
@@ -3590,680 +2070,6 @@
 </file>
 
 <file path=ppt/diagrams/drawing1.xml><?xml version="1.0" encoding="utf-8"?>
-<dsp:drawing xmlns:dgm="http://schemas.openxmlformats.org/drawingml/2006/diagram" xmlns:dsp="http://schemas.microsoft.com/office/drawing/2008/diagram" xmlns:a="http://schemas.openxmlformats.org/drawingml/2006/main">
-  <dsp:spTree>
-    <dsp:nvGrpSpPr>
-      <dsp:cNvPr id="0" name=""/>
-      <dsp:cNvGrpSpPr/>
-    </dsp:nvGrpSpPr>
-    <dsp:grpSpPr/>
-    <dsp:sp modelId="{C9BCC0A7-4EA9-444D-A661-6CD0349FA8B7}">
-      <dsp:nvSpPr>
-        <dsp:cNvPr id="0" name=""/>
-        <dsp:cNvSpPr/>
-      </dsp:nvSpPr>
-      <dsp:spPr>
-        <a:xfrm>
-          <a:off x="764738" y="788430"/>
-          <a:ext cx="1098000" cy="1098000"/>
-        </a:xfrm>
-        <a:prstGeom prst="ellipse">
-          <a:avLst/>
-        </a:prstGeom>
-        <a:noFill/>
-        <a:ln>
-          <a:noFill/>
-        </a:ln>
-        <a:effectLst/>
-      </dsp:spPr>
-      <dsp:style>
-        <a:lnRef idx="0">
-          <a:scrgbClr r="0" g="0" b="0"/>
-        </a:lnRef>
-        <a:fillRef idx="1">
-          <a:scrgbClr r="0" g="0" b="0"/>
-        </a:fillRef>
-        <a:effectRef idx="0">
-          <a:scrgbClr r="0" g="0" b="0"/>
-        </a:effectRef>
-        <a:fontRef idx="minor"/>
-      </dsp:style>
-    </dsp:sp>
-    <dsp:sp modelId="{9F9A0A13-80DE-4152-AD0B-F1B57BDDE11D}">
-      <dsp:nvSpPr>
-        <dsp:cNvPr id="0" name=""/>
-        <dsp:cNvSpPr/>
-      </dsp:nvSpPr>
-      <dsp:spPr>
-        <a:xfrm>
-          <a:off x="998738" y="1022430"/>
-          <a:ext cx="630000" cy="630000"/>
-        </a:xfrm>
-        <a:prstGeom prst="rect">
-          <a:avLst/>
-        </a:prstGeom>
-        <a:blipFill>
-          <a:blip xmlns:r="http://schemas.openxmlformats.org/officeDocument/2006/relationships" r:embed="rId1">
-            <a:extLst>
-              <a:ext uri="{28A0092B-C50C-407E-A947-70E740481C1C}">
-                <a14:useLocalDpi xmlns:a14="http://schemas.microsoft.com/office/drawing/2010/main"/>
-              </a:ext>
-              <a:ext uri="{96DAC541-7B7A-43D3-8B79-37D633B846F1}">
-                <asvg:svgBlip xmlns:asvg="http://schemas.microsoft.com/office/drawing/2016/SVG/main" r:embed="rId2"/>
-              </a:ext>
-            </a:extLst>
-          </a:blip>
-          <a:stretch>
-            <a:fillRect/>
-          </a:stretch>
-        </a:blipFill>
-        <a:ln w="15875" cap="flat" cmpd="sng" algn="ctr">
-          <a:noFill/>
-          <a:prstDash val="solid"/>
-        </a:ln>
-        <a:effectLst/>
-      </dsp:spPr>
-      <dsp:style>
-        <a:lnRef idx="2">
-          <a:scrgbClr r="0" g="0" b="0"/>
-        </a:lnRef>
-        <a:fillRef idx="1">
-          <a:scrgbClr r="0" g="0" b="0"/>
-        </a:fillRef>
-        <a:effectRef idx="0">
-          <a:scrgbClr r="0" g="0" b="0"/>
-        </a:effectRef>
-        <a:fontRef idx="minor">
-          <a:schemeClr val="lt1"/>
-        </a:fontRef>
-      </dsp:style>
-    </dsp:sp>
-    <dsp:sp modelId="{9053032A-E668-4011-8EE5-5E356FF2FB6B}">
-      <dsp:nvSpPr>
-        <dsp:cNvPr id="0" name=""/>
-        <dsp:cNvSpPr/>
-      </dsp:nvSpPr>
-      <dsp:spPr>
-        <a:xfrm>
-          <a:off x="233099" y="2228430"/>
-          <a:ext cx="2161278" cy="743927"/>
-        </a:xfrm>
-        <a:prstGeom prst="rect">
-          <a:avLst/>
-        </a:prstGeom>
-        <a:noFill/>
-        <a:ln>
-          <a:noFill/>
-        </a:ln>
-        <a:effectLst/>
-      </dsp:spPr>
-      <dsp:style>
-        <a:lnRef idx="0">
-          <a:scrgbClr r="0" g="0" b="0"/>
-        </a:lnRef>
-        <a:fillRef idx="0">
-          <a:scrgbClr r="0" g="0" b="0"/>
-        </a:fillRef>
-        <a:effectRef idx="0">
-          <a:scrgbClr r="0" g="0" b="0"/>
-        </a:effectRef>
-        <a:fontRef idx="minor"/>
-      </dsp:style>
-      <dsp:txBody>
-        <a:bodyPr spcFirstLastPara="0" vert="horz" wrap="square" lIns="0" tIns="0" rIns="0" bIns="0" numCol="1" spcCol="1270" anchor="t" anchorCtr="0">
-          <a:noAutofit/>
-        </a:bodyPr>
-        <a:lstStyle/>
-        <a:p>
-          <a:pPr marL="0" lvl="0" indent="0" algn="ctr" defTabSz="711200">
-            <a:lnSpc>
-              <a:spcPct val="100000"/>
-            </a:lnSpc>
-            <a:spcBef>
-              <a:spcPct val="0"/>
-            </a:spcBef>
-            <a:spcAft>
-              <a:spcPct val="35000"/>
-            </a:spcAft>
-            <a:buNone/>
-            <a:defRPr cap="all"/>
-          </a:pPr>
-          <a:r>
-            <a:rPr lang="en-US" sz="1600" b="1" kern="1200" dirty="0">
-              <a:latin typeface="+mj-lt"/>
-              <a:ea typeface="+mn-ea"/>
-              <a:cs typeface="+mn-cs"/>
-            </a:rPr>
-            <a:t>LinkedIn</a:t>
-          </a:r>
-          <a:br>
-            <a:rPr lang="en-US" sz="1600" kern="1200" dirty="0">
-              <a:latin typeface="+mj-lt"/>
-              <a:ea typeface="+mn-ea"/>
-              <a:cs typeface="+mn-cs"/>
-            </a:rPr>
-          </a:br>
-          <a:r>
-            <a:rPr lang="en-US" sz="1600" kern="1200" cap="none" dirty="0">
-              <a:latin typeface="+mj-lt"/>
-              <a:ea typeface="+mn-ea"/>
-              <a:cs typeface="+mn-cs"/>
-            </a:rPr>
-            <a:t>ANGELICAASTROM</a:t>
-          </a:r>
-          <a:endParaRPr lang="en-US" sz="1600" kern="1200" dirty="0">
-            <a:latin typeface="+mj-lt"/>
-            <a:ea typeface="+mn-ea"/>
-            <a:cs typeface="+mn-cs"/>
-          </a:endParaRPr>
-        </a:p>
-      </dsp:txBody>
-      <dsp:txXfrm>
-        <a:off x="233099" y="2228430"/>
-        <a:ext cx="2161278" cy="743927"/>
-      </dsp:txXfrm>
-    </dsp:sp>
-    <dsp:sp modelId="{1FC3D828-343B-42C4-A35E-FB3CAA3FB1B3}">
-      <dsp:nvSpPr>
-        <dsp:cNvPr id="0" name=""/>
-        <dsp:cNvSpPr/>
-      </dsp:nvSpPr>
-      <dsp:spPr>
-        <a:xfrm>
-          <a:off x="3060377" y="788430"/>
-          <a:ext cx="1098000" cy="1098000"/>
-        </a:xfrm>
-        <a:prstGeom prst="ellipse">
-          <a:avLst/>
-        </a:prstGeom>
-        <a:noFill/>
-        <a:ln>
-          <a:noFill/>
-        </a:ln>
-        <a:effectLst/>
-      </dsp:spPr>
-      <dsp:style>
-        <a:lnRef idx="0">
-          <a:scrgbClr r="0" g="0" b="0"/>
-        </a:lnRef>
-        <a:fillRef idx="1">
-          <a:scrgbClr r="0" g="0" b="0"/>
-        </a:fillRef>
-        <a:effectRef idx="0">
-          <a:scrgbClr r="0" g="0" b="0"/>
-        </a:effectRef>
-        <a:fontRef idx="minor"/>
-      </dsp:style>
-    </dsp:sp>
-    <dsp:sp modelId="{902713CB-D896-458F-B8DA-F1C1FC1C9B5E}">
-      <dsp:nvSpPr>
-        <dsp:cNvPr id="0" name=""/>
-        <dsp:cNvSpPr/>
-      </dsp:nvSpPr>
-      <dsp:spPr>
-        <a:xfrm>
-          <a:off x="3294377" y="1022430"/>
-          <a:ext cx="630000" cy="630000"/>
-        </a:xfrm>
-        <a:prstGeom prst="rect">
-          <a:avLst/>
-        </a:prstGeom>
-        <a:blipFill>
-          <a:blip xmlns:r="http://schemas.openxmlformats.org/officeDocument/2006/relationships" r:embed="rId3">
-            <a:extLst>
-              <a:ext uri="{28A0092B-C50C-407E-A947-70E740481C1C}">
-                <a14:useLocalDpi xmlns:a14="http://schemas.microsoft.com/office/drawing/2010/main"/>
-              </a:ext>
-              <a:ext uri="{96DAC541-7B7A-43D3-8B79-37D633B846F1}">
-                <asvg:svgBlip xmlns:asvg="http://schemas.microsoft.com/office/drawing/2016/SVG/main" r:embed="rId4"/>
-              </a:ext>
-            </a:extLst>
-          </a:blip>
-          <a:stretch>
-            <a:fillRect/>
-          </a:stretch>
-        </a:blipFill>
-        <a:ln w="15875" cap="flat" cmpd="sng" algn="ctr">
-          <a:noFill/>
-          <a:prstDash val="solid"/>
-        </a:ln>
-        <a:effectLst/>
-      </dsp:spPr>
-      <dsp:style>
-        <a:lnRef idx="2">
-          <a:scrgbClr r="0" g="0" b="0"/>
-        </a:lnRef>
-        <a:fillRef idx="1">
-          <a:scrgbClr r="0" g="0" b="0"/>
-        </a:fillRef>
-        <a:effectRef idx="0">
-          <a:scrgbClr r="0" g="0" b="0"/>
-        </a:effectRef>
-        <a:fontRef idx="minor">
-          <a:schemeClr val="lt1"/>
-        </a:fontRef>
-      </dsp:style>
-    </dsp:sp>
-    <dsp:sp modelId="{1A37C356-0854-4A55-859A-10DB397A3024}">
-      <dsp:nvSpPr>
-        <dsp:cNvPr id="0" name=""/>
-        <dsp:cNvSpPr/>
-      </dsp:nvSpPr>
-      <dsp:spPr>
-        <a:xfrm>
-          <a:off x="2709377" y="2228430"/>
-          <a:ext cx="1800000" cy="743927"/>
-        </a:xfrm>
-        <a:prstGeom prst="rect">
-          <a:avLst/>
-        </a:prstGeom>
-        <a:noFill/>
-        <a:ln>
-          <a:noFill/>
-        </a:ln>
-        <a:effectLst/>
-      </dsp:spPr>
-      <dsp:style>
-        <a:lnRef idx="0">
-          <a:scrgbClr r="0" g="0" b="0"/>
-        </a:lnRef>
-        <a:fillRef idx="0">
-          <a:scrgbClr r="0" g="0" b="0"/>
-        </a:fillRef>
-        <a:effectRef idx="0">
-          <a:scrgbClr r="0" g="0" b="0"/>
-        </a:effectRef>
-        <a:fontRef idx="minor"/>
-      </dsp:style>
-      <dsp:txBody>
-        <a:bodyPr spcFirstLastPara="0" vert="horz" wrap="square" lIns="0" tIns="0" rIns="0" bIns="0" numCol="1" spcCol="1270" anchor="t" anchorCtr="0">
-          <a:noAutofit/>
-        </a:bodyPr>
-        <a:lstStyle/>
-        <a:p>
-          <a:pPr marL="0" lvl="0" indent="0" algn="ctr" defTabSz="711200">
-            <a:lnSpc>
-              <a:spcPct val="100000"/>
-            </a:lnSpc>
-            <a:spcBef>
-              <a:spcPct val="0"/>
-            </a:spcBef>
-            <a:spcAft>
-              <a:spcPct val="35000"/>
-            </a:spcAft>
-            <a:buNone/>
-            <a:defRPr cap="all"/>
-          </a:pPr>
-          <a:r>
-            <a:rPr lang="en-US" sz="1600" b="1" kern="1200" dirty="0">
-              <a:latin typeface="+mj-lt"/>
-              <a:ea typeface="+mn-ea"/>
-              <a:cs typeface="+mn-cs"/>
-            </a:rPr>
-            <a:t>Twitter</a:t>
-          </a:r>
-          <a:br>
-            <a:rPr lang="en-US" sz="1600" kern="1200" dirty="0">
-              <a:latin typeface="+mj-lt"/>
-              <a:ea typeface="+mn-ea"/>
-              <a:cs typeface="+mn-cs"/>
-            </a:rPr>
-          </a:br>
-          <a:r>
-            <a:rPr lang="en-US" sz="1600" kern="1200" dirty="0">
-              <a:latin typeface="+mj-lt"/>
-              <a:ea typeface="+mn-ea"/>
-              <a:cs typeface="+mn-cs"/>
-            </a:rPr>
-            <a:t>@</a:t>
-          </a:r>
-          <a:r>
-            <a:rPr lang="en-US" sz="1600" kern="1200" cap="none" dirty="0">
-              <a:latin typeface="+mj-lt"/>
-              <a:ea typeface="+mn-ea"/>
-              <a:cs typeface="+mn-cs"/>
-            </a:rPr>
-            <a:t>AASTROM</a:t>
-          </a:r>
-          <a:endParaRPr lang="en-US" sz="1600" kern="1200" dirty="0">
-            <a:latin typeface="+mj-lt"/>
-            <a:ea typeface="+mn-ea"/>
-            <a:cs typeface="+mn-cs"/>
-          </a:endParaRPr>
-        </a:p>
-      </dsp:txBody>
-      <dsp:txXfrm>
-        <a:off x="2709377" y="2228430"/>
-        <a:ext cx="1800000" cy="743927"/>
-      </dsp:txXfrm>
-    </dsp:sp>
-    <dsp:sp modelId="{AA942612-CA7A-414A-8A41-5AF47E8BF18D}">
-      <dsp:nvSpPr>
-        <dsp:cNvPr id="0" name=""/>
-        <dsp:cNvSpPr/>
-      </dsp:nvSpPr>
-      <dsp:spPr>
-        <a:xfrm>
-          <a:off x="5718339" y="788430"/>
-          <a:ext cx="1098000" cy="1098000"/>
-        </a:xfrm>
-        <a:prstGeom prst="ellipse">
-          <a:avLst/>
-        </a:prstGeom>
-        <a:noFill/>
-        <a:ln>
-          <a:noFill/>
-        </a:ln>
-        <a:effectLst/>
-      </dsp:spPr>
-      <dsp:style>
-        <a:lnRef idx="0">
-          <a:scrgbClr r="0" g="0" b="0"/>
-        </a:lnRef>
-        <a:fillRef idx="1">
-          <a:scrgbClr r="0" g="0" b="0"/>
-        </a:fillRef>
-        <a:effectRef idx="0">
-          <a:scrgbClr r="0" g="0" b="0"/>
-        </a:effectRef>
-        <a:fontRef idx="minor"/>
-      </dsp:style>
-    </dsp:sp>
-    <dsp:sp modelId="{501CE67F-3782-42E8-B14B-7322FA3A6AF9}">
-      <dsp:nvSpPr>
-        <dsp:cNvPr id="0" name=""/>
-        <dsp:cNvSpPr/>
-      </dsp:nvSpPr>
-      <dsp:spPr>
-        <a:xfrm>
-          <a:off x="5952339" y="1022430"/>
-          <a:ext cx="630000" cy="630000"/>
-        </a:xfrm>
-        <a:prstGeom prst="rect">
-          <a:avLst/>
-        </a:prstGeom>
-        <a:blipFill>
-          <a:blip xmlns:r="http://schemas.openxmlformats.org/officeDocument/2006/relationships" r:embed="rId5">
-            <a:extLst>
-              <a:ext uri="{28A0092B-C50C-407E-A947-70E740481C1C}">
-                <a14:useLocalDpi xmlns:a14="http://schemas.microsoft.com/office/drawing/2010/main"/>
-              </a:ext>
-              <a:ext uri="{96DAC541-7B7A-43D3-8B79-37D633B846F1}">
-                <asvg:svgBlip xmlns:asvg="http://schemas.microsoft.com/office/drawing/2016/SVG/main" r:embed="rId6"/>
-              </a:ext>
-            </a:extLst>
-          </a:blip>
-          <a:stretch>
-            <a:fillRect/>
-          </a:stretch>
-        </a:blipFill>
-        <a:ln w="15875" cap="flat" cmpd="sng" algn="ctr">
-          <a:noFill/>
-          <a:prstDash val="solid"/>
-        </a:ln>
-        <a:effectLst/>
-      </dsp:spPr>
-      <dsp:style>
-        <a:lnRef idx="2">
-          <a:scrgbClr r="0" g="0" b="0"/>
-        </a:lnRef>
-        <a:fillRef idx="1">
-          <a:scrgbClr r="0" g="0" b="0"/>
-        </a:fillRef>
-        <a:effectRef idx="0">
-          <a:scrgbClr r="0" g="0" b="0"/>
-        </a:effectRef>
-        <a:fontRef idx="minor">
-          <a:schemeClr val="lt1"/>
-        </a:fontRef>
-      </dsp:style>
-    </dsp:sp>
-    <dsp:sp modelId="{9E96DB26-9770-4D6D-9455-A20B7E0EBF8C}">
-      <dsp:nvSpPr>
-        <dsp:cNvPr id="0" name=""/>
-        <dsp:cNvSpPr/>
-      </dsp:nvSpPr>
-      <dsp:spPr>
-        <a:xfrm>
-          <a:off x="4824378" y="2228430"/>
-          <a:ext cx="2885922" cy="743927"/>
-        </a:xfrm>
-        <a:prstGeom prst="rect">
-          <a:avLst/>
-        </a:prstGeom>
-        <a:noFill/>
-        <a:ln>
-          <a:noFill/>
-        </a:ln>
-        <a:effectLst/>
-      </dsp:spPr>
-      <dsp:style>
-        <a:lnRef idx="0">
-          <a:scrgbClr r="0" g="0" b="0"/>
-        </a:lnRef>
-        <a:fillRef idx="0">
-          <a:scrgbClr r="0" g="0" b="0"/>
-        </a:fillRef>
-        <a:effectRef idx="0">
-          <a:scrgbClr r="0" g="0" b="0"/>
-        </a:effectRef>
-        <a:fontRef idx="minor"/>
-      </dsp:style>
-      <dsp:txBody>
-        <a:bodyPr spcFirstLastPara="0" vert="horz" wrap="square" lIns="0" tIns="0" rIns="0" bIns="0" numCol="1" spcCol="1270" anchor="t" anchorCtr="0">
-          <a:noAutofit/>
-        </a:bodyPr>
-        <a:lstStyle/>
-        <a:p>
-          <a:pPr marL="0" lvl="0" indent="0" algn="ctr" defTabSz="711200">
-            <a:lnSpc>
-              <a:spcPct val="100000"/>
-            </a:lnSpc>
-            <a:spcBef>
-              <a:spcPct val="0"/>
-            </a:spcBef>
-            <a:spcAft>
-              <a:spcPct val="35000"/>
-            </a:spcAft>
-            <a:buNone/>
-            <a:defRPr cap="all"/>
-          </a:pPr>
-          <a:r>
-            <a:rPr lang="en-US" sz="1600" b="1" kern="1200" dirty="0">
-              <a:latin typeface="+mj-lt"/>
-              <a:ea typeface="+mn-ea"/>
-              <a:cs typeface="+mn-cs"/>
-            </a:rPr>
-            <a:t>Email</a:t>
-          </a:r>
-          <a:br>
-            <a:rPr lang="en-US" sz="1600" kern="1200" dirty="0">
-              <a:latin typeface="+mj-lt"/>
-              <a:ea typeface="+mn-ea"/>
-              <a:cs typeface="+mn-cs"/>
-            </a:rPr>
-          </a:br>
-          <a:r>
-            <a:rPr lang="en-US" sz="1600" kern="1200" dirty="0">
-              <a:latin typeface="+mj-lt"/>
-              <a:ea typeface="+mn-ea"/>
-              <a:cs typeface="+mn-cs"/>
-            </a:rPr>
-            <a:t>ANGELCIA@contoso.com</a:t>
-          </a:r>
-        </a:p>
-      </dsp:txBody>
-      <dsp:txXfrm>
-        <a:off x="4824378" y="2228430"/>
-        <a:ext cx="2885922" cy="743927"/>
-      </dsp:txXfrm>
-    </dsp:sp>
-    <dsp:sp modelId="{AB9CFA30-80BB-4CBE-9CD8-BDB5E9753036}">
-      <dsp:nvSpPr>
-        <dsp:cNvPr id="0" name=""/>
-        <dsp:cNvSpPr/>
-      </dsp:nvSpPr>
-      <dsp:spPr>
-        <a:xfrm>
-          <a:off x="8376300" y="788430"/>
-          <a:ext cx="1098000" cy="1098000"/>
-        </a:xfrm>
-        <a:prstGeom prst="ellipse">
-          <a:avLst/>
-        </a:prstGeom>
-        <a:noFill/>
-        <a:ln>
-          <a:noFill/>
-        </a:ln>
-        <a:effectLst/>
-      </dsp:spPr>
-      <dsp:style>
-        <a:lnRef idx="0">
-          <a:scrgbClr r="0" g="0" b="0"/>
-        </a:lnRef>
-        <a:fillRef idx="1">
-          <a:scrgbClr r="0" g="0" b="0"/>
-        </a:fillRef>
-        <a:effectRef idx="0">
-          <a:scrgbClr r="0" g="0" b="0"/>
-        </a:effectRef>
-        <a:fontRef idx="minor"/>
-      </dsp:style>
-    </dsp:sp>
-    <dsp:sp modelId="{3B505E4C-CA1F-4180-AD3B-9413D55B103E}">
-      <dsp:nvSpPr>
-        <dsp:cNvPr id="0" name=""/>
-        <dsp:cNvSpPr/>
-      </dsp:nvSpPr>
-      <dsp:spPr>
-        <a:xfrm>
-          <a:off x="8610300" y="1022430"/>
-          <a:ext cx="630000" cy="630000"/>
-        </a:xfrm>
-        <a:prstGeom prst="rect">
-          <a:avLst/>
-        </a:prstGeom>
-        <a:blipFill>
-          <a:blip xmlns:r="http://schemas.openxmlformats.org/officeDocument/2006/relationships" r:embed="rId7">
-            <a:extLst>
-              <a:ext uri="{28A0092B-C50C-407E-A947-70E740481C1C}">
-                <a14:useLocalDpi xmlns:a14="http://schemas.microsoft.com/office/drawing/2010/main"/>
-              </a:ext>
-              <a:ext uri="{96DAC541-7B7A-43D3-8B79-37D633B846F1}">
-                <asvg:svgBlip xmlns:asvg="http://schemas.microsoft.com/office/drawing/2016/SVG/main" r:embed="rId8"/>
-              </a:ext>
-            </a:extLst>
-          </a:blip>
-          <a:stretch>
-            <a:fillRect/>
-          </a:stretch>
-        </a:blipFill>
-        <a:ln w="15875" cap="flat" cmpd="sng" algn="ctr">
-          <a:noFill/>
-          <a:prstDash val="solid"/>
-        </a:ln>
-        <a:effectLst/>
-      </dsp:spPr>
-      <dsp:style>
-        <a:lnRef idx="2">
-          <a:scrgbClr r="0" g="0" b="0"/>
-        </a:lnRef>
-        <a:fillRef idx="1">
-          <a:scrgbClr r="0" g="0" b="0"/>
-        </a:fillRef>
-        <a:effectRef idx="0">
-          <a:scrgbClr r="0" g="0" b="0"/>
-        </a:effectRef>
-        <a:fontRef idx="minor">
-          <a:schemeClr val="lt1"/>
-        </a:fontRef>
-      </dsp:style>
-    </dsp:sp>
-    <dsp:sp modelId="{7DA92A6E-F038-46D1-A456-33051C764A8B}">
-      <dsp:nvSpPr>
-        <dsp:cNvPr id="0" name=""/>
-        <dsp:cNvSpPr/>
-      </dsp:nvSpPr>
-      <dsp:spPr>
-        <a:xfrm>
-          <a:off x="8025300" y="2228430"/>
-          <a:ext cx="1800000" cy="743927"/>
-        </a:xfrm>
-        <a:prstGeom prst="rect">
-          <a:avLst/>
-        </a:prstGeom>
-        <a:noFill/>
-        <a:ln>
-          <a:noFill/>
-        </a:ln>
-        <a:effectLst/>
-      </dsp:spPr>
-      <dsp:style>
-        <a:lnRef idx="0">
-          <a:scrgbClr r="0" g="0" b="0"/>
-        </a:lnRef>
-        <a:fillRef idx="0">
-          <a:scrgbClr r="0" g="0" b="0"/>
-        </a:fillRef>
-        <a:effectRef idx="0">
-          <a:scrgbClr r="0" g="0" b="0"/>
-        </a:effectRef>
-        <a:fontRef idx="minor"/>
-      </dsp:style>
-      <dsp:txBody>
-        <a:bodyPr spcFirstLastPara="0" vert="horz" wrap="square" lIns="0" tIns="0" rIns="0" bIns="0" numCol="1" spcCol="1270" anchor="t" anchorCtr="0">
-          <a:noAutofit/>
-        </a:bodyPr>
-        <a:lstStyle/>
-        <a:p>
-          <a:pPr marL="0" lvl="0" indent="0" algn="ctr" defTabSz="711200">
-            <a:lnSpc>
-              <a:spcPct val="100000"/>
-            </a:lnSpc>
-            <a:spcBef>
-              <a:spcPct val="0"/>
-            </a:spcBef>
-            <a:spcAft>
-              <a:spcPct val="35000"/>
-            </a:spcAft>
-            <a:buNone/>
-            <a:defRPr cap="all"/>
-          </a:pPr>
-          <a:r>
-            <a:rPr lang="en-US" sz="1600" b="1" kern="1200" dirty="0">
-              <a:latin typeface="+mj-lt"/>
-              <a:ea typeface="+mn-ea"/>
-              <a:cs typeface="+mn-cs"/>
-            </a:rPr>
-            <a:t>Phone</a:t>
-          </a:r>
-          <a:br>
-            <a:rPr lang="en-US" sz="1600" kern="1200" dirty="0">
-              <a:latin typeface="+mj-lt"/>
-              <a:ea typeface="+mn-ea"/>
-              <a:cs typeface="+mn-cs"/>
-            </a:rPr>
-          </a:br>
-          <a:r>
-            <a:rPr lang="en-US" sz="1600" kern="1200" dirty="0">
-              <a:latin typeface="+mj-lt"/>
-              <a:ea typeface="+mn-ea"/>
-              <a:cs typeface="+mn-cs"/>
-            </a:rPr>
-            <a:t>231-555-0188</a:t>
-          </a:r>
-        </a:p>
-      </dsp:txBody>
-      <dsp:txXfrm>
-        <a:off x="8025300" y="2228430"/>
-        <a:ext cx="1800000" cy="743927"/>
-      </dsp:txXfrm>
-    </dsp:sp>
-  </dsp:spTree>
-</dsp:drawing>
-</file>
-
-<file path=ppt/diagrams/drawing2.xml><?xml version="1.0" encoding="utf-8"?>
 <dsp:drawing xmlns:dgm="http://schemas.openxmlformats.org/drawingml/2006/diagram" xmlns:dsp="http://schemas.microsoft.com/office/drawing/2008/diagram" xmlns:a="http://schemas.openxmlformats.org/drawingml/2006/main">
   <dsp:spTree>
     <dsp:nvGrpSpPr>
@@ -4777,7 +2583,7 @@
 </dsp:drawing>
 </file>
 
-<file path=ppt/diagrams/drawing3.xml><?xml version="1.0" encoding="utf-8"?>
+<file path=ppt/diagrams/drawing2.xml><?xml version="1.0" encoding="utf-8"?>
 <dsp:drawing xmlns:dgm="http://schemas.openxmlformats.org/drawingml/2006/diagram" xmlns:dsp="http://schemas.microsoft.com/office/drawing/2008/diagram" xmlns:a="http://schemas.openxmlformats.org/drawingml/2006/main">
   <dsp:spTree>
     <dsp:nvGrpSpPr>
@@ -5278,11 +3084,12 @@
 </file>
 
 <file path=ppt/diagrams/layout1.xml><?xml version="1.0" encoding="utf-8"?>
-<dgm:layoutDef xmlns:dgm="http://schemas.openxmlformats.org/drawingml/2006/diagram" xmlns:a="http://schemas.openxmlformats.org/drawingml/2006/main" uniqueId="urn:microsoft.com/office/officeart/2018/5/layout/IconCircleLabelList">
-  <dgm:title val="Icon Circle Label List"/>
-  <dgm:desc val="Use to show non-sequential or grouped chunks of information accompanied by a related visuals. Works best with icons or small pictures with short text captions."/>
+<dgm:layoutDef xmlns:dgm="http://schemas.openxmlformats.org/drawingml/2006/diagram" xmlns:a="http://schemas.openxmlformats.org/drawingml/2006/main" uniqueId="urn:microsoft.com/office/officeart/2005/8/layout/chevronAccent+Icon">
+  <dgm:title val="Chevron Accent Process"/>
+  <dgm:desc val="Use to show sequential steps in a task, process, or workflow, or to emphasize movement or direction. Works best with minimal Level 1 and Level 2 text."/>
   <dgm:catLst>
-    <dgm:cat type="icon" pri="500"/>
+    <dgm:cat type="process" pri="9500"/>
+    <dgm:cat type="officeonline" pri="2000"/>
   </dgm:catLst>
   <dgm:sampData useDef="1">
     <dgm:dataModel>
@@ -5291,44 +3098,52 @@
       <dgm:whole/>
     </dgm:dataModel>
   </dgm:sampData>
-  <dgm:styleData useDef="1">
+  <dgm:styleData>
     <dgm:dataModel>
-      <dgm:ptLst/>
+      <dgm:ptLst>
+        <dgm:pt modelId="0" type="doc"/>
+        <dgm:pt modelId="1"/>
+        <dgm:pt modelId="2"/>
+      </dgm:ptLst>
+      <dgm:cxnLst>
+        <dgm:cxn modelId="4" srcId="0" destId="1" srcOrd="0" destOrd="0"/>
+        <dgm:cxn modelId="5" srcId="0" destId="2" srcOrd="1" destOrd="0"/>
+      </dgm:cxnLst>
       <dgm:bg/>
       <dgm:whole/>
     </dgm:dataModel>
   </dgm:styleData>
-  <dgm:clrData useDef="1">
+  <dgm:clrData>
     <dgm:dataModel>
-      <dgm:ptLst/>
+      <dgm:ptLst>
+        <dgm:pt modelId="0" type="doc"/>
+        <dgm:pt modelId="1"/>
+        <dgm:pt modelId="2"/>
+        <dgm:pt modelId="3"/>
+        <dgm:pt modelId="4"/>
+      </dgm:ptLst>
+      <dgm:cxnLst>
+        <dgm:cxn modelId="5" srcId="0" destId="1" srcOrd="0" destOrd="0"/>
+        <dgm:cxn modelId="6" srcId="0" destId="2" srcOrd="1" destOrd="0"/>
+        <dgm:cxn modelId="7" srcId="0" destId="3" srcOrd="2" destOrd="0"/>
+        <dgm:cxn modelId="8" srcId="0" destId="4" srcOrd="3" destOrd="0"/>
+      </dgm:cxnLst>
       <dgm:bg/>
       <dgm:whole/>
     </dgm:dataModel>
   </dgm:clrData>
-  <dgm:layoutNode name="root">
+  <dgm:layoutNode name="Name0">
     <dgm:varLst>
       <dgm:dir/>
       <dgm:resizeHandles val="exact"/>
     </dgm:varLst>
-    <dgm:choose name="Name0">
-      <dgm:if name="Name1" axis="self" func="var" arg="dir" op="equ" val="norm">
-        <dgm:alg type="snake">
-          <dgm:param type="grDir" val="tL"/>
-          <dgm:param type="flowDir" val="row"/>
-          <dgm:param type="contDir" val="sameDir"/>
-          <dgm:param type="off" val="ctr"/>
-          <dgm:param type="vertAlign" val="mid"/>
-          <dgm:param type="horzAlign" val="ctr"/>
-        </dgm:alg>
+    <dgm:choose name="Name1">
+      <dgm:if name="Name2" func="var" arg="dir" op="equ" val="norm">
+        <dgm:alg type="lin"/>
       </dgm:if>
-      <dgm:else name="Name2">
-        <dgm:alg type="snake">
-          <dgm:param type="grDir" val="tR"/>
-          <dgm:param type="flowDir" val="row"/>
-          <dgm:param type="contDir" val="sameDir"/>
-          <dgm:param type="off" val="ctr"/>
-          <dgm:param type="vertAlign" val="mid"/>
-          <dgm:param type="horzAlign" val="ctr"/>
+      <dgm:else name="Name3">
+        <dgm:alg type="lin">
+          <dgm:param type="linDir" val="fromR"/>
         </dgm:alg>
       </dgm:else>
     </dgm:choose>
@@ -5336,136 +3151,85 @@
       <dgm:adjLst/>
     </dgm:shape>
     <dgm:presOf/>
-    <dgm:choose name="Name3">
-      <dgm:if name="Name4" axis="ch" ptType="node" func="cnt" op="lte" val="2">
-        <dgm:constrLst>
-          <dgm:constr type="h" for="ch" forName="compNode" refType="h" fact="0.4"/>
-          <dgm:constr type="w" for="ch" forName="compNode" val="100"/>
-          <dgm:constr type="w" for="ch" forName="sibTrans" refType="w" refFor="ch" refForName="compNode" fact="0.175"/>
-          <dgm:constr type="sp" refType="w" refFor="ch" refForName="compNode" op="equ" fact="0.25"/>
-          <dgm:constr type="primFontSz" for="des" ptType="node" op="equ" val="44"/>
-          <dgm:constr type="h" for="des" forName="compNode" op="equ"/>
-          <dgm:constr type="h" for="des" forName="textRect" op="equ"/>
-        </dgm:constrLst>
-      </dgm:if>
-      <dgm:if name="Name5" axis="ch" ptType="node" func="cnt" op="lte" val="3">
-        <dgm:constrLst>
-          <dgm:constr type="h" for="ch" forName="compNode" refType="h" fact="0.4"/>
-          <dgm:constr type="w" for="ch" forName="compNode" val="100"/>
-          <dgm:constr type="w" for="ch" forName="sibTrans" refType="w" refFor="ch" refForName="compNode" fact="0.175"/>
-          <dgm:constr type="sp" refType="w" refFor="ch" refForName="compNode" op="equ" fact="0.25"/>
-          <dgm:constr type="primFontSz" for="des" ptType="node" op="equ" val="40"/>
-          <dgm:constr type="h" for="des" forName="compNode" op="equ"/>
-          <dgm:constr type="h" for="des" forName="textRect" op="equ"/>
-        </dgm:constrLst>
-      </dgm:if>
-      <dgm:if name="Name6" axis="ch" ptType="node" func="cnt" op="lte" val="4">
-        <dgm:constrLst>
-          <dgm:constr type="h" for="ch" forName="compNode" refType="h" fact="0.4"/>
-          <dgm:constr type="w" for="ch" forName="compNode" refType="w"/>
-          <dgm:constr type="w" for="ch" forName="sibTrans" refType="w" refFor="ch" refForName="compNode" fact="0.175"/>
-          <dgm:constr type="sp" refType="w" refFor="ch" refForName="compNode" op="equ" fact="0.25"/>
-          <dgm:constr type="primFontSz" for="des" ptType="node" op="equ" val="32"/>
-          <dgm:constr type="h" for="des" forName="compNode" op="equ"/>
-          <dgm:constr type="h" for="des" forName="textRect" op="equ"/>
-        </dgm:constrLst>
-      </dgm:if>
-      <dgm:else name="Name7">
-        <dgm:constrLst>
-          <dgm:constr type="h" for="ch" forName="compNode" refType="h" fact="0.4"/>
-          <dgm:constr type="w" for="ch" forName="compNode" refType="w"/>
-          <dgm:constr type="w" for="ch" forName="sibTrans" refType="w" refFor="ch" refForName="compNode" fact="0.175"/>
-          <dgm:constr type="sp" refType="w" refFor="ch" refForName="compNode" op="equ" fact="0.25"/>
-          <dgm:constr type="primFontSz" for="des" ptType="node" op="equ" val="24"/>
-          <dgm:constr type="h" for="des" forName="compNode" op="equ"/>
-          <dgm:constr type="h" for="des" forName="textRect" op="equ"/>
-        </dgm:constrLst>
-      </dgm:else>
-    </dgm:choose>
-    <dgm:ruleLst>
-      <dgm:rule type="w" for="ch" forName="compNode" val="50" fact="NaN" max="NaN"/>
-    </dgm:ruleLst>
-    <dgm:forEach name="Name8" axis="ch" ptType="node">
-      <dgm:layoutNode name="compNode">
+    <dgm:constrLst>
+      <dgm:constr type="w" for="ch" forName="composite" refType="w"/>
+      <dgm:constr type="primFontSz" for="des" forName="txNode" op="equ" val="65"/>
+      <dgm:constr type="w" for="ch" forName="compositeSpace" refType="w" refFor="ch" refForName="composite" fact="0.028"/>
+    </dgm:constrLst>
+    <dgm:ruleLst/>
+    <dgm:forEach name="Name4" axis="ch" ptType="node">
+      <dgm:layoutNode name="composite">
         <dgm:alg type="composite"/>
         <dgm:shape xmlns:r="http://schemas.openxmlformats.org/officeDocument/2006/relationships" r:blip="">
           <dgm:adjLst/>
         </dgm:shape>
-        <dgm:presOf axis="self"/>
-        <dgm:constrLst>
-          <dgm:constr type="w" for="ch" forName="iconBgRect" refType="w" fact="0.61"/>
-          <dgm:constr type="h" for="ch" forName="iconBgRect" refType="w" refFor="ch" refForName="iconBgRect"/>
-          <dgm:constr type="t" for="ch" forName="iconBgRect"/>
-          <dgm:constr type="ctrX" for="ch" forName="iconBgRect" refType="w" fact="0.5"/>
-          <dgm:constr type="w" for="ch" forName="iconRect" refType="w" fact="0.35"/>
-          <dgm:constr type="h" for="ch" forName="iconRect" refType="w" refFor="ch" refForName="iconRect"/>
-          <dgm:constr type="ctrX" for="ch" forName="iconRect" refType="ctrX" refFor="ch" refForName="iconBgRect"/>
-          <dgm:constr type="ctrY" for="ch" forName="iconRect" refType="ctrY" refFor="ch" refForName="iconBgRect"/>
-          <dgm:constr type="h" for="ch" forName="spaceRect" refType="w" fact="0.19"/>
-          <dgm:constr type="w" for="ch" forName="spaceRect" refType="w"/>
-          <dgm:constr type="l" for="ch" forName="spaceRect"/>
-          <dgm:constr type="t" for="ch" forName="spaceRect" refType="b" refFor="ch" refForName="iconBgRect"/>
-          <dgm:constr type="h" for="ch" forName="textRect" val="20"/>
-          <dgm:constr type="w" for="ch" forName="textRect" refType="w"/>
-          <dgm:constr type="l" for="ch" forName="textRect"/>
-          <dgm:constr type="t" for="ch" forName="textRect" refType="b" refFor="ch" refForName="spaceRect"/>
-        </dgm:constrLst>
-        <dgm:ruleLst>
-          <dgm:rule type="h" val="INF" fact="NaN" max="NaN"/>
-        </dgm:ruleLst>
-        <dgm:layoutNode name="iconBgRect" styleLbl="bgShp">
+        <dgm:presOf/>
+        <dgm:choose name="Name5">
+          <dgm:if name="Name6" func="var" arg="dir" op="equ" val="norm">
+            <dgm:constrLst>
+              <dgm:constr type="l" for="ch" forName="bgChev"/>
+              <dgm:constr type="w" for="ch" forName="bgChev" refType="w" fact="0.9"/>
+              <dgm:constr type="t" for="ch" forName="bgChev"/>
+              <dgm:constr type="h" for="ch" forName="bgChev" refType="w" refFor="ch" refForName="bgChev" fact="0.386"/>
+              <dgm:constr type="l" for="ch" forName="txNode" refType="w" fact="0.24"/>
+              <dgm:constr type="w" for="ch" forName="txNode" refType="w" fact="0.76"/>
+              <dgm:constr type="t" for="ch" forName="txNode" refType="h" refFor="ch" refForName="bgChev" fact="0.25"/>
+              <dgm:constr type="h" for="ch" forName="txNode" refType="h" refFor="ch" refForName="bgChev"/>
+            </dgm:constrLst>
+          </dgm:if>
+          <dgm:else name="Name7">
+            <dgm:constrLst>
+              <dgm:constr type="l" for="ch" forName="bgChev" refType="w" fact="0.1"/>
+              <dgm:constr type="w" for="ch" forName="bgChev" refType="w" fact="0.9"/>
+              <dgm:constr type="t" for="ch" forName="bgChev"/>
+              <dgm:constr type="h" for="ch" forName="bgChev" refType="w" refFor="ch" refForName="bgChev" fact="0.386"/>
+              <dgm:constr type="l" for="ch" forName="txNode"/>
+              <dgm:constr type="w" for="ch" forName="txNode" refType="w" fact="0.76"/>
+              <dgm:constr type="t" for="ch" forName="txNode" refType="h" refFor="ch" refForName="bgChev" fact="0.25"/>
+              <dgm:constr type="h" for="ch" forName="txNode" refType="h" refFor="ch" refForName="bgChev"/>
+            </dgm:constrLst>
+          </dgm:else>
+        </dgm:choose>
+        <dgm:ruleLst/>
+        <dgm:layoutNode name="bgChev" styleLbl="node1">
           <dgm:alg type="sp"/>
-          <dgm:shape xmlns:r="http://schemas.openxmlformats.org/officeDocument/2006/relationships" type="ellipse" r:blip="">
-            <dgm:adjLst/>
-          </dgm:shape>
+          <dgm:choose name="Name8">
+            <dgm:if name="Name9" func="var" arg="dir" op="equ" val="norm">
+              <dgm:shape xmlns:r="http://schemas.openxmlformats.org/officeDocument/2006/relationships" type="chevron" r:blip="">
+                <dgm:adjLst>
+                  <dgm:adj idx="1" val="0.4"/>
+                </dgm:adjLst>
+              </dgm:shape>
+            </dgm:if>
+            <dgm:else name="Name10">
+              <dgm:shape xmlns:r="http://schemas.openxmlformats.org/officeDocument/2006/relationships" rot="180" type="chevron" r:blip="">
+                <dgm:adjLst>
+                  <dgm:adj idx="1" val="0.4"/>
+                </dgm:adjLst>
+              </dgm:shape>
+            </dgm:else>
+          </dgm:choose>
           <dgm:presOf/>
           <dgm:constrLst/>
-          <dgm:ruleLst/>
         </dgm:layoutNode>
-        <dgm:layoutNode name="iconRect" styleLbl="node1">
-          <dgm:alg type="sp"/>
-          <dgm:shape xmlns:r="http://schemas.openxmlformats.org/officeDocument/2006/relationships" type="rect" r:blip="" blipPhldr="1">
-            <dgm:adjLst/>
+        <dgm:layoutNode name="txNode" styleLbl="fgAcc1">
+          <dgm:varLst>
+            <dgm:bulletEnabled val="1"/>
+          </dgm:varLst>
+          <dgm:alg type="tx"/>
+          <dgm:shape xmlns:r="http://schemas.openxmlformats.org/officeDocument/2006/relationships" type="roundRect" r:blip="">
+            <dgm:adjLst>
+              <dgm:adj idx="1" val="0.1"/>
+            </dgm:adjLst>
           </dgm:shape>
-          <dgm:presOf/>
-          <dgm:constrLst/>
-          <dgm:ruleLst/>
-        </dgm:layoutNode>
-        <dgm:layoutNode name="spaceRect">
-          <dgm:alg type="sp"/>
-          <dgm:shape xmlns:r="http://schemas.openxmlformats.org/officeDocument/2006/relationships" r:blip="">
-            <dgm:adjLst/>
-          </dgm:shape>
-          <dgm:presOf/>
-          <dgm:constrLst/>
-          <dgm:ruleLst/>
-        </dgm:layoutNode>
-        <dgm:layoutNode name="textRect" styleLbl="revTx">
-          <dgm:varLst>
-            <dgm:chMax val="1"/>
-            <dgm:chPref val="1"/>
-          </dgm:varLst>
-          <dgm:alg type="tx">
-            <dgm:param type="txAnchorVert" val="t"/>
-          </dgm:alg>
-          <dgm:shape xmlns:r="http://schemas.openxmlformats.org/officeDocument/2006/relationships" type="rect" r:blip="">
-            <dgm:adjLst/>
-          </dgm:shape>
-          <dgm:presOf axis="self" ptType="node"/>
-          <dgm:constrLst>
-            <dgm:constr type="lMarg"/>
-            <dgm:constr type="rMarg"/>
-            <dgm:constr type="tMarg"/>
-            <dgm:constr type="bMarg"/>
-          </dgm:constrLst>
+          <dgm:presOf axis="desOrSelf" ptType="node"/>
           <dgm:ruleLst>
-            <dgm:rule type="primFontSz" val="11" fact="NaN" max="NaN"/>
-            <dgm:rule type="h" val="INF" fact="NaN" max="NaN"/>
+            <dgm:rule type="primFontSz" val="5" fact="NaN" max="NaN"/>
           </dgm:ruleLst>
         </dgm:layoutNode>
       </dgm:layoutNode>
-      <dgm:forEach name="Name9" axis="followSib" ptType="sibTrans" cnt="1">
-        <dgm:layoutNode name="sibTrans">
+      <dgm:forEach name="Name11" axis="followSib" ptType="sibTrans" cnt="1">
+        <dgm:layoutNode name="compositeSpace">
           <dgm:alg type="sp"/>
           <dgm:shape xmlns:r="http://schemas.openxmlformats.org/officeDocument/2006/relationships" r:blip="">
             <dgm:adjLst/>
@@ -5477,18 +3241,6 @@
       </dgm:forEach>
     </dgm:forEach>
   </dgm:layoutNode>
-  <dgm:extLst>
-    <a:ext uri="{68A01E43-0DF5-4B5B-8FA6-DAF915123BFB}">
-      <dgm1612:lstStyle xmlns:dgm1612="http://schemas.microsoft.com/office/drawing/2016/12/diagram">
-        <a:lvl1pPr>
-          <a:lnSpc>
-            <a:spcPct val="100000"/>
-          </a:lnSpc>
-          <a:defRPr cap="all"/>
-        </a:lvl1pPr>
-      </dgm1612:lstStyle>
-    </a:ext>
-  </dgm:extLst>
 </dgm:layoutDef>
 </file>
 
@@ -5653,1202 +3405,7 @@
 </dgm:layoutDef>
 </file>
 
-<file path=ppt/diagrams/layout3.xml><?xml version="1.0" encoding="utf-8"?>
-<dgm:layoutDef xmlns:dgm="http://schemas.openxmlformats.org/drawingml/2006/diagram" xmlns:a="http://schemas.openxmlformats.org/drawingml/2006/main" uniqueId="urn:microsoft.com/office/officeart/2005/8/layout/chevronAccent+Icon">
-  <dgm:title val="Chevron Accent Process"/>
-  <dgm:desc val="Use to show sequential steps in a task, process, or workflow, or to emphasize movement or direction. Works best with minimal Level 1 and Level 2 text."/>
-  <dgm:catLst>
-    <dgm:cat type="process" pri="9500"/>
-    <dgm:cat type="officeonline" pri="2000"/>
-  </dgm:catLst>
-  <dgm:sampData useDef="1">
-    <dgm:dataModel>
-      <dgm:ptLst/>
-      <dgm:bg/>
-      <dgm:whole/>
-    </dgm:dataModel>
-  </dgm:sampData>
-  <dgm:styleData>
-    <dgm:dataModel>
-      <dgm:ptLst>
-        <dgm:pt modelId="0" type="doc"/>
-        <dgm:pt modelId="1"/>
-        <dgm:pt modelId="2"/>
-      </dgm:ptLst>
-      <dgm:cxnLst>
-        <dgm:cxn modelId="4" srcId="0" destId="1" srcOrd="0" destOrd="0"/>
-        <dgm:cxn modelId="5" srcId="0" destId="2" srcOrd="1" destOrd="0"/>
-      </dgm:cxnLst>
-      <dgm:bg/>
-      <dgm:whole/>
-    </dgm:dataModel>
-  </dgm:styleData>
-  <dgm:clrData>
-    <dgm:dataModel>
-      <dgm:ptLst>
-        <dgm:pt modelId="0" type="doc"/>
-        <dgm:pt modelId="1"/>
-        <dgm:pt modelId="2"/>
-        <dgm:pt modelId="3"/>
-        <dgm:pt modelId="4"/>
-      </dgm:ptLst>
-      <dgm:cxnLst>
-        <dgm:cxn modelId="5" srcId="0" destId="1" srcOrd="0" destOrd="0"/>
-        <dgm:cxn modelId="6" srcId="0" destId="2" srcOrd="1" destOrd="0"/>
-        <dgm:cxn modelId="7" srcId="0" destId="3" srcOrd="2" destOrd="0"/>
-        <dgm:cxn modelId="8" srcId="0" destId="4" srcOrd="3" destOrd="0"/>
-      </dgm:cxnLst>
-      <dgm:bg/>
-      <dgm:whole/>
-    </dgm:dataModel>
-  </dgm:clrData>
-  <dgm:layoutNode name="Name0">
-    <dgm:varLst>
-      <dgm:dir/>
-      <dgm:resizeHandles val="exact"/>
-    </dgm:varLst>
-    <dgm:choose name="Name1">
-      <dgm:if name="Name2" func="var" arg="dir" op="equ" val="norm">
-        <dgm:alg type="lin"/>
-      </dgm:if>
-      <dgm:else name="Name3">
-        <dgm:alg type="lin">
-          <dgm:param type="linDir" val="fromR"/>
-        </dgm:alg>
-      </dgm:else>
-    </dgm:choose>
-    <dgm:shape xmlns:r="http://schemas.openxmlformats.org/officeDocument/2006/relationships" r:blip="">
-      <dgm:adjLst/>
-    </dgm:shape>
-    <dgm:presOf/>
-    <dgm:constrLst>
-      <dgm:constr type="w" for="ch" forName="composite" refType="w"/>
-      <dgm:constr type="primFontSz" for="des" forName="txNode" op="equ" val="65"/>
-      <dgm:constr type="w" for="ch" forName="compositeSpace" refType="w" refFor="ch" refForName="composite" fact="0.028"/>
-    </dgm:constrLst>
-    <dgm:ruleLst/>
-    <dgm:forEach name="Name4" axis="ch" ptType="node">
-      <dgm:layoutNode name="composite">
-        <dgm:alg type="composite"/>
-        <dgm:shape xmlns:r="http://schemas.openxmlformats.org/officeDocument/2006/relationships" r:blip="">
-          <dgm:adjLst/>
-        </dgm:shape>
-        <dgm:presOf/>
-        <dgm:choose name="Name5">
-          <dgm:if name="Name6" func="var" arg="dir" op="equ" val="norm">
-            <dgm:constrLst>
-              <dgm:constr type="l" for="ch" forName="bgChev"/>
-              <dgm:constr type="w" for="ch" forName="bgChev" refType="w" fact="0.9"/>
-              <dgm:constr type="t" for="ch" forName="bgChev"/>
-              <dgm:constr type="h" for="ch" forName="bgChev" refType="w" refFor="ch" refForName="bgChev" fact="0.386"/>
-              <dgm:constr type="l" for="ch" forName="txNode" refType="w" fact="0.24"/>
-              <dgm:constr type="w" for="ch" forName="txNode" refType="w" fact="0.76"/>
-              <dgm:constr type="t" for="ch" forName="txNode" refType="h" refFor="ch" refForName="bgChev" fact="0.25"/>
-              <dgm:constr type="h" for="ch" forName="txNode" refType="h" refFor="ch" refForName="bgChev"/>
-            </dgm:constrLst>
-          </dgm:if>
-          <dgm:else name="Name7">
-            <dgm:constrLst>
-              <dgm:constr type="l" for="ch" forName="bgChev" refType="w" fact="0.1"/>
-              <dgm:constr type="w" for="ch" forName="bgChev" refType="w" fact="0.9"/>
-              <dgm:constr type="t" for="ch" forName="bgChev"/>
-              <dgm:constr type="h" for="ch" forName="bgChev" refType="w" refFor="ch" refForName="bgChev" fact="0.386"/>
-              <dgm:constr type="l" for="ch" forName="txNode"/>
-              <dgm:constr type="w" for="ch" forName="txNode" refType="w" fact="0.76"/>
-              <dgm:constr type="t" for="ch" forName="txNode" refType="h" refFor="ch" refForName="bgChev" fact="0.25"/>
-              <dgm:constr type="h" for="ch" forName="txNode" refType="h" refFor="ch" refForName="bgChev"/>
-            </dgm:constrLst>
-          </dgm:else>
-        </dgm:choose>
-        <dgm:ruleLst/>
-        <dgm:layoutNode name="bgChev" styleLbl="node1">
-          <dgm:alg type="sp"/>
-          <dgm:choose name="Name8">
-            <dgm:if name="Name9" func="var" arg="dir" op="equ" val="norm">
-              <dgm:shape xmlns:r="http://schemas.openxmlformats.org/officeDocument/2006/relationships" type="chevron" r:blip="">
-                <dgm:adjLst>
-                  <dgm:adj idx="1" val="0.4"/>
-                </dgm:adjLst>
-              </dgm:shape>
-            </dgm:if>
-            <dgm:else name="Name10">
-              <dgm:shape xmlns:r="http://schemas.openxmlformats.org/officeDocument/2006/relationships" rot="180" type="chevron" r:blip="">
-                <dgm:adjLst>
-                  <dgm:adj idx="1" val="0.4"/>
-                </dgm:adjLst>
-              </dgm:shape>
-            </dgm:else>
-          </dgm:choose>
-          <dgm:presOf/>
-          <dgm:constrLst/>
-        </dgm:layoutNode>
-        <dgm:layoutNode name="txNode" styleLbl="fgAcc1">
-          <dgm:varLst>
-            <dgm:bulletEnabled val="1"/>
-          </dgm:varLst>
-          <dgm:alg type="tx"/>
-          <dgm:shape xmlns:r="http://schemas.openxmlformats.org/officeDocument/2006/relationships" type="roundRect" r:blip="">
-            <dgm:adjLst>
-              <dgm:adj idx="1" val="0.1"/>
-            </dgm:adjLst>
-          </dgm:shape>
-          <dgm:presOf axis="desOrSelf" ptType="node"/>
-          <dgm:ruleLst>
-            <dgm:rule type="primFontSz" val="5" fact="NaN" max="NaN"/>
-          </dgm:ruleLst>
-        </dgm:layoutNode>
-      </dgm:layoutNode>
-      <dgm:forEach name="Name11" axis="followSib" ptType="sibTrans" cnt="1">
-        <dgm:layoutNode name="compositeSpace">
-          <dgm:alg type="sp"/>
-          <dgm:shape xmlns:r="http://schemas.openxmlformats.org/officeDocument/2006/relationships" r:blip="">
-            <dgm:adjLst/>
-          </dgm:shape>
-          <dgm:presOf axis="self"/>
-          <dgm:constrLst/>
-          <dgm:ruleLst/>
-        </dgm:layoutNode>
-      </dgm:forEach>
-    </dgm:forEach>
-  </dgm:layoutNode>
-</dgm:layoutDef>
-</file>
-
 <file path=ppt/diagrams/quickStyle1.xml><?xml version="1.0" encoding="utf-8"?>
-<dgm:styleDef xmlns:dgm="http://schemas.openxmlformats.org/drawingml/2006/diagram" xmlns:a="http://schemas.openxmlformats.org/drawingml/2006/main" uniqueId="urn:microsoft.com/office/officeart/2005/8/quickstyle/simple1">
-  <dgm:title val=""/>
-  <dgm:desc val=""/>
-  <dgm:catLst>
-    <dgm:cat type="simple" pri="10100"/>
-  </dgm:catLst>
-  <dgm:scene3d>
-    <a:camera prst="orthographicFront"/>
-    <a:lightRig rig="threePt" dir="t"/>
-  </dgm:scene3d>
-  <dgm:styleLbl name="node0">
-    <dgm:scene3d>
-      <a:camera prst="orthographicFront"/>
-      <a:lightRig rig="threePt" dir="t"/>
-    </dgm:scene3d>
-    <dgm:sp3d/>
-    <dgm:txPr/>
-    <dgm:style>
-      <a:lnRef idx="2">
-        <a:scrgbClr r="0" g="0" b="0"/>
-      </a:lnRef>
-      <a:fillRef idx="1">
-        <a:scrgbClr r="0" g="0" b="0"/>
-      </a:fillRef>
-      <a:effectRef idx="0">
-        <a:scrgbClr r="0" g="0" b="0"/>
-      </a:effectRef>
-      <a:fontRef idx="minor">
-        <a:schemeClr val="lt1"/>
-      </a:fontRef>
-    </dgm:style>
-  </dgm:styleLbl>
-  <dgm:styleLbl name="lnNode1">
-    <dgm:scene3d>
-      <a:camera prst="orthographicFront"/>
-      <a:lightRig rig="threePt" dir="t"/>
-    </dgm:scene3d>
-    <dgm:sp3d/>
-    <dgm:txPr/>
-    <dgm:style>
-      <a:lnRef idx="2">
-        <a:scrgbClr r="0" g="0" b="0"/>
-      </a:lnRef>
-      <a:fillRef idx="1">
-        <a:scrgbClr r="0" g="0" b="0"/>
-      </a:fillRef>
-      <a:effectRef idx="0">
-        <a:scrgbClr r="0" g="0" b="0"/>
-      </a:effectRef>
-      <a:fontRef idx="minor">
-        <a:schemeClr val="lt1"/>
-      </a:fontRef>
-    </dgm:style>
-  </dgm:styleLbl>
-  <dgm:styleLbl name="vennNode1">
-    <dgm:scene3d>
-      <a:camera prst="orthographicFront"/>
-      <a:lightRig rig="threePt" dir="t"/>
-    </dgm:scene3d>
-    <dgm:sp3d/>
-    <dgm:txPr/>
-    <dgm:style>
-      <a:lnRef idx="2">
-        <a:scrgbClr r="0" g="0" b="0"/>
-      </a:lnRef>
-      <a:fillRef idx="1">
-        <a:scrgbClr r="0" g="0" b="0"/>
-      </a:fillRef>
-      <a:effectRef idx="0">
-        <a:scrgbClr r="0" g="0" b="0"/>
-      </a:effectRef>
-      <a:fontRef idx="minor">
-        <a:schemeClr val="tx1"/>
-      </a:fontRef>
-    </dgm:style>
-  </dgm:styleLbl>
-  <dgm:styleLbl name="alignNode1">
-    <dgm:scene3d>
-      <a:camera prst="orthographicFront"/>
-      <a:lightRig rig="threePt" dir="t"/>
-    </dgm:scene3d>
-    <dgm:sp3d/>
-    <dgm:txPr/>
-    <dgm:style>
-      <a:lnRef idx="2">
-        <a:scrgbClr r="0" g="0" b="0"/>
-      </a:lnRef>
-      <a:fillRef idx="1">
-        <a:scrgbClr r="0" g="0" b="0"/>
-      </a:fillRef>
-      <a:effectRef idx="0">
-        <a:scrgbClr r="0" g="0" b="0"/>
-      </a:effectRef>
-      <a:fontRef idx="minor">
-        <a:schemeClr val="lt1"/>
-      </a:fontRef>
-    </dgm:style>
-  </dgm:styleLbl>
-  <dgm:styleLbl name="node1">
-    <dgm:scene3d>
-      <a:camera prst="orthographicFront"/>
-      <a:lightRig rig="threePt" dir="t"/>
-    </dgm:scene3d>
-    <dgm:sp3d/>
-    <dgm:txPr/>
-    <dgm:style>
-      <a:lnRef idx="2">
-        <a:scrgbClr r="0" g="0" b="0"/>
-      </a:lnRef>
-      <a:fillRef idx="1">
-        <a:scrgbClr r="0" g="0" b="0"/>
-      </a:fillRef>
-      <a:effectRef idx="0">
-        <a:scrgbClr r="0" g="0" b="0"/>
-      </a:effectRef>
-      <a:fontRef idx="minor">
-        <a:schemeClr val="lt1"/>
-      </a:fontRef>
-    </dgm:style>
-  </dgm:styleLbl>
-  <dgm:styleLbl name="node2">
-    <dgm:scene3d>
-      <a:camera prst="orthographicFront"/>
-      <a:lightRig rig="threePt" dir="t"/>
-    </dgm:scene3d>
-    <dgm:sp3d/>
-    <dgm:txPr/>
-    <dgm:style>
-      <a:lnRef idx="2">
-        <a:scrgbClr r="0" g="0" b="0"/>
-      </a:lnRef>
-      <a:fillRef idx="1">
-        <a:scrgbClr r="0" g="0" b="0"/>
-      </a:fillRef>
-      <a:effectRef idx="0">
-        <a:scrgbClr r="0" g="0" b="0"/>
-      </a:effectRef>
-      <a:fontRef idx="minor">
-        <a:schemeClr val="lt1"/>
-      </a:fontRef>
-    </dgm:style>
-  </dgm:styleLbl>
-  <dgm:styleLbl name="node3">
-    <dgm:scene3d>
-      <a:camera prst="orthographicFront"/>
-      <a:lightRig rig="threePt" dir="t"/>
-    </dgm:scene3d>
-    <dgm:sp3d/>
-    <dgm:txPr/>
-    <dgm:style>
-      <a:lnRef idx="2">
-        <a:scrgbClr r="0" g="0" b="0"/>
-      </a:lnRef>
-      <a:fillRef idx="1">
-        <a:scrgbClr r="0" g="0" b="0"/>
-      </a:fillRef>
-      <a:effectRef idx="0">
-        <a:scrgbClr r="0" g="0" b="0"/>
-      </a:effectRef>
-      <a:fontRef idx="minor">
-        <a:schemeClr val="lt1"/>
-      </a:fontRef>
-    </dgm:style>
-  </dgm:styleLbl>
-  <dgm:styleLbl name="node4">
-    <dgm:scene3d>
-      <a:camera prst="orthographicFront"/>
-      <a:lightRig rig="threePt" dir="t"/>
-    </dgm:scene3d>
-    <dgm:sp3d/>
-    <dgm:txPr/>
-    <dgm:style>
-      <a:lnRef idx="2">
-        <a:scrgbClr r="0" g="0" b="0"/>
-      </a:lnRef>
-      <a:fillRef idx="1">
-        <a:scrgbClr r="0" g="0" b="0"/>
-      </a:fillRef>
-      <a:effectRef idx="0">
-        <a:scrgbClr r="0" g="0" b="0"/>
-      </a:effectRef>
-      <a:fontRef idx="minor">
-        <a:schemeClr val="lt1"/>
-      </a:fontRef>
-    </dgm:style>
-  </dgm:styleLbl>
-  <dgm:styleLbl name="fgImgPlace1">
-    <dgm:scene3d>
-      <a:camera prst="orthographicFront"/>
-      <a:lightRig rig="threePt" dir="t"/>
-    </dgm:scene3d>
-    <dgm:sp3d/>
-    <dgm:txPr/>
-    <dgm:style>
-      <a:lnRef idx="2">
-        <a:scrgbClr r="0" g="0" b="0"/>
-      </a:lnRef>
-      <a:fillRef idx="1">
-        <a:scrgbClr r="0" g="0" b="0"/>
-      </a:fillRef>
-      <a:effectRef idx="0">
-        <a:scrgbClr r="0" g="0" b="0"/>
-      </a:effectRef>
-      <a:fontRef idx="minor"/>
-    </dgm:style>
-  </dgm:styleLbl>
-  <dgm:styleLbl name="alignImgPlace1">
-    <dgm:scene3d>
-      <a:camera prst="orthographicFront"/>
-      <a:lightRig rig="threePt" dir="t"/>
-    </dgm:scene3d>
-    <dgm:sp3d/>
-    <dgm:txPr/>
-    <dgm:style>
-      <a:lnRef idx="2">
-        <a:scrgbClr r="0" g="0" b="0"/>
-      </a:lnRef>
-      <a:fillRef idx="1">
-        <a:scrgbClr r="0" g="0" b="0"/>
-      </a:fillRef>
-      <a:effectRef idx="0">
-        <a:scrgbClr r="0" g="0" b="0"/>
-      </a:effectRef>
-      <a:fontRef idx="minor"/>
-    </dgm:style>
-  </dgm:styleLbl>
-  <dgm:styleLbl name="bgImgPlace1">
-    <dgm:scene3d>
-      <a:camera prst="orthographicFront"/>
-      <a:lightRig rig="threePt" dir="t"/>
-    </dgm:scene3d>
-    <dgm:sp3d/>
-    <dgm:txPr/>
-    <dgm:style>
-      <a:lnRef idx="2">
-        <a:scrgbClr r="0" g="0" b="0"/>
-      </a:lnRef>
-      <a:fillRef idx="1">
-        <a:scrgbClr r="0" g="0" b="0"/>
-      </a:fillRef>
-      <a:effectRef idx="0">
-        <a:scrgbClr r="0" g="0" b="0"/>
-      </a:effectRef>
-      <a:fontRef idx="minor"/>
-    </dgm:style>
-  </dgm:styleLbl>
-  <dgm:styleLbl name="sibTrans2D1">
-    <dgm:scene3d>
-      <a:camera prst="orthographicFront"/>
-      <a:lightRig rig="threePt" dir="t"/>
-    </dgm:scene3d>
-    <dgm:sp3d/>
-    <dgm:txPr/>
-    <dgm:style>
-      <a:lnRef idx="0">
-        <a:scrgbClr r="0" g="0" b="0"/>
-      </a:lnRef>
-      <a:fillRef idx="1">
-        <a:scrgbClr r="0" g="0" b="0"/>
-      </a:fillRef>
-      <a:effectRef idx="0">
-        <a:scrgbClr r="0" g="0" b="0"/>
-      </a:effectRef>
-      <a:fontRef idx="minor">
-        <a:schemeClr val="lt1"/>
-      </a:fontRef>
-    </dgm:style>
-  </dgm:styleLbl>
-  <dgm:styleLbl name="fgSibTrans2D1">
-    <dgm:scene3d>
-      <a:camera prst="orthographicFront"/>
-      <a:lightRig rig="threePt" dir="t"/>
-    </dgm:scene3d>
-    <dgm:sp3d/>
-    <dgm:txPr/>
-    <dgm:style>
-      <a:lnRef idx="0">
-        <a:scrgbClr r="0" g="0" b="0"/>
-      </a:lnRef>
-      <a:fillRef idx="1">
-        <a:scrgbClr r="0" g="0" b="0"/>
-      </a:fillRef>
-      <a:effectRef idx="0">
-        <a:scrgbClr r="0" g="0" b="0"/>
-      </a:effectRef>
-      <a:fontRef idx="minor">
-        <a:schemeClr val="lt1"/>
-      </a:fontRef>
-    </dgm:style>
-  </dgm:styleLbl>
-  <dgm:styleLbl name="bgSibTrans2D1">
-    <dgm:scene3d>
-      <a:camera prst="orthographicFront"/>
-      <a:lightRig rig="threePt" dir="t"/>
-    </dgm:scene3d>
-    <dgm:sp3d/>
-    <dgm:txPr/>
-    <dgm:style>
-      <a:lnRef idx="0">
-        <a:scrgbClr r="0" g="0" b="0"/>
-      </a:lnRef>
-      <a:fillRef idx="1">
-        <a:scrgbClr r="0" g="0" b="0"/>
-      </a:fillRef>
-      <a:effectRef idx="0">
-        <a:scrgbClr r="0" g="0" b="0"/>
-      </a:effectRef>
-      <a:fontRef idx="minor">
-        <a:schemeClr val="lt1"/>
-      </a:fontRef>
-    </dgm:style>
-  </dgm:styleLbl>
-  <dgm:styleLbl name="sibTrans1D1">
-    <dgm:scene3d>
-      <a:camera prst="orthographicFront"/>
-      <a:lightRig rig="threePt" dir="t"/>
-    </dgm:scene3d>
-    <dgm:sp3d/>
-    <dgm:txPr/>
-    <dgm:style>
-      <a:lnRef idx="1">
-        <a:scrgbClr r="0" g="0" b="0"/>
-      </a:lnRef>
-      <a:fillRef idx="0">
-        <a:scrgbClr r="0" g="0" b="0"/>
-      </a:fillRef>
-      <a:effectRef idx="0">
-        <a:scrgbClr r="0" g="0" b="0"/>
-      </a:effectRef>
-      <a:fontRef idx="minor"/>
-    </dgm:style>
-  </dgm:styleLbl>
-  <dgm:styleLbl name="callout">
-    <dgm:scene3d>
-      <a:camera prst="orthographicFront"/>
-      <a:lightRig rig="threePt" dir="t"/>
-    </dgm:scene3d>
-    <dgm:sp3d/>
-    <dgm:txPr/>
-    <dgm:style>
-      <a:lnRef idx="2">
-        <a:scrgbClr r="0" g="0" b="0"/>
-      </a:lnRef>
-      <a:fillRef idx="1">
-        <a:scrgbClr r="0" g="0" b="0"/>
-      </a:fillRef>
-      <a:effectRef idx="0">
-        <a:scrgbClr r="0" g="0" b="0"/>
-      </a:effectRef>
-      <a:fontRef idx="minor"/>
-    </dgm:style>
-  </dgm:styleLbl>
-  <dgm:styleLbl name="asst0">
-    <dgm:scene3d>
-      <a:camera prst="orthographicFront"/>
-      <a:lightRig rig="threePt" dir="t"/>
-    </dgm:scene3d>
-    <dgm:sp3d/>
-    <dgm:txPr/>
-    <dgm:style>
-      <a:lnRef idx="2">
-        <a:scrgbClr r="0" g="0" b="0"/>
-      </a:lnRef>
-      <a:fillRef idx="1">
-        <a:scrgbClr r="0" g="0" b="0"/>
-      </a:fillRef>
-      <a:effectRef idx="0">
-        <a:scrgbClr r="0" g="0" b="0"/>
-      </a:effectRef>
-      <a:fontRef idx="minor">
-        <a:schemeClr val="lt1"/>
-      </a:fontRef>
-    </dgm:style>
-  </dgm:styleLbl>
-  <dgm:styleLbl name="asst1">
-    <dgm:scene3d>
-      <a:camera prst="orthographicFront"/>
-      <a:lightRig rig="threePt" dir="t"/>
-    </dgm:scene3d>
-    <dgm:sp3d/>
-    <dgm:txPr/>
-    <dgm:style>
-      <a:lnRef idx="2">
-        <a:scrgbClr r="0" g="0" b="0"/>
-      </a:lnRef>
-      <a:fillRef idx="1">
-        <a:scrgbClr r="0" g="0" b="0"/>
-      </a:fillRef>
-      <a:effectRef idx="0">
-        <a:scrgbClr r="0" g="0" b="0"/>
-      </a:effectRef>
-      <a:fontRef idx="minor">
-        <a:schemeClr val="lt1"/>
-      </a:fontRef>
-    </dgm:style>
-  </dgm:styleLbl>
-  <dgm:styleLbl name="asst2">
-    <dgm:scene3d>
-      <a:camera prst="orthographicFront"/>
-      <a:lightRig rig="threePt" dir="t"/>
-    </dgm:scene3d>
-    <dgm:sp3d/>
-    <dgm:txPr/>
-    <dgm:style>
-      <a:lnRef idx="2">
-        <a:scrgbClr r="0" g="0" b="0"/>
-      </a:lnRef>
-      <a:fillRef idx="1">
-        <a:scrgbClr r="0" g="0" b="0"/>
-      </a:fillRef>
-      <a:effectRef idx="0">
-        <a:scrgbClr r="0" g="0" b="0"/>
-      </a:effectRef>
-      <a:fontRef idx="minor">
-        <a:schemeClr val="lt1"/>
-      </a:fontRef>
-    </dgm:style>
-  </dgm:styleLbl>
-  <dgm:styleLbl name="asst3">
-    <dgm:scene3d>
-      <a:camera prst="orthographicFront"/>
-      <a:lightRig rig="threePt" dir="t"/>
-    </dgm:scene3d>
-    <dgm:sp3d/>
-    <dgm:txPr/>
-    <dgm:style>
-      <a:lnRef idx="2">
-        <a:scrgbClr r="0" g="0" b="0"/>
-      </a:lnRef>
-      <a:fillRef idx="1">
-        <a:scrgbClr r="0" g="0" b="0"/>
-      </a:fillRef>
-      <a:effectRef idx="0">
-        <a:scrgbClr r="0" g="0" b="0"/>
-      </a:effectRef>
-      <a:fontRef idx="minor">
-        <a:schemeClr val="lt1"/>
-      </a:fontRef>
-    </dgm:style>
-  </dgm:styleLbl>
-  <dgm:styleLbl name="asst4">
-    <dgm:scene3d>
-      <a:camera prst="orthographicFront"/>
-      <a:lightRig rig="threePt" dir="t"/>
-    </dgm:scene3d>
-    <dgm:sp3d/>
-    <dgm:txPr/>
-    <dgm:style>
-      <a:lnRef idx="2">
-        <a:scrgbClr r="0" g="0" b="0"/>
-      </a:lnRef>
-      <a:fillRef idx="1">
-        <a:scrgbClr r="0" g="0" b="0"/>
-      </a:fillRef>
-      <a:effectRef idx="0">
-        <a:scrgbClr r="0" g="0" b="0"/>
-      </a:effectRef>
-      <a:fontRef idx="minor">
-        <a:schemeClr val="lt1"/>
-      </a:fontRef>
-    </dgm:style>
-  </dgm:styleLbl>
-  <dgm:styleLbl name="parChTrans2D1">
-    <dgm:scene3d>
-      <a:camera prst="orthographicFront"/>
-      <a:lightRig rig="threePt" dir="t"/>
-    </dgm:scene3d>
-    <dgm:sp3d/>
-    <dgm:txPr/>
-    <dgm:style>
-      <a:lnRef idx="2">
-        <a:scrgbClr r="0" g="0" b="0"/>
-      </a:lnRef>
-      <a:fillRef idx="1">
-        <a:scrgbClr r="0" g="0" b="0"/>
-      </a:fillRef>
-      <a:effectRef idx="0">
-        <a:scrgbClr r="0" g="0" b="0"/>
-      </a:effectRef>
-      <a:fontRef idx="minor">
-        <a:schemeClr val="lt1"/>
-      </a:fontRef>
-    </dgm:style>
-  </dgm:styleLbl>
-  <dgm:styleLbl name="parChTrans2D2">
-    <dgm:scene3d>
-      <a:camera prst="orthographicFront"/>
-      <a:lightRig rig="threePt" dir="t"/>
-    </dgm:scene3d>
-    <dgm:sp3d/>
-    <dgm:txPr/>
-    <dgm:style>
-      <a:lnRef idx="2">
-        <a:scrgbClr r="0" g="0" b="0"/>
-      </a:lnRef>
-      <a:fillRef idx="1">
-        <a:scrgbClr r="0" g="0" b="0"/>
-      </a:fillRef>
-      <a:effectRef idx="0">
-        <a:scrgbClr r="0" g="0" b="0"/>
-      </a:effectRef>
-      <a:fontRef idx="minor">
-        <a:schemeClr val="lt1"/>
-      </a:fontRef>
-    </dgm:style>
-  </dgm:styleLbl>
-  <dgm:styleLbl name="parChTrans2D3">
-    <dgm:scene3d>
-      <a:camera prst="orthographicFront"/>
-      <a:lightRig rig="threePt" dir="t"/>
-    </dgm:scene3d>
-    <dgm:sp3d/>
-    <dgm:txPr/>
-    <dgm:style>
-      <a:lnRef idx="2">
-        <a:scrgbClr r="0" g="0" b="0"/>
-      </a:lnRef>
-      <a:fillRef idx="1">
-        <a:scrgbClr r="0" g="0" b="0"/>
-      </a:fillRef>
-      <a:effectRef idx="0">
-        <a:scrgbClr r="0" g="0" b="0"/>
-      </a:effectRef>
-      <a:fontRef idx="minor">
-        <a:schemeClr val="lt1"/>
-      </a:fontRef>
-    </dgm:style>
-  </dgm:styleLbl>
-  <dgm:styleLbl name="parChTrans2D4">
-    <dgm:scene3d>
-      <a:camera prst="orthographicFront"/>
-      <a:lightRig rig="threePt" dir="t"/>
-    </dgm:scene3d>
-    <dgm:sp3d/>
-    <dgm:txPr/>
-    <dgm:style>
-      <a:lnRef idx="2">
-        <a:scrgbClr r="0" g="0" b="0"/>
-      </a:lnRef>
-      <a:fillRef idx="1">
-        <a:scrgbClr r="0" g="0" b="0"/>
-      </a:fillRef>
-      <a:effectRef idx="0">
-        <a:scrgbClr r="0" g="0" b="0"/>
-      </a:effectRef>
-      <a:fontRef idx="minor">
-        <a:schemeClr val="lt1"/>
-      </a:fontRef>
-    </dgm:style>
-  </dgm:styleLbl>
-  <dgm:styleLbl name="parChTrans1D1">
-    <dgm:scene3d>
-      <a:camera prst="orthographicFront"/>
-      <a:lightRig rig="threePt" dir="t"/>
-    </dgm:scene3d>
-    <dgm:sp3d/>
-    <dgm:txPr/>
-    <dgm:style>
-      <a:lnRef idx="2">
-        <a:scrgbClr r="0" g="0" b="0"/>
-      </a:lnRef>
-      <a:fillRef idx="0">
-        <a:scrgbClr r="0" g="0" b="0"/>
-      </a:fillRef>
-      <a:effectRef idx="0">
-        <a:scrgbClr r="0" g="0" b="0"/>
-      </a:effectRef>
-      <a:fontRef idx="minor"/>
-    </dgm:style>
-  </dgm:styleLbl>
-  <dgm:styleLbl name="parChTrans1D2">
-    <dgm:scene3d>
-      <a:camera prst="orthographicFront"/>
-      <a:lightRig rig="threePt" dir="t"/>
-    </dgm:scene3d>
-    <dgm:sp3d/>
-    <dgm:txPr/>
-    <dgm:style>
-      <a:lnRef idx="2">
-        <a:scrgbClr r="0" g="0" b="0"/>
-      </a:lnRef>
-      <a:fillRef idx="0">
-        <a:scrgbClr r="0" g="0" b="0"/>
-      </a:fillRef>
-      <a:effectRef idx="0">
-        <a:scrgbClr r="0" g="0" b="0"/>
-      </a:effectRef>
-      <a:fontRef idx="minor"/>
-    </dgm:style>
-  </dgm:styleLbl>
-  <dgm:styleLbl name="parChTrans1D3">
-    <dgm:scene3d>
-      <a:camera prst="orthographicFront"/>
-      <a:lightRig rig="threePt" dir="t"/>
-    </dgm:scene3d>
-    <dgm:sp3d/>
-    <dgm:txPr/>
-    <dgm:style>
-      <a:lnRef idx="2">
-        <a:scrgbClr r="0" g="0" b="0"/>
-      </a:lnRef>
-      <a:fillRef idx="0">
-        <a:scrgbClr r="0" g="0" b="0"/>
-      </a:fillRef>
-      <a:effectRef idx="0">
-        <a:scrgbClr r="0" g="0" b="0"/>
-      </a:effectRef>
-      <a:fontRef idx="minor"/>
-    </dgm:style>
-  </dgm:styleLbl>
-  <dgm:styleLbl name="parChTrans1D4">
-    <dgm:scene3d>
-      <a:camera prst="orthographicFront"/>
-      <a:lightRig rig="threePt" dir="t"/>
-    </dgm:scene3d>
-    <dgm:sp3d/>
-    <dgm:txPr/>
-    <dgm:style>
-      <a:lnRef idx="2">
-        <a:scrgbClr r="0" g="0" b="0"/>
-      </a:lnRef>
-      <a:fillRef idx="0">
-        <a:scrgbClr r="0" g="0" b="0"/>
-      </a:fillRef>
-      <a:effectRef idx="0">
-        <a:scrgbClr r="0" g="0" b="0"/>
-      </a:effectRef>
-      <a:fontRef idx="minor"/>
-    </dgm:style>
-  </dgm:styleLbl>
-  <dgm:styleLbl name="fgAcc1">
-    <dgm:scene3d>
-      <a:camera prst="orthographicFront"/>
-      <a:lightRig rig="threePt" dir="t"/>
-    </dgm:scene3d>
-    <dgm:sp3d/>
-    <dgm:txPr/>
-    <dgm:style>
-      <a:lnRef idx="2">
-        <a:scrgbClr r="0" g="0" b="0"/>
-      </a:lnRef>
-      <a:fillRef idx="1">
-        <a:scrgbClr r="0" g="0" b="0"/>
-      </a:fillRef>
-      <a:effectRef idx="0">
-        <a:scrgbClr r="0" g="0" b="0"/>
-      </a:effectRef>
-      <a:fontRef idx="minor"/>
-    </dgm:style>
-  </dgm:styleLbl>
-  <dgm:styleLbl name="conFgAcc1">
-    <dgm:scene3d>
-      <a:camera prst="orthographicFront"/>
-      <a:lightRig rig="threePt" dir="t"/>
-    </dgm:scene3d>
-    <dgm:sp3d/>
-    <dgm:txPr/>
-    <dgm:style>
-      <a:lnRef idx="2">
-        <a:scrgbClr r="0" g="0" b="0"/>
-      </a:lnRef>
-      <a:fillRef idx="1">
-        <a:scrgbClr r="0" g="0" b="0"/>
-      </a:fillRef>
-      <a:effectRef idx="0">
-        <a:scrgbClr r="0" g="0" b="0"/>
-      </a:effectRef>
-      <a:fontRef idx="minor"/>
-    </dgm:style>
-  </dgm:styleLbl>
-  <dgm:styleLbl name="alignAcc1">
-    <dgm:scene3d>
-      <a:camera prst="orthographicFront"/>
-      <a:lightRig rig="threePt" dir="t"/>
-    </dgm:scene3d>
-    <dgm:sp3d/>
-    <dgm:txPr/>
-    <dgm:style>
-      <a:lnRef idx="2">
-        <a:scrgbClr r="0" g="0" b="0"/>
-      </a:lnRef>
-      <a:fillRef idx="1">
-        <a:scrgbClr r="0" g="0" b="0"/>
-      </a:fillRef>
-      <a:effectRef idx="0">
-        <a:scrgbClr r="0" g="0" b="0"/>
-      </a:effectRef>
-      <a:fontRef idx="minor"/>
-    </dgm:style>
-  </dgm:styleLbl>
-  <dgm:styleLbl name="trAlignAcc1">
-    <dgm:scene3d>
-      <a:camera prst="orthographicFront"/>
-      <a:lightRig rig="threePt" dir="t"/>
-    </dgm:scene3d>
-    <dgm:sp3d/>
-    <dgm:txPr/>
-    <dgm:style>
-      <a:lnRef idx="1">
-        <a:scrgbClr r="0" g="0" b="0"/>
-      </a:lnRef>
-      <a:fillRef idx="1">
-        <a:scrgbClr r="0" g="0" b="0"/>
-      </a:fillRef>
-      <a:effectRef idx="0">
-        <a:scrgbClr r="0" g="0" b="0"/>
-      </a:effectRef>
-      <a:fontRef idx="minor"/>
-    </dgm:style>
-  </dgm:styleLbl>
-  <dgm:styleLbl name="bgAcc1">
-    <dgm:scene3d>
-      <a:camera prst="orthographicFront"/>
-      <a:lightRig rig="threePt" dir="t"/>
-    </dgm:scene3d>
-    <dgm:sp3d/>
-    <dgm:txPr/>
-    <dgm:style>
-      <a:lnRef idx="2">
-        <a:scrgbClr r="0" g="0" b="0"/>
-      </a:lnRef>
-      <a:fillRef idx="1">
-        <a:scrgbClr r="0" g="0" b="0"/>
-      </a:fillRef>
-      <a:effectRef idx="0">
-        <a:scrgbClr r="0" g="0" b="0"/>
-      </a:effectRef>
-      <a:fontRef idx="minor"/>
-    </dgm:style>
-  </dgm:styleLbl>
-  <dgm:styleLbl name="solidFgAcc1">
-    <dgm:scene3d>
-      <a:camera prst="orthographicFront"/>
-      <a:lightRig rig="threePt" dir="t"/>
-    </dgm:scene3d>
-    <dgm:sp3d/>
-    <dgm:txPr/>
-    <dgm:style>
-      <a:lnRef idx="2">
-        <a:scrgbClr r="0" g="0" b="0"/>
-      </a:lnRef>
-      <a:fillRef idx="1">
-        <a:scrgbClr r="0" g="0" b="0"/>
-      </a:fillRef>
-      <a:effectRef idx="0">
-        <a:scrgbClr r="0" g="0" b="0"/>
-      </a:effectRef>
-      <a:fontRef idx="minor"/>
-    </dgm:style>
-  </dgm:styleLbl>
-  <dgm:styleLbl name="solidAlignAcc1">
-    <dgm:scene3d>
-      <a:camera prst="orthographicFront"/>
-      <a:lightRig rig="threePt" dir="t"/>
-    </dgm:scene3d>
-    <dgm:sp3d/>
-    <dgm:txPr/>
-    <dgm:style>
-      <a:lnRef idx="2">
-        <a:scrgbClr r="0" g="0" b="0"/>
-      </a:lnRef>
-      <a:fillRef idx="1">
-        <a:scrgbClr r="0" g="0" b="0"/>
-      </a:fillRef>
-      <a:effectRef idx="0">
-        <a:scrgbClr r="0" g="0" b="0"/>
-      </a:effectRef>
-      <a:fontRef idx="minor"/>
-    </dgm:style>
-  </dgm:styleLbl>
-  <dgm:styleLbl name="solidBgAcc1">
-    <dgm:scene3d>
-      <a:camera prst="orthographicFront"/>
-      <a:lightRig rig="threePt" dir="t"/>
-    </dgm:scene3d>
-    <dgm:sp3d/>
-    <dgm:txPr/>
-    <dgm:style>
-      <a:lnRef idx="2">
-        <a:scrgbClr r="0" g="0" b="0"/>
-      </a:lnRef>
-      <a:fillRef idx="1">
-        <a:scrgbClr r="0" g="0" b="0"/>
-      </a:fillRef>
-      <a:effectRef idx="0">
-        <a:scrgbClr r="0" g="0" b="0"/>
-      </a:effectRef>
-      <a:fontRef idx="minor"/>
-    </dgm:style>
-  </dgm:styleLbl>
-  <dgm:styleLbl name="fgAccFollowNode1">
-    <dgm:scene3d>
-      <a:camera prst="orthographicFront"/>
-      <a:lightRig rig="threePt" dir="t"/>
-    </dgm:scene3d>
-    <dgm:sp3d/>
-    <dgm:txPr/>
-    <dgm:style>
-      <a:lnRef idx="2">
-        <a:scrgbClr r="0" g="0" b="0"/>
-      </a:lnRef>
-      <a:fillRef idx="1">
-        <a:scrgbClr r="0" g="0" b="0"/>
-      </a:fillRef>
-      <a:effectRef idx="0">
-        <a:scrgbClr r="0" g="0" b="0"/>
-      </a:effectRef>
-      <a:fontRef idx="minor"/>
-    </dgm:style>
-  </dgm:styleLbl>
-  <dgm:styleLbl name="alignAccFollowNode1">
-    <dgm:scene3d>
-      <a:camera prst="orthographicFront"/>
-      <a:lightRig rig="threePt" dir="t"/>
-    </dgm:scene3d>
-    <dgm:sp3d/>
-    <dgm:txPr/>
-    <dgm:style>
-      <a:lnRef idx="2">
-        <a:scrgbClr r="0" g="0" b="0"/>
-      </a:lnRef>
-      <a:fillRef idx="1">
-        <a:scrgbClr r="0" g="0" b="0"/>
-      </a:fillRef>
-      <a:effectRef idx="0">
-        <a:scrgbClr r="0" g="0" b="0"/>
-      </a:effectRef>
-      <a:fontRef idx="minor"/>
-    </dgm:style>
-  </dgm:styleLbl>
-  <dgm:styleLbl name="bgAccFollowNode1">
-    <dgm:scene3d>
-      <a:camera prst="orthographicFront"/>
-      <a:lightRig rig="threePt" dir="t"/>
-    </dgm:scene3d>
-    <dgm:sp3d/>
-    <dgm:txPr/>
-    <dgm:style>
-      <a:lnRef idx="2">
-        <a:scrgbClr r="0" g="0" b="0"/>
-      </a:lnRef>
-      <a:fillRef idx="1">
-        <a:scrgbClr r="0" g="0" b="0"/>
-      </a:fillRef>
-      <a:effectRef idx="0">
-        <a:scrgbClr r="0" g="0" b="0"/>
-      </a:effectRef>
-      <a:fontRef idx="minor"/>
-    </dgm:style>
-  </dgm:styleLbl>
-  <dgm:styleLbl name="fgAcc0">
-    <dgm:scene3d>
-      <a:camera prst="orthographicFront"/>
-      <a:lightRig rig="threePt" dir="t"/>
-    </dgm:scene3d>
-    <dgm:sp3d/>
-    <dgm:txPr/>
-    <dgm:style>
-      <a:lnRef idx="2">
-        <a:scrgbClr r="0" g="0" b="0"/>
-      </a:lnRef>
-      <a:fillRef idx="1">
-        <a:scrgbClr r="0" g="0" b="0"/>
-      </a:fillRef>
-      <a:effectRef idx="0">
-        <a:scrgbClr r="0" g="0" b="0"/>
-      </a:effectRef>
-      <a:fontRef idx="minor"/>
-    </dgm:style>
-  </dgm:styleLbl>
-  <dgm:styleLbl name="fgAcc2">
-    <dgm:scene3d>
-      <a:camera prst="orthographicFront"/>
-      <a:lightRig rig="threePt" dir="t"/>
-    </dgm:scene3d>
-    <dgm:sp3d/>
-    <dgm:txPr/>
-    <dgm:style>
-      <a:lnRef idx="2">
-        <a:scrgbClr r="0" g="0" b="0"/>
-      </a:lnRef>
-      <a:fillRef idx="1">
-        <a:scrgbClr r="0" g="0" b="0"/>
-      </a:fillRef>
-      <a:effectRef idx="0">
-        <a:scrgbClr r="0" g="0" b="0"/>
-      </a:effectRef>
-      <a:fontRef idx="minor"/>
-    </dgm:style>
-  </dgm:styleLbl>
-  <dgm:styleLbl name="fgAcc3">
-    <dgm:scene3d>
-      <a:camera prst="orthographicFront"/>
-      <a:lightRig rig="threePt" dir="t"/>
-    </dgm:scene3d>
-    <dgm:sp3d/>
-    <dgm:txPr/>
-    <dgm:style>
-      <a:lnRef idx="2">
-        <a:scrgbClr r="0" g="0" b="0"/>
-      </a:lnRef>
-      <a:fillRef idx="1">
-        <a:scrgbClr r="0" g="0" b="0"/>
-      </a:fillRef>
-      <a:effectRef idx="0">
-        <a:scrgbClr r="0" g="0" b="0"/>
-      </a:effectRef>
-      <a:fontRef idx="minor"/>
-    </dgm:style>
-  </dgm:styleLbl>
-  <dgm:styleLbl name="fgAcc4">
-    <dgm:scene3d>
-      <a:camera prst="orthographicFront"/>
-      <a:lightRig rig="threePt" dir="t"/>
-    </dgm:scene3d>
-    <dgm:sp3d/>
-    <dgm:txPr/>
-    <dgm:style>
-      <a:lnRef idx="2">
-        <a:scrgbClr r="0" g="0" b="0"/>
-      </a:lnRef>
-      <a:fillRef idx="1">
-        <a:scrgbClr r="0" g="0" b="0"/>
-      </a:fillRef>
-      <a:effectRef idx="0">
-        <a:scrgbClr r="0" g="0" b="0"/>
-      </a:effectRef>
-      <a:fontRef idx="minor"/>
-    </dgm:style>
-  </dgm:styleLbl>
-  <dgm:styleLbl name="bgShp">
-    <dgm:scene3d>
-      <a:camera prst="orthographicFront"/>
-      <a:lightRig rig="threePt" dir="t"/>
-    </dgm:scene3d>
-    <dgm:sp3d/>
-    <dgm:txPr/>
-    <dgm:style>
-      <a:lnRef idx="0">
-        <a:scrgbClr r="0" g="0" b="0"/>
-      </a:lnRef>
-      <a:fillRef idx="1">
-        <a:scrgbClr r="0" g="0" b="0"/>
-      </a:fillRef>
-      <a:effectRef idx="0">
-        <a:scrgbClr r="0" g="0" b="0"/>
-      </a:effectRef>
-      <a:fontRef idx="minor"/>
-    </dgm:style>
-  </dgm:styleLbl>
-  <dgm:styleLbl name="dkBgShp">
-    <dgm:scene3d>
-      <a:camera prst="orthographicFront"/>
-      <a:lightRig rig="threePt" dir="t"/>
-    </dgm:scene3d>
-    <dgm:sp3d/>
-    <dgm:txPr/>
-    <dgm:style>
-      <a:lnRef idx="0">
-        <a:scrgbClr r="0" g="0" b="0"/>
-      </a:lnRef>
-      <a:fillRef idx="1">
-        <a:scrgbClr r="0" g="0" b="0"/>
-      </a:fillRef>
-      <a:effectRef idx="0">
-        <a:scrgbClr r="0" g="0" b="0"/>
-      </a:effectRef>
-      <a:fontRef idx="minor"/>
-    </dgm:style>
-  </dgm:styleLbl>
-  <dgm:styleLbl name="trBgShp">
-    <dgm:scene3d>
-      <a:camera prst="orthographicFront"/>
-      <a:lightRig rig="threePt" dir="t"/>
-    </dgm:scene3d>
-    <dgm:sp3d/>
-    <dgm:txPr/>
-    <dgm:style>
-      <a:lnRef idx="0">
-        <a:scrgbClr r="0" g="0" b="0"/>
-      </a:lnRef>
-      <a:fillRef idx="1">
-        <a:scrgbClr r="0" g="0" b="0"/>
-      </a:fillRef>
-      <a:effectRef idx="0">
-        <a:scrgbClr r="0" g="0" b="0"/>
-      </a:effectRef>
-      <a:fontRef idx="minor"/>
-    </dgm:style>
-  </dgm:styleLbl>
-  <dgm:styleLbl name="fgShp">
-    <dgm:scene3d>
-      <a:camera prst="orthographicFront"/>
-      <a:lightRig rig="threePt" dir="t"/>
-    </dgm:scene3d>
-    <dgm:sp3d/>
-    <dgm:txPr/>
-    <dgm:style>
-      <a:lnRef idx="2">
-        <a:scrgbClr r="0" g="0" b="0"/>
-      </a:lnRef>
-      <a:fillRef idx="1">
-        <a:scrgbClr r="0" g="0" b="0"/>
-      </a:fillRef>
-      <a:effectRef idx="0">
-        <a:scrgbClr r="0" g="0" b="0"/>
-      </a:effectRef>
-      <a:fontRef idx="minor"/>
-    </dgm:style>
-  </dgm:styleLbl>
-  <dgm:styleLbl name="revTx">
-    <dgm:scene3d>
-      <a:camera prst="orthographicFront"/>
-      <a:lightRig rig="threePt" dir="t"/>
-    </dgm:scene3d>
-    <dgm:sp3d/>
-    <dgm:txPr/>
-    <dgm:style>
-      <a:lnRef idx="0">
-        <a:scrgbClr r="0" g="0" b="0"/>
-      </a:lnRef>
-      <a:fillRef idx="0">
-        <a:scrgbClr r="0" g="0" b="0"/>
-      </a:fillRef>
-      <a:effectRef idx="0">
-        <a:scrgbClr r="0" g="0" b="0"/>
-      </a:effectRef>
-      <a:fontRef idx="minor"/>
-    </dgm:style>
-  </dgm:styleLbl>
-</dgm:styleDef>
-</file>
-
-<file path=ppt/diagrams/quickStyle2.xml><?xml version="1.0" encoding="utf-8"?>
 <dgm:styleDef xmlns:dgm="http://schemas.openxmlformats.org/drawingml/2006/diagram" xmlns:a="http://schemas.openxmlformats.org/drawingml/2006/main" uniqueId="urn:microsoft.com/office/officeart/2005/8/quickstyle/simple3">
   <dgm:title val=""/>
   <dgm:desc val=""/>
@@ -7908,7 +4465,7 @@
 </dgm:styleDef>
 </file>
 
-<file path=ppt/diagrams/quickStyle3.xml><?xml version="1.0" encoding="utf-8"?>
+<file path=ppt/diagrams/quickStyle2.xml><?xml version="1.0" encoding="utf-8"?>
 <dgm:styleDef xmlns:dgm="http://schemas.openxmlformats.org/drawingml/2006/diagram" xmlns:a="http://schemas.openxmlformats.org/drawingml/2006/main" uniqueId="urn:microsoft.com/office/officeart/2005/8/quickstyle/simple3">
   <dgm:title val=""/>
   <dgm:desc val=""/>
@@ -9233,7 +5790,7 @@
           <a:p>
             <a:fld id="{9184DA70-C731-4C70-880D-CCD4705E623C}" type="datetime1">
               <a:rPr lang="en-US" noProof="0" smtClean="0"/>
-              <a:t>9/1/2020</a:t>
+              <a:t>9/2/2020</a:t>
             </a:fld>
             <a:endParaRPr lang="en-US" noProof="0" dirty="0"/>
           </a:p>
@@ -9354,7 +5911,7 @@
           <a:p>
             <a:fld id="{39667345-2558-425A-8533-9BFDBCE15005}" type="datetime1">
               <a:rPr lang="en-US" noProof="0" smtClean="0"/>
-              <a:t>9/1/2020</a:t>
+              <a:t>9/2/2020</a:t>
             </a:fld>
             <a:endParaRPr lang="en-US" noProof="0" dirty="0"/>
           </a:p>
@@ -9742,7 +6299,7 @@
           <a:p>
             <a:fld id="{39667345-2558-425A-8533-9BFDBCE15005}" type="datetime1">
               <a:rPr lang="en-US" noProof="0" smtClean="0"/>
-              <a:t>9/1/2020</a:t>
+              <a:t>9/2/2020</a:t>
             </a:fld>
             <a:endParaRPr lang="en-US" noProof="0" dirty="0"/>
           </a:p>
@@ -10577,7 +7134,7 @@
           <a:p>
             <a:fld id="{4907D986-8816-4272-A432-0437A28A9828}" type="datetime1">
               <a:rPr lang="en-US" noProof="0" smtClean="0"/>
-              <a:t>9/1/2020</a:t>
+              <a:t>9/2/2020</a:t>
             </a:fld>
             <a:endParaRPr lang="en-US" noProof="0" dirty="0"/>
           </a:p>
@@ -10909,7 +7466,7 @@
           <a:p>
             <a:fld id="{9184DA70-C731-4C70-880D-CCD4705E623C}" type="datetime1">
               <a:rPr lang="en-US" noProof="0" smtClean="0"/>
-              <a:t>9/1/2020</a:t>
+              <a:t>9/2/2020</a:t>
             </a:fld>
             <a:endParaRPr lang="en-US" noProof="0" dirty="0"/>
           </a:p>
@@ -11217,7 +7774,7 @@
           <a:p>
             <a:fld id="{4BE1D723-8F53-4F53-90B0-1982A396982E}" type="datetime1">
               <a:rPr lang="en-US" noProof="0" smtClean="0"/>
-              <a:t>9/1/2020</a:t>
+              <a:t>9/2/2020</a:t>
             </a:fld>
             <a:endParaRPr lang="en-US" noProof="0" dirty="0"/>
           </a:p>
@@ -11810,7 +8367,7 @@
           <a:p>
             <a:fld id="{D9DF0F1C-5577-4ACB-BB62-DF8F3C494C7E}" type="datetime1">
               <a:rPr lang="en-US" noProof="0" smtClean="0"/>
-              <a:t>9/1/2020</a:t>
+              <a:t>9/2/2020</a:t>
             </a:fld>
             <a:endParaRPr lang="en-US" noProof="0" dirty="0"/>
           </a:p>
@@ -12073,7 +8630,7 @@
           <a:p>
             <a:fld id="{1775B394-D9F9-4F0C-B15D-605F45CB9E9F}" type="datetime1">
               <a:rPr lang="en-US" noProof="0" smtClean="0"/>
-              <a:t>9/1/2020</a:t>
+              <a:t>9/2/2020</a:t>
             </a:fld>
             <a:endParaRPr lang="en-US" noProof="0" dirty="0"/>
           </a:p>
@@ -12336,7 +8893,7 @@
           <a:p>
             <a:fld id="{1775B394-D9F9-4F0C-B15D-605F45CB9E9F}" type="datetime1">
               <a:rPr lang="en-US" noProof="0" smtClean="0"/>
-              <a:t>9/1/2020</a:t>
+              <a:t>9/2/2020</a:t>
             </a:fld>
             <a:endParaRPr lang="en-US" noProof="0" dirty="0"/>
           </a:p>
@@ -12853,7 +9410,7 @@
           <a:p>
             <a:fld id="{39667345-2558-425A-8533-9BFDBCE15005}" type="datetime1">
               <a:rPr lang="en-US" noProof="0" smtClean="0"/>
-              <a:t>9/1/2020</a:t>
+              <a:t>9/2/2020</a:t>
             </a:fld>
             <a:endParaRPr lang="en-US" noProof="0" dirty="0"/>
           </a:p>
@@ -12974,7 +9531,7 @@
           <a:p>
             <a:fld id="{39667345-2558-425A-8533-9BFDBCE15005}" type="datetime1">
               <a:rPr lang="en-US" noProof="0" smtClean="0"/>
-              <a:t>9/1/2020</a:t>
+              <a:t>9/2/2020</a:t>
             </a:fld>
             <a:endParaRPr lang="en-US" noProof="0" dirty="0"/>
           </a:p>
@@ -13406,7 +9963,7 @@
           <a:p>
             <a:fld id="{39667345-2558-425A-8533-9BFDBCE15005}" type="datetime1">
               <a:rPr lang="en-US" noProof="0" smtClean="0"/>
-              <a:t>9/1/2020</a:t>
+              <a:t>9/2/2020</a:t>
             </a:fld>
             <a:endParaRPr lang="en-US" noProof="0" dirty="0"/>
           </a:p>
@@ -13948,7 +10505,7 @@
           <a:p>
             <a:fld id="{62D6E202-B606-4609-B914-27C9371A1F6D}" type="datetime1">
               <a:rPr lang="en-US" noProof="0" smtClean="0"/>
-              <a:t>9/1/2020</a:t>
+              <a:t>9/2/2020</a:t>
             </a:fld>
             <a:endParaRPr lang="en-US" noProof="0" dirty="0"/>
           </a:p>
@@ -14465,15 +11022,6 @@
           <a:solidFill>
             <a:srgbClr val="FFFFFF"/>
           </a:solidFill>
-          <a:extLst>
-            <a:ext uri="{909E8E84-426E-40DD-AFC4-6F175D3DCCD1}">
-              <a14:hiddenFill xmlns:a14="http://schemas.microsoft.com/office/drawing/2010/main">
-                <a:solidFill>
-                  <a:srgbClr val="FFFFFF"/>
-                </a:solidFill>
-              </a14:hiddenFill>
-            </a:ext>
-          </a:extLst>
         </p:spPr>
       </p:pic>
       <p:sp>
@@ -15044,95 +11592,6 @@
 </file>
 
 <file path=ppt/slides/slide6.xml><?xml version="1.0" encoding="utf-8"?>
-<p:sld xmlns:a="http://schemas.openxmlformats.org/drawingml/2006/main" xmlns:r="http://schemas.openxmlformats.org/officeDocument/2006/relationships" xmlns:p="http://schemas.openxmlformats.org/presentationml/2006/main">
-  <p:cSld>
-    <p:spTree>
-      <p:nvGrpSpPr>
-        <p:cNvPr id="1" name=""/>
-        <p:cNvGrpSpPr/>
-        <p:nvPr/>
-      </p:nvGrpSpPr>
-      <p:grpSpPr>
-        <a:xfrm>
-          <a:off x="0" y="0"/>
-          <a:ext cx="0" cy="0"/>
-          <a:chOff x="0" y="0"/>
-          <a:chExt cx="0" cy="0"/>
-        </a:xfrm>
-      </p:grpSpPr>
-      <p:sp>
-        <p:nvSpPr>
-          <p:cNvPr id="3" name="Title 2">
-            <a:extLst>
-              <a:ext uri="{FF2B5EF4-FFF2-40B4-BE49-F238E27FC236}">
-                <a16:creationId xmlns:a16="http://schemas.microsoft.com/office/drawing/2014/main" id="{C70B3111-7B97-654A-86CA-FD04EA6ED6EF}"/>
-              </a:ext>
-            </a:extLst>
-          </p:cNvPr>
-          <p:cNvSpPr>
-            <a:spLocks noGrp="1"/>
-          </p:cNvSpPr>
-          <p:nvPr>
-            <p:ph type="title"/>
-          </p:nvPr>
-        </p:nvSpPr>
-        <p:spPr/>
-        <p:txBody>
-          <a:bodyPr/>
-          <a:lstStyle/>
-          <a:p>
-            <a:r>
-              <a:rPr lang="en-US" dirty="0"/>
-              <a:t>Contact Us</a:t>
-            </a:r>
-          </a:p>
-        </p:txBody>
-      </p:sp>
-      <p:graphicFrame>
-        <p:nvGraphicFramePr>
-          <p:cNvPr id="4" name="Content Placeholder 2" descr="SmartArt graphic for contact information">
-            <a:extLst>
-              <a:ext uri="{FF2B5EF4-FFF2-40B4-BE49-F238E27FC236}">
-                <a16:creationId xmlns:a16="http://schemas.microsoft.com/office/drawing/2014/main" id="{600D9413-DE22-3A40-BE90-9FD7FAA1C7C3}"/>
-              </a:ext>
-            </a:extLst>
-          </p:cNvPr>
-          <p:cNvGraphicFramePr>
-            <a:graphicFrameLocks noGrp="1"/>
-          </p:cNvGraphicFramePr>
-          <p:nvPr>
-            <p:ph idx="1"/>
-            <p:extLst>
-              <p:ext uri="{D42A27DB-BD31-4B8C-83A1-F6EECF244321}">
-                <p14:modId xmlns:p14="http://schemas.microsoft.com/office/powerpoint/2010/main" val="1847764084"/>
-              </p:ext>
-            </p:extLst>
-          </p:nvPr>
-        </p:nvGraphicFramePr>
-        <p:xfrm>
-          <a:off x="1096963" y="2108200"/>
-          <a:ext cx="10058400" cy="3760788"/>
-        </p:xfrm>
-        <a:graphic>
-          <a:graphicData uri="http://schemas.openxmlformats.org/drawingml/2006/diagram">
-            <dgm:relIds xmlns:dgm="http://schemas.openxmlformats.org/drawingml/2006/diagram" xmlns:r="http://schemas.openxmlformats.org/officeDocument/2006/relationships" r:dm="rId2" r:lo="rId3" r:qs="rId4" r:cs="rId5"/>
-          </a:graphicData>
-        </a:graphic>
-      </p:graphicFrame>
-    </p:spTree>
-    <p:extLst>
-      <p:ext uri="{BB962C8B-B14F-4D97-AF65-F5344CB8AC3E}">
-        <p14:creationId xmlns:p14="http://schemas.microsoft.com/office/powerpoint/2010/main" val="341007370"/>
-      </p:ext>
-    </p:extLst>
-  </p:cSld>
-  <p:clrMapOvr>
-    <a:masterClrMapping/>
-  </p:clrMapOvr>
-</p:sld>
-</file>
-
-<file path=ppt/slides/slide7.xml><?xml version="1.0" encoding="utf-8"?>
 <p:sld xmlns:a="http://schemas.openxmlformats.org/drawingml/2006/main" xmlns:r="http://schemas.openxmlformats.org/officeDocument/2006/relationships" xmlns:p="http://schemas.openxmlformats.org/presentationml/2006/main">
   <p:cSld>
     <p:spTree>

</xml_diff>